<commit_message>
DOCS: se corrige la justificacion respecto a los cambios hechos en el proyecto
</commit_message>
<xml_diff>
--- a/Arquitectura de software/L-MACK/SUTENTACION 3B L-MACK.pptx
+++ b/Arquitectura de software/L-MACK/SUTENTACION 3B L-MACK.pptx
@@ -1481,7 +1481,7 @@
                 <a:cs typeface="Calibri" panose="020F0502020204030204"/>
                 <a:sym typeface="Calibri" panose="020F0502020204030204"/>
               </a:rPr>
-              <a:t>‹#›</a:t>
+              <a:t>‹Nº›</a:t>
             </a:fld>
             <a:endParaRPr sz="1200" b="0" i="0" u="none" strike="noStrike" cap="none">
               <a:solidFill>
@@ -5247,7 +5247,7 @@
             </a:pPr>
             <a:fld id="{00000000-1234-1234-1234-123412341234}" type="slidenum">
               <a:rPr lang="es-CO"/>
-              <a:t>‹#›</a:t>
+              <a:t>‹Nº›</a:t>
             </a:fld>
             <a:endParaRPr lang="es-CO"/>
           </a:p>
@@ -6411,7 +6411,7 @@
             </a:pPr>
             <a:fld id="{00000000-1234-1234-1234-123412341234}" type="slidenum">
               <a:rPr lang="es-CO"/>
-              <a:t>‹#›</a:t>
+              <a:t>‹Nº›</a:t>
             </a:fld>
             <a:endParaRPr lang="es-CO"/>
           </a:p>
@@ -7412,7 +7412,7 @@
             </a:pPr>
             <a:fld id="{00000000-1234-1234-1234-123412341234}" type="slidenum">
               <a:rPr lang="es-CO"/>
-              <a:t>‹#›</a:t>
+              <a:t>‹Nº›</a:t>
             </a:fld>
             <a:endParaRPr lang="es-CO"/>
           </a:p>
@@ -8388,7 +8388,7 @@
             </a:pPr>
             <a:fld id="{00000000-1234-1234-1234-123412341234}" type="slidenum">
               <a:rPr lang="es-CO"/>
-              <a:t>‹#›</a:t>
+              <a:t>‹Nº›</a:t>
             </a:fld>
             <a:endParaRPr lang="es-CO"/>
           </a:p>
@@ -9364,7 +9364,7 @@
             </a:pPr>
             <a:fld id="{00000000-1234-1234-1234-123412341234}" type="slidenum">
               <a:rPr lang="es-CO"/>
-              <a:t>‹#›</a:t>
+              <a:t>‹Nº›</a:t>
             </a:fld>
             <a:endParaRPr lang="es-CO"/>
           </a:p>
@@ -10243,7 +10243,7 @@
             </a:pPr>
             <a:fld id="{00000000-1234-1234-1234-123412341234}" type="slidenum">
               <a:rPr lang="es-CO"/>
-              <a:t>‹#›</a:t>
+              <a:t>‹Nº›</a:t>
             </a:fld>
             <a:endParaRPr lang="es-CO"/>
           </a:p>
@@ -10869,7 +10869,7 @@
             </a:pPr>
             <a:fld id="{00000000-1234-1234-1234-123412341234}" type="slidenum">
               <a:rPr lang="es-CO"/>
-              <a:t>‹#›</a:t>
+              <a:t>‹Nº›</a:t>
             </a:fld>
             <a:endParaRPr lang="es-CO"/>
           </a:p>
@@ -11846,7 +11846,7 @@
             </a:pPr>
             <a:fld id="{00000000-1234-1234-1234-123412341234}" type="slidenum">
               <a:rPr lang="es-CO"/>
-              <a:t>‹#›</a:t>
+              <a:t>‹Nº›</a:t>
             </a:fld>
             <a:endParaRPr lang="es-CO"/>
           </a:p>
@@ -12822,7 +12822,7 @@
             </a:pPr>
             <a:fld id="{00000000-1234-1234-1234-123412341234}" type="slidenum">
               <a:rPr lang="es-CO"/>
-              <a:t>‹#›</a:t>
+              <a:t>‹Nº›</a:t>
             </a:fld>
             <a:endParaRPr lang="es-CO"/>
           </a:p>
@@ -13835,7 +13835,7 @@
             </a:pPr>
             <a:fld id="{00000000-1234-1234-1234-123412341234}" type="slidenum">
               <a:rPr lang="es-CO"/>
-              <a:t>‹#›</a:t>
+              <a:t>‹Nº›</a:t>
             </a:fld>
             <a:endParaRPr lang="es-CO"/>
           </a:p>
@@ -14998,7 +14998,7 @@
             </a:pPr>
             <a:fld id="{00000000-1234-1234-1234-123412341234}" type="slidenum">
               <a:rPr lang="es-CO"/>
-              <a:t>‹#›</a:t>
+              <a:t>‹Nº›</a:t>
             </a:fld>
             <a:endParaRPr lang="es-CO"/>
           </a:p>
@@ -16535,7 +16535,7 @@
             </a:pPr>
             <a:fld id="{00000000-1234-1234-1234-123412341234}" type="slidenum">
               <a:rPr lang="es-CO"/>
-              <a:t>‹#›</a:t>
+              <a:t>‹Nº›</a:t>
             </a:fld>
             <a:endParaRPr lang="es-CO"/>
           </a:p>
@@ -17921,7 +17921,7 @@
             </a:pPr>
             <a:fld id="{00000000-1234-1234-1234-123412341234}" type="slidenum">
               <a:rPr lang="es-CO"/>
-              <a:t>‹#›</a:t>
+              <a:t>‹Nº›</a:t>
             </a:fld>
             <a:endParaRPr lang="es-CO"/>
           </a:p>
@@ -21004,7 +21004,7 @@
                 <a:cs typeface="Calibri" panose="020F0502020204030204"/>
                 <a:sym typeface="Calibri" panose="020F0502020204030204"/>
               </a:rPr>
-              <a:t>SCRUM No. “5”:</a:t>
+              <a:t>SCRUM No. “1”:</a:t>
             </a:r>
             <a:endParaRPr sz="1600" b="1" i="0" u="none" strike="noStrike" cap="none" dirty="0">
               <a:solidFill>
@@ -21391,7 +21391,7 @@
         <p:spPr>
           <a:xfrm>
             <a:off x="456118" y="2784156"/>
-            <a:ext cx="11063787" cy="2246769"/>
+            <a:ext cx="11063787" cy="2554545"/>
           </a:xfrm>
           <a:prstGeom prst="rect">
             <a:avLst/>
@@ -21405,13 +21405,14 @@
           <a:p>
             <a:pPr algn="ctr"/>
             <a:r>
-              <a:rPr lang="es-ES" sz="2000" b="1" dirty="0">
-                <a:solidFill>
-                  <a:schemeClr val="tx1"/>
-                </a:solidFill>
-              </a:rPr>
-              <a:t>El SENA actualmente utiliza un método manual para gestionar el acceso de vehículos a los parqueaderos de su sede “Centro de Servicios Financieros”, lo que genera problemas de organización y seguridad. El uso de una minuta para registrar las placas de los vehículos, del acceso de visitantes y/o aprendices y incluso el registro de los ambientes que tiene el centro no es eficiente y puede llevar a errores y pérdidas de información. Además, no hay un control claro sobre quién tiene permiso para usar los parqueaderos o el ingreso al centro y bajo qué condiciones.</a:t>
+              <a:rPr lang="es-MX" sz="2000" dirty="0"/>
+              <a:t>En el SENA hemos identificado diversos problemas que afectan tanto a los aprendices como a los instructores. Uno de los más relevantes es la gestión de la ocupación de ambientes, la cual actualmente se realiza mediante minutas físicas manejadas por los vigilantes. Este método ha generado inconvenientes, como el desajuste en las clases debido a que los instructores no siempre están informados de la disponibilidad real de los espacios. Otro problema importante que detectamos es el control de asistencia, ya que actualmente no existe una plataforma centralizada para su registro. Los instructores suelen llevar este control en archivos de Excel, lo cual no es práctico ni eficiente.</a:t>
             </a:r>
+            <a:endParaRPr lang="es-ES" sz="2000" b="1" dirty="0">
+              <a:solidFill>
+                <a:schemeClr val="tx1"/>
+              </a:solidFill>
+            </a:endParaRPr>
           </a:p>
         </p:txBody>
       </p:sp>
@@ -21552,8 +21553,8 @@
         </p:nvSpPr>
         <p:spPr>
           <a:xfrm>
-            <a:off x="253035" y="1863947"/>
-            <a:ext cx="11499203" cy="4093428"/>
+            <a:off x="196391" y="3069661"/>
+            <a:ext cx="11499203" cy="1631216"/>
           </a:xfrm>
           <a:prstGeom prst="rect">
             <a:avLst/>
@@ -21567,24 +21568,14 @@
           <a:p>
             <a:pPr algn="ctr"/>
             <a:r>
-              <a:rPr lang="es-ES" sz="2000" b="1" dirty="0">
-                <a:solidFill>
-                  <a:schemeClr val="tx1"/>
-                </a:solidFill>
-              </a:rPr>
-              <a:t>La implementación de un sistema de gestión de parqueaderos, ingresos y ambientes en el SENA de Centro de Servicios Financieros mejorará la organización y seguridad de los vehículos, equipos y el bienestar de los funcionarios de mayor rango, como coordinadores, instructores y superiores o incluso de los mismos aprendices. </a:t>
+              <a:rPr lang="es-MX" sz="2000" dirty="0"/>
+              <a:t>La implementación de un sistema de gestión de minutas permitirá optimizar la organización y el uso del tiempo en los diferentes ambientes del SENA, beneficiando directamente tanto a los aprendices como a los instructores. Del mismo modo, el registro de asistencia a través de una plataforma digital también contribuirá a una gestión más eficiente y ordenada.</a:t>
             </a:r>
-          </a:p>
-          <a:p>
-            <a:pPr algn="ctr"/>
-            <a:r>
-              <a:rPr lang="es-ES" sz="2000" b="1" dirty="0">
-                <a:solidFill>
-                  <a:schemeClr val="tx1"/>
-                </a:solidFill>
-              </a:rPr>
-              <a:t>Esto permitirá:</a:t>
-            </a:r>
+            <a:endParaRPr lang="es-ES" sz="2000" b="1" dirty="0">
+              <a:solidFill>
+                <a:schemeClr val="tx1"/>
+              </a:solidFill>
+            </a:endParaRPr>
           </a:p>
           <a:p>
             <a:pPr algn="ctr"/>
@@ -21593,101 +21584,6 @@
                 <a:schemeClr val="tx1"/>
               </a:solidFill>
             </a:endParaRPr>
-          </a:p>
-          <a:p>
-            <a:pPr algn="ctr"/>
-            <a:r>
-              <a:rPr lang="es-ES" sz="2000" b="1" dirty="0">
-                <a:solidFill>
-                  <a:schemeClr val="tx1"/>
-                </a:solidFill>
-              </a:rPr>
-              <a:t>-    Un control más efectivo sobre quién tiene acceso a los parqueaderos.</a:t>
-            </a:r>
-          </a:p>
-          <a:p>
-            <a:pPr marL="285750" indent="-285750" algn="ctr">
-              <a:buFontTx/>
-              <a:buChar char="-"/>
-            </a:pPr>
-            <a:r>
-              <a:rPr lang="es-ES" sz="2000" b="1" dirty="0">
-                <a:solidFill>
-                  <a:schemeClr val="tx1"/>
-                </a:solidFill>
-              </a:rPr>
-              <a:t>Una mejor gestión de los espacios de parqueo disponibles.</a:t>
-            </a:r>
-          </a:p>
-          <a:p>
-            <a:pPr marL="285750" indent="-285750" algn="ctr">
-              <a:buFontTx/>
-              <a:buChar char="-"/>
-            </a:pPr>
-            <a:r>
-              <a:rPr lang="es-ES" sz="2000" b="1" dirty="0">
-                <a:solidFill>
-                  <a:schemeClr val="tx1"/>
-                </a:solidFill>
-              </a:rPr>
-              <a:t>Una reducción de los errores y pérdidas de información.</a:t>
-            </a:r>
-          </a:p>
-          <a:p>
-            <a:pPr marL="342900" indent="-342900" algn="ctr">
-              <a:buFontTx/>
-              <a:buChar char="-"/>
-            </a:pPr>
-            <a:r>
-              <a:rPr lang="es-ES" sz="2000" b="1" dirty="0">
-                <a:solidFill>
-                  <a:schemeClr val="tx1"/>
-                </a:solidFill>
-              </a:rPr>
-              <a:t>Una mayor seguridad para los vehículos y funcionarios.</a:t>
-            </a:r>
-          </a:p>
-          <a:p>
-            <a:pPr marL="342900" indent="-342900" algn="ctr">
-              <a:buFontTx/>
-              <a:buChar char="-"/>
-            </a:pPr>
-            <a:r>
-              <a:rPr lang="es-ES" sz="2000" b="1" dirty="0">
-                <a:solidFill>
-                  <a:schemeClr val="tx1"/>
-                </a:solidFill>
-              </a:rPr>
-              <a:t>Una mejor gestión de espacios y equipos disponibles.</a:t>
-            </a:r>
-          </a:p>
-          <a:p>
-            <a:pPr marL="342900" indent="-342900" algn="ctr">
-              <a:buFontTx/>
-              <a:buChar char="-"/>
-            </a:pPr>
-            <a:r>
-              <a:rPr lang="es-ES" sz="2000" b="1" dirty="0">
-                <a:solidFill>
-                  <a:schemeClr val="tx1"/>
-                </a:solidFill>
-              </a:rPr>
-              <a:t>Mayor agilidad al momento del ingreso</a:t>
-            </a:r>
-          </a:p>
-          <a:p>
-            <a:pPr marL="342900" indent="-342900" algn="ctr">
-              <a:buFontTx/>
-              <a:buChar char="-"/>
-            </a:pPr>
-            <a:r>
-              <a:rPr lang="es-ES" sz="2000" b="1" dirty="0">
-                <a:solidFill>
-                  <a:schemeClr val="tx1"/>
-                </a:solidFill>
-              </a:rPr>
-              <a:t>Mayor seguridad para todos los integrantes del C.S.F</a:t>
-            </a:r>
           </a:p>
         </p:txBody>
       </p:sp>

</xml_diff>

<commit_message>
Docs: Se corrige el objetivo general
</commit_message>
<xml_diff>
--- a/Arquitectura de software/L-MACK/SUTENTACION 3B L-MACK.pptx
+++ b/Arquitectura de software/L-MACK/SUTENTACION 3B L-MACK.pptx
@@ -21554,7 +21554,7 @@
         <p:spPr>
           <a:xfrm>
             <a:off x="196391" y="3069661"/>
-            <a:ext cx="11499203" cy="1631216"/>
+            <a:ext cx="11499203" cy="2554545"/>
           </a:xfrm>
           <a:prstGeom prst="rect">
             <a:avLst/>
@@ -21569,13 +21569,8 @@
             <a:pPr algn="ctr"/>
             <a:r>
               <a:rPr lang="es-MX" sz="2000" dirty="0"/>
-              <a:t>La implementación de un sistema de gestión de minutas permitirá optimizar la organización y el uso del tiempo en los diferentes ambientes del SENA, beneficiando directamente tanto a los aprendices como a los instructores. Del mismo modo, el registro de asistencia a través de una plataforma digital también contribuirá a una gestión más eficiente y ordenada.</a:t>
+              <a:t>La implementación de un sistema de gestión de minutas en el SENA permitirá optimizar la organización y el uso eficiente del tiempo en los diferentes ambientes institucionales, beneficiando de manera directa tanto a los aprendices como a los instructores. Asimismo, el desarrollo de una plataforma digital para el registro de asistencia contribuirá a mejorar el control y seguimiento de los procesos formativos. Adicionalmente, el sistema ofrecerá un espacio para registrar apuntes o novedades relacionadas con incidentes, lo que fortalecerá la comunicación y el manejo oportuno de situaciones relevantes dentro de la institución.</a:t>
             </a:r>
-            <a:endParaRPr lang="es-ES" sz="2000" b="1" dirty="0">
-              <a:solidFill>
-                <a:schemeClr val="tx1"/>
-              </a:solidFill>
-            </a:endParaRPr>
           </a:p>
           <a:p>
             <a:pPr algn="ctr"/>
@@ -21724,7 +21719,7 @@
         <p:spPr>
           <a:xfrm>
             <a:off x="99070" y="2767955"/>
-            <a:ext cx="11634089" cy="1322070"/>
+            <a:ext cx="11634089" cy="1323439"/>
           </a:xfrm>
           <a:prstGeom prst="rect">
             <a:avLst/>
@@ -21738,12 +21733,8 @@
           <a:p>
             <a:pPr algn="ctr"/>
             <a:r>
-              <a:rPr lang="es-ES" sz="2000" b="1" dirty="0">
-                <a:solidFill>
-                  <a:schemeClr val="tx1"/>
-                </a:solidFill>
-              </a:rPr>
-              <a:t>Diseñar y desarrollar un sistema de gestión de parqueaderos para el SENA C.S.F que permita una mejor organización y seguridad en el acceso de personas, de toma de ambientes y  vehículos de los funcionarios dentro de la sede, para así realizar eficazmente las acciones de registro como para los usuarios, administradores y colaboradores(guarda de seguridad). </a:t>
+              <a:rPr lang="es-MX" sz="2000" dirty="0"/>
+              <a:t>Diseñar e implementar un sistema digital para la gestión de minutas, el control de asistencia y el registro de incidentes en los ambientes del SENA, con el fin de optimizar la organización institucional, mejorar la comunicación entre actores y facilitar el seguimiento eficiente de las actividades formativas.</a:t>
             </a:r>
           </a:p>
         </p:txBody>

</xml_diff>

<commit_message>
doc: modificacion objetivo general
</commit_message>
<xml_diff>
--- a/Arquitectura de software/L-MACK/SUTENTACION 3B L-MACK.pptx
+++ b/Arquitectura de software/L-MACK/SUTENTACION 3B L-MACK.pptx
@@ -33,11 +33,18 @@
   <p:notesSz cx="6858000" cy="9144000"/>
   <p:embeddedFontLst>
     <p:embeddedFont>
-      <p:font typeface="Work Sans Light" pitchFamily="2" charset="0"/>
+      <p:font typeface="Work Sans Light" panose="020B0604020202020204" charset="0"/>
       <p:regular r:id="rId26"/>
       <p:bold r:id="rId27"/>
       <p:italic r:id="rId28"/>
       <p:boldItalic r:id="rId29"/>
+    </p:embeddedFont>
+    <p:embeddedFont>
+      <p:font typeface="Calibri" panose="020F0502020204030204" pitchFamily="34" charset="0"/>
+      <p:regular r:id="rId30"/>
+      <p:bold r:id="rId31"/>
+      <p:italic r:id="rId32"/>
+      <p:boldItalic r:id="rId33"/>
     </p:embeddedFont>
   </p:embeddedFontLst>
   <p:defaultTextStyle>
@@ -19355,6 +19362,18 @@
               <a:buFont typeface="Arial" panose="020B0604020202020204"/>
               <a:buNone/>
             </a:pPr>
+            <a:r>
+              <a:rPr lang="es-CO" sz="1600" b="1" i="0" u="none" strike="noStrike" cap="none" dirty="0">
+                <a:solidFill>
+                  <a:schemeClr val="dk1"/>
+                </a:solidFill>
+                <a:latin typeface="Calibri" panose="020F0502020204030204"/>
+                <a:ea typeface="Calibri" panose="020F0502020204030204"/>
+                <a:cs typeface="Calibri" panose="020F0502020204030204"/>
+                <a:sym typeface="Calibri" panose="020F0502020204030204"/>
+              </a:rPr>
+              <a:t/>
+            </a:r>
             <a:br>
               <a:rPr lang="es-CO" sz="1600" b="1" i="0" u="none" strike="noStrike" cap="none" dirty="0">
                 <a:solidFill>
@@ -20573,6 +20592,18 @@
               <a:buFont typeface="Arial" panose="020B0604020202020204"/>
               <a:buNone/>
             </a:pPr>
+            <a:r>
+              <a:rPr lang="es-CO" sz="1600" b="1" i="0" u="none" strike="noStrike" cap="none" dirty="0">
+                <a:solidFill>
+                  <a:schemeClr val="dk1"/>
+                </a:solidFill>
+                <a:latin typeface="Calibri" panose="020F0502020204030204"/>
+                <a:ea typeface="Calibri" panose="020F0502020204030204"/>
+                <a:cs typeface="Calibri" panose="020F0502020204030204"/>
+                <a:sym typeface="Calibri" panose="020F0502020204030204"/>
+              </a:rPr>
+              <a:t/>
+            </a:r>
             <a:br>
               <a:rPr lang="es-CO" sz="1600" b="1" i="0" u="none" strike="noStrike" cap="none" dirty="0">
                 <a:solidFill>
@@ -21734,7 +21765,15 @@
             <a:pPr algn="ctr"/>
             <a:r>
               <a:rPr lang="es-MX" sz="2000" dirty="0"/>
-              <a:t>Diseñar e implementar un sistema digital para la gestión de minutas, el control de asistencia y el registro de incidentes en los ambientes del SENA, con el fin de optimizar la organización institucional, mejorar la comunicación entre actores y facilitar el seguimiento eficiente de las actividades formativas.</a:t>
+              <a:t>Diseñar e implementar un sistema digital para la gestión de minutas, el control de asistencia y el registro de incidentes en los ambientes del SENA, con el fin de optimizar la organización </a:t>
+            </a:r>
+            <a:r>
+              <a:rPr lang="es-MX" sz="2000" dirty="0" smtClean="0"/>
+              <a:t>del centro de formación, </a:t>
+            </a:r>
+            <a:r>
+              <a:rPr lang="es-MX" sz="2000" dirty="0"/>
+              <a:t>mejorar la comunicación entre actores y facilitar el seguimiento eficiente de las actividades formativas.</a:t>
             </a:r>
           </a:p>
         </p:txBody>
@@ -22156,6 +22195,18 @@
               <a:buFont typeface="Arial" panose="020B0604020202020204"/>
               <a:buNone/>
             </a:pPr>
+            <a:r>
+              <a:rPr lang="es-CO" sz="1600" b="1" i="0" u="none" strike="noStrike" cap="none" dirty="0">
+                <a:solidFill>
+                  <a:schemeClr val="dk1"/>
+                </a:solidFill>
+                <a:latin typeface="Calibri" panose="020F0502020204030204"/>
+                <a:ea typeface="Calibri" panose="020F0502020204030204"/>
+                <a:cs typeface="Calibri" panose="020F0502020204030204"/>
+                <a:sym typeface="Calibri" panose="020F0502020204030204"/>
+              </a:rPr>
+              <a:t/>
+            </a:r>
             <a:br>
               <a:rPr lang="es-CO" sz="1600" b="1" i="0" u="none" strike="noStrike" cap="none" dirty="0">
                 <a:solidFill>
@@ -23258,6 +23309,17 @@
 </file>
 
 <file path=customXml/item1.xml><?xml version="1.0" encoding="utf-8"?>
+<p:properties xmlns:p="http://schemas.microsoft.com/office/2006/metadata/properties" xmlns:xsi="http://www.w3.org/2001/XMLSchema-instance" xmlns:pc="http://schemas.microsoft.com/office/infopath/2007/PartnerControls">
+  <documentManagement>
+    <TaxCatchAll xmlns="5d6dac1f-6572-46e6-8ac2-54aa885adc11" xsi:nil="true"/>
+    <lcf76f155ced4ddcb4097134ff3c332f xmlns="7f8eb868-f2a7-49ec-80f2-9ac6732c6161">
+      <Terms xmlns="http://schemas.microsoft.com/office/infopath/2007/PartnerControls"/>
+    </lcf76f155ced4ddcb4097134ff3c332f>
+  </documentManagement>
+</p:properties>
+</file>
+
+<file path=customXml/item2.xml><?xml version="1.0" encoding="utf-8"?>
 <ct:contentTypeSchema xmlns:ct="http://schemas.microsoft.com/office/2006/metadata/contentType" xmlns:ma="http://schemas.microsoft.com/office/2006/metadata/properties/metaAttributes" ct:_="" ma:_="" ma:contentTypeName="Documento" ma:contentTypeID="0x0101009C160BF63992044A99946E4B9FF8A5D5" ma:contentTypeVersion="14" ma:contentTypeDescription="Crear nuevo documento." ma:contentTypeScope="" ma:versionID="de16a2f1483f07f01f664ea99c541bb4">
   <xsd:schema xmlns:xsd="http://www.w3.org/2001/XMLSchema" xmlns:xs="http://www.w3.org/2001/XMLSchema" xmlns:p="http://schemas.microsoft.com/office/2006/metadata/properties" xmlns:ns2="7f8eb868-f2a7-49ec-80f2-9ac6732c6161" xmlns:ns3="5d6dac1f-6572-46e6-8ac2-54aa885adc11" targetNamespace="http://schemas.microsoft.com/office/2006/metadata/properties" ma:root="true" ma:fieldsID="2aeeeaca6a92989f39bea69df05468af" ns2:_="" ns3:_="">
     <xsd:import namespace="7f8eb868-f2a7-49ec-80f2-9ac6732c6161"/>
@@ -23486,17 +23548,6 @@
 </ct:contentTypeSchema>
 </file>
 
-<file path=customXml/item2.xml><?xml version="1.0" encoding="utf-8"?>
-<p:properties xmlns:p="http://schemas.microsoft.com/office/2006/metadata/properties" xmlns:xsi="http://www.w3.org/2001/XMLSchema-instance" xmlns:pc="http://schemas.microsoft.com/office/infopath/2007/PartnerControls">
-  <documentManagement>
-    <TaxCatchAll xmlns="5d6dac1f-6572-46e6-8ac2-54aa885adc11" xsi:nil="true"/>
-    <lcf76f155ced4ddcb4097134ff3c332f xmlns="7f8eb868-f2a7-49ec-80f2-9ac6732c6161">
-      <Terms xmlns="http://schemas.microsoft.com/office/infopath/2007/PartnerControls"/>
-    </lcf76f155ced4ddcb4097134ff3c332f>
-  </documentManagement>
-</p:properties>
-</file>
-
 <file path=customXml/item3.xml><?xml version="1.0" encoding="utf-8"?>
 <?mso-contentType ?>
 <FormTemplates xmlns="http://schemas.microsoft.com/sharepoint/v3/contenttype/forms">
@@ -23507,13 +23558,13 @@
 </file>
 
 <file path=customXml/itemProps1.xml><?xml version="1.0" encoding="utf-8"?>
-<ds:datastoreItem xmlns:ds="http://schemas.openxmlformats.org/officeDocument/2006/customXml" ds:itemID="{FB48A022-90FE-46FD-B6B9-A5517959569C}">
+<ds:datastoreItem xmlns:ds="http://schemas.openxmlformats.org/officeDocument/2006/customXml" ds:itemID="{091B3500-55FD-47A2-B150-4704A4114CB7}">
   <ds:schemaRefs/>
 </ds:datastoreItem>
 </file>
 
 <file path=customXml/itemProps2.xml><?xml version="1.0" encoding="utf-8"?>
-<ds:datastoreItem xmlns:ds="http://schemas.openxmlformats.org/officeDocument/2006/customXml" ds:itemID="{091B3500-55FD-47A2-B150-4704A4114CB7}">
+<ds:datastoreItem xmlns:ds="http://schemas.openxmlformats.org/officeDocument/2006/customXml" ds:itemID="{FB48A022-90FE-46FD-B6B9-A5517959569C}">
   <ds:schemaRefs/>
 </ds:datastoreItem>
 </file>

</xml_diff>

<commit_message>
Docs: se corrigen los objetivos especificos
</commit_message>
<xml_diff>
--- a/Arquitectura de software/L-MACK/SUTENTACION 3B L-MACK.pptx
+++ b/Arquitectura de software/L-MACK/SUTENTACION 3B L-MACK.pptx
@@ -21876,7 +21876,7 @@
         <p:spPr>
           <a:xfrm>
             <a:off x="456235" y="1818181"/>
-            <a:ext cx="11499203" cy="4401205"/>
+            <a:ext cx="11499203" cy="400110"/>
           </a:xfrm>
           <a:prstGeom prst="rect">
             <a:avLst/>
@@ -21888,74 +21888,11 @@
           </a:bodyPr>
           <a:lstStyle/>
           <a:p>
-            <a:r>
-              <a:rPr lang="es-ES" sz="2000" b="1" dirty="0">
-                <a:solidFill>
-                  <a:schemeClr val="tx1"/>
-                </a:solidFill>
-              </a:rPr>
-              <a:t>1. Realizar un levantamiento de información para determinar las condiciones y permisos de acceso a los parqueaderos para los funcionarios de mayor rango.</a:t>
-            </a:r>
-          </a:p>
-          <a:p>
-            <a:r>
-              <a:rPr lang="es-ES" sz="2000" b="1" dirty="0">
-                <a:solidFill>
-                  <a:schemeClr val="tx1"/>
-                </a:solidFill>
-              </a:rPr>
-              <a:t>2. Diseñar una base de datos para almacenar la información de los vehículos y funcionarios autorizados.</a:t>
-            </a:r>
-          </a:p>
-          <a:p>
-            <a:r>
-              <a:rPr lang="es-ES" sz="2000" b="1" dirty="0">
-                <a:solidFill>
-                  <a:schemeClr val="tx1"/>
-                </a:solidFill>
-              </a:rPr>
-              <a:t>3. Desarrollar un sistema de registro y control de acceso para los visitantes y personas que pertenezcan al C.S.F para ingresar al centro.</a:t>
-            </a:r>
-          </a:p>
-          <a:p>
-            <a:r>
-              <a:rPr lang="es-ES" sz="2000" b="1" dirty="0">
-                <a:solidFill>
-                  <a:schemeClr val="tx1"/>
-                </a:solidFill>
-              </a:rPr>
-              <a:t>4. Implementar un sistema de seguridad para proteger la información y prevenir accesos no autorizados.</a:t>
-            </a:r>
-          </a:p>
-          <a:p>
-            <a:r>
-              <a:rPr lang="es-ES" sz="2000" b="1" dirty="0">
-                <a:solidFill>
-                  <a:schemeClr val="tx1"/>
-                </a:solidFill>
-              </a:rPr>
-              <a:t>5. Realizar pruebas y ajustes necesarios para asegurar el funcionamiento correcto del sistema.</a:t>
-            </a:r>
-          </a:p>
-          <a:p>
-            <a:r>
-              <a:rPr lang="es-ES" sz="2000" b="1" dirty="0">
-                <a:solidFill>
-                  <a:schemeClr val="tx1"/>
-                </a:solidFill>
-              </a:rPr>
-              <a:t>6. Realizar un control de tiempos y horarios respecto a los ambientes de formación dentro del centro.</a:t>
-            </a:r>
-          </a:p>
-          <a:p>
-            <a:r>
-              <a:rPr lang="es-ES" sz="2000" b="1" dirty="0">
-                <a:solidFill>
-                  <a:schemeClr val="tx1"/>
-                </a:solidFill>
-              </a:rPr>
-              <a:t>7. Facilitar el trabajo y mejorar los tiempos de los colaboradores al momento de permitir el ingreso o entregar ambientes de formación.</a:t>
-            </a:r>
+            <a:endParaRPr lang="es-ES" sz="2000" b="1" dirty="0">
+              <a:solidFill>
+                <a:schemeClr val="tx1"/>
+              </a:solidFill>
+            </a:endParaRPr>
           </a:p>
         </p:txBody>
       </p:sp>
@@ -21989,6 +21926,337 @@
           </a:prstGeom>
         </p:spPr>
       </p:pic>
+      <p:sp>
+        <p:nvSpPr>
+          <p:cNvPr id="6" name="CuadroTexto 5">
+            <a:extLst>
+              <a:ext uri="{FF2B5EF4-FFF2-40B4-BE49-F238E27FC236}">
+                <a16:creationId xmlns:a16="http://schemas.microsoft.com/office/drawing/2014/main" id="{5A07484F-793D-57A5-BF9D-7163769B012B}"/>
+              </a:ext>
+            </a:extLst>
+          </p:cNvPr>
+          <p:cNvSpPr txBox="1"/>
+          <p:nvPr/>
+        </p:nvSpPr>
+        <p:spPr>
+          <a:xfrm>
+            <a:off x="628650" y="2218291"/>
+            <a:ext cx="10817679" cy="4001095"/>
+          </a:xfrm>
+          <a:prstGeom prst="rect">
+            <a:avLst/>
+          </a:prstGeom>
+          <a:noFill/>
+        </p:spPr>
+        <p:txBody>
+          <a:bodyPr wrap="square" rtlCol="0">
+            <a:spAutoFit/>
+          </a:bodyPr>
+          <a:lstStyle/>
+          <a:p>
+            <a:pPr lvl="0" algn="ctr" eaLnBrk="0" fontAlgn="base" hangingPunct="0">
+              <a:spcBef>
+                <a:spcPct val="0"/>
+              </a:spcBef>
+              <a:spcAft>
+                <a:spcPct val="0"/>
+              </a:spcAft>
+              <a:buClrTx/>
+            </a:pPr>
+            <a:endParaRPr lang="es-MX" altLang="es-MX" sz="2000" dirty="0">
+              <a:solidFill>
+                <a:schemeClr val="tx1"/>
+              </a:solidFill>
+              <a:latin typeface="Arial" panose="020B0604020202020204" pitchFamily="34" charset="0"/>
+            </a:endParaRPr>
+          </a:p>
+          <a:p>
+            <a:pPr lvl="0" algn="ctr" eaLnBrk="0" fontAlgn="base" hangingPunct="0">
+              <a:spcBef>
+                <a:spcPct val="0"/>
+              </a:spcBef>
+              <a:spcAft>
+                <a:spcPct val="0"/>
+              </a:spcAft>
+              <a:buClrTx/>
+              <a:buFontTx/>
+              <a:buAutoNum type="arabicPeriod"/>
+            </a:pPr>
+            <a:r>
+              <a:rPr lang="es-MX" altLang="es-MX" sz="2000" dirty="0">
+                <a:solidFill>
+                  <a:schemeClr val="tx1"/>
+                </a:solidFill>
+                <a:latin typeface="Arial" panose="020B0604020202020204" pitchFamily="34" charset="0"/>
+              </a:rPr>
+              <a:t>Desarrollar un módulo digital para la gestión de minutas que permita llevar un control organizado del uso de los ambientes formativos en el SENA.</a:t>
+            </a:r>
+          </a:p>
+          <a:p>
+            <a:pPr lvl="0" algn="ctr" eaLnBrk="0" fontAlgn="base" hangingPunct="0">
+              <a:spcBef>
+                <a:spcPct val="0"/>
+              </a:spcBef>
+              <a:spcAft>
+                <a:spcPct val="0"/>
+              </a:spcAft>
+              <a:buClrTx/>
+              <a:buFontTx/>
+              <a:buAutoNum type="arabicPeriod"/>
+            </a:pPr>
+            <a:endParaRPr lang="es-MX" altLang="es-MX" sz="2000" dirty="0">
+              <a:solidFill>
+                <a:schemeClr val="tx1"/>
+              </a:solidFill>
+              <a:latin typeface="Arial" panose="020B0604020202020204" pitchFamily="34" charset="0"/>
+            </a:endParaRPr>
+          </a:p>
+          <a:p>
+            <a:pPr lvl="0" algn="ctr" eaLnBrk="0" fontAlgn="base" hangingPunct="0">
+              <a:spcBef>
+                <a:spcPct val="0"/>
+              </a:spcBef>
+              <a:spcAft>
+                <a:spcPct val="0"/>
+              </a:spcAft>
+              <a:buClrTx/>
+              <a:buFontTx/>
+              <a:buAutoNum type="arabicPeriod" startAt="2"/>
+            </a:pPr>
+            <a:r>
+              <a:rPr lang="es-MX" altLang="es-MX" sz="2000" dirty="0">
+                <a:solidFill>
+                  <a:schemeClr val="tx1"/>
+                </a:solidFill>
+                <a:latin typeface="Arial" panose="020B0604020202020204" pitchFamily="34" charset="0"/>
+              </a:rPr>
+              <a:t>Implementar un sistema de registro de asistencia que facilite a los instructores el seguimiento y control de la participación de los aprendices.</a:t>
+            </a:r>
+          </a:p>
+          <a:p>
+            <a:pPr lvl="0" algn="ctr" eaLnBrk="0" fontAlgn="base" hangingPunct="0">
+              <a:spcBef>
+                <a:spcPct val="0"/>
+              </a:spcBef>
+              <a:spcAft>
+                <a:spcPct val="0"/>
+              </a:spcAft>
+              <a:buClrTx/>
+              <a:buFontTx/>
+              <a:buAutoNum type="arabicPeriod" startAt="2"/>
+            </a:pPr>
+            <a:endParaRPr lang="es-MX" altLang="es-MX" sz="2000" dirty="0">
+              <a:solidFill>
+                <a:schemeClr val="tx1"/>
+              </a:solidFill>
+              <a:latin typeface="Arial" panose="020B0604020202020204" pitchFamily="34" charset="0"/>
+            </a:endParaRPr>
+          </a:p>
+          <a:p>
+            <a:pPr lvl="0" algn="ctr" eaLnBrk="0" fontAlgn="base" hangingPunct="0">
+              <a:spcBef>
+                <a:spcPct val="0"/>
+              </a:spcBef>
+              <a:spcAft>
+                <a:spcPct val="0"/>
+              </a:spcAft>
+              <a:buClrTx/>
+              <a:buFontTx/>
+              <a:buAutoNum type="arabicPeriod" startAt="3"/>
+            </a:pPr>
+            <a:r>
+              <a:rPr lang="es-MX" altLang="es-MX" sz="2000" dirty="0">
+                <a:solidFill>
+                  <a:schemeClr val="tx1"/>
+                </a:solidFill>
+                <a:latin typeface="Arial" panose="020B0604020202020204" pitchFamily="34" charset="0"/>
+              </a:rPr>
+              <a:t>Incorporar una funcionalidad para registrar y consultar novedades o incidentes, mejorando la comunicación institucional y la toma de decisiones.</a:t>
+            </a:r>
+          </a:p>
+          <a:p>
+            <a:pPr lvl="0" algn="ctr" eaLnBrk="0" fontAlgn="base" hangingPunct="0">
+              <a:spcBef>
+                <a:spcPct val="0"/>
+              </a:spcBef>
+              <a:spcAft>
+                <a:spcPct val="0"/>
+              </a:spcAft>
+              <a:buClrTx/>
+              <a:buFontTx/>
+              <a:buAutoNum type="arabicPeriod" startAt="3"/>
+            </a:pPr>
+            <a:endParaRPr lang="es-MX" altLang="es-MX" sz="2000" dirty="0">
+              <a:solidFill>
+                <a:schemeClr val="tx1"/>
+              </a:solidFill>
+              <a:latin typeface="Arial" panose="020B0604020202020204" pitchFamily="34" charset="0"/>
+            </a:endParaRPr>
+          </a:p>
+          <a:p>
+            <a:pPr lvl="0" algn="ctr" eaLnBrk="0" fontAlgn="base" hangingPunct="0">
+              <a:spcBef>
+                <a:spcPct val="0"/>
+              </a:spcBef>
+              <a:spcAft>
+                <a:spcPct val="0"/>
+              </a:spcAft>
+              <a:buClrTx/>
+              <a:buFontTx/>
+              <a:buAutoNum type="arabicPeriod" startAt="4"/>
+            </a:pPr>
+            <a:r>
+              <a:rPr lang="es-MX" altLang="es-MX" sz="2000" dirty="0">
+                <a:solidFill>
+                  <a:schemeClr val="tx1"/>
+                </a:solidFill>
+                <a:latin typeface="Arial" panose="020B0604020202020204" pitchFamily="34" charset="0"/>
+              </a:rPr>
+              <a:t>Diseñar una interfaz intuitiva y accesible para todos los actores involucrados, garantizando una experiencia de usuario eficiente y </a:t>
+            </a:r>
+            <a:r>
+              <a:rPr lang="es-MX" altLang="es-MX" sz="2000">
+                <a:solidFill>
+                  <a:schemeClr val="tx1"/>
+                </a:solidFill>
+                <a:latin typeface="Arial" panose="020B0604020202020204" pitchFamily="34" charset="0"/>
+              </a:rPr>
+              <a:t>funcional.</a:t>
+            </a:r>
+            <a:endParaRPr lang="es-MX" altLang="es-MX" sz="2000" dirty="0">
+              <a:solidFill>
+                <a:schemeClr val="tx1"/>
+              </a:solidFill>
+              <a:latin typeface="Arial" panose="020B0604020202020204" pitchFamily="34" charset="0"/>
+            </a:endParaRPr>
+          </a:p>
+          <a:p>
+            <a:endParaRPr lang="es-CO" dirty="0"/>
+          </a:p>
+        </p:txBody>
+      </p:sp>
+      <p:sp>
+        <p:nvSpPr>
+          <p:cNvPr id="9" name="Rectangle 5">
+            <a:extLst>
+              <a:ext uri="{FF2B5EF4-FFF2-40B4-BE49-F238E27FC236}">
+                <a16:creationId xmlns:a16="http://schemas.microsoft.com/office/drawing/2014/main" id="{C8E27B8D-1FF7-FB05-7B6B-E96DD06FE9E7}"/>
+              </a:ext>
+            </a:extLst>
+          </p:cNvPr>
+          <p:cNvSpPr>
+            <a:spLocks noChangeArrowheads="1"/>
+          </p:cNvSpPr>
+          <p:nvPr/>
+        </p:nvSpPr>
+        <p:spPr bwMode="auto">
+          <a:xfrm>
+            <a:off x="0" y="378510"/>
+            <a:ext cx="184731" cy="646331"/>
+          </a:xfrm>
+          <a:prstGeom prst="rect">
+            <a:avLst/>
+          </a:prstGeom>
+          <a:noFill/>
+          <a:ln>
+            <a:noFill/>
+          </a:ln>
+          <a:effectLst/>
+          <a:extLst>
+            <a:ext uri="{909E8E84-426E-40DD-AFC4-6F175D3DCCD1}">
+              <a14:hiddenFill xmlns:a14="http://schemas.microsoft.com/office/drawing/2010/main">
+                <a:solidFill>
+                  <a:schemeClr val="accent1"/>
+                </a:solidFill>
+              </a14:hiddenFill>
+            </a:ext>
+            <a:ext uri="{91240B29-F687-4F45-9708-019B960494DF}">
+              <a14:hiddenLine xmlns:a14="http://schemas.microsoft.com/office/drawing/2010/main" w="9525">
+                <a:solidFill>
+                  <a:schemeClr val="tx1"/>
+                </a:solidFill>
+                <a:miter lim="800000"/>
+                <a:headEnd/>
+                <a:tailEnd/>
+              </a14:hiddenLine>
+            </a:ext>
+            <a:ext uri="{AF507438-7753-43E0-B8FC-AC1667EBCBE1}">
+              <a14:hiddenEffects xmlns:a14="http://schemas.microsoft.com/office/drawing/2010/main">
+                <a:effectLst>
+                  <a:outerShdw dist="35921" dir="2700000" algn="ctr" rotWithShape="0">
+                    <a:schemeClr val="bg2"/>
+                  </a:outerShdw>
+                </a:effectLst>
+              </a14:hiddenEffects>
+            </a:ext>
+          </a:extLst>
+        </p:spPr>
+        <p:txBody>
+          <a:bodyPr vert="horz" wrap="none" lIns="91440" tIns="45720" rIns="91440" bIns="45720" numCol="1" anchor="ctr" anchorCtr="0" compatLnSpc="1">
+            <a:prstTxWarp prst="textNoShape">
+              <a:avLst/>
+            </a:prstTxWarp>
+            <a:spAutoFit/>
+          </a:bodyPr>
+          <a:lstStyle/>
+          <a:p>
+            <a:pPr marL="0" marR="0" lvl="0" indent="0" algn="l" defTabSz="914400" rtl="0" eaLnBrk="0" fontAlgn="base" latinLnBrk="0" hangingPunct="0">
+              <a:lnSpc>
+                <a:spcPct val="100000"/>
+              </a:lnSpc>
+              <a:spcBef>
+                <a:spcPct val="0"/>
+              </a:spcBef>
+              <a:spcAft>
+                <a:spcPct val="0"/>
+              </a:spcAft>
+              <a:buClrTx/>
+              <a:buSzTx/>
+              <a:buFontTx/>
+              <a:buNone/>
+              <a:tabLst/>
+            </a:pPr>
+            <a:endParaRPr kumimoji="0" lang="es-MX" altLang="es-MX" sz="1800" b="1" i="0" u="none" strike="noStrike" cap="none" normalizeH="0" baseline="0" dirty="0">
+              <a:ln>
+                <a:noFill/>
+              </a:ln>
+              <a:solidFill>
+                <a:schemeClr val="tx1"/>
+              </a:solidFill>
+              <a:effectLst/>
+              <a:latin typeface="Arial" panose="020B0604020202020204" pitchFamily="34" charset="0"/>
+            </a:endParaRPr>
+          </a:p>
+          <a:p>
+            <a:pPr marL="0" marR="0" lvl="0" indent="0" algn="l" defTabSz="914400" rtl="0" eaLnBrk="0" fontAlgn="base" latinLnBrk="0" hangingPunct="0">
+              <a:lnSpc>
+                <a:spcPct val="100000"/>
+              </a:lnSpc>
+              <a:spcBef>
+                <a:spcPct val="0"/>
+              </a:spcBef>
+              <a:spcAft>
+                <a:spcPct val="0"/>
+              </a:spcAft>
+              <a:buClrTx/>
+              <a:buSzTx/>
+              <a:buFontTx/>
+              <a:buNone/>
+              <a:tabLst/>
+            </a:pPr>
+            <a:endParaRPr kumimoji="0" lang="es-MX" altLang="es-MX" sz="1800" b="0" i="0" u="none" strike="noStrike" cap="none" normalizeH="0" baseline="0" dirty="0">
+              <a:ln>
+                <a:noFill/>
+              </a:ln>
+              <a:solidFill>
+                <a:schemeClr val="tx1"/>
+              </a:solidFill>
+              <a:effectLst/>
+              <a:latin typeface="Arial" panose="020B0604020202020204" pitchFamily="34" charset="0"/>
+            </a:endParaRPr>
+          </a:p>
+        </p:txBody>
+      </p:sp>
     </p:spTree>
   </p:cSld>
   <p:clrMapOvr>

</xml_diff>

<commit_message>
Docs:se agrega Eel DCU
</commit_message>
<xml_diff>
--- a/Arquitectura de software/L-MACK/SUTENTACION 3B L-MACK.pptx
+++ b/Arquitectura de software/L-MACK/SUTENTACION 3B L-MACK.pptx
@@ -22447,216 +22447,6 @@
           </a:p>
         </p:txBody>
       </p:sp>
-      <p:sp>
-        <p:nvSpPr>
-          <p:cNvPr id="2" name="Rectángulo 1"/>
-          <p:cNvSpPr/>
-          <p:nvPr/>
-        </p:nvSpPr>
-        <p:spPr>
-          <a:xfrm>
-            <a:off x="177421" y="1551562"/>
-            <a:ext cx="12014579" cy="3970318"/>
-          </a:xfrm>
-          <a:prstGeom prst="rect">
-            <a:avLst/>
-          </a:prstGeom>
-        </p:spPr>
-        <p:txBody>
-          <a:bodyPr wrap="square">
-            <a:spAutoFit/>
-          </a:bodyPr>
-          <a:lstStyle/>
-          <a:p>
-            <a:r>
-              <a:rPr lang="es-ES" i="1" strike="sngStrike" dirty="0"/>
-              <a:t>El sistema de gestión de parqueaderos para el SENA podría incluir las siguientes características:</a:t>
-            </a:r>
-          </a:p>
-          <a:p>
-            <a:endParaRPr lang="es-ES" strike="sngStrike" dirty="0"/>
-          </a:p>
-          <a:p>
-            <a:pPr marL="285750" indent="-285750">
-              <a:buFontTx/>
-              <a:buChar char="-"/>
-            </a:pPr>
-            <a:r>
-              <a:rPr lang="es-ES" b="1" strike="sngStrike" dirty="0"/>
-              <a:t>Módulo de registro:</a:t>
-            </a:r>
-            <a:r>
-              <a:rPr lang="es-ES" strike="sngStrike" dirty="0"/>
-              <a:t> permitirá registrar la información de los vehículos y personas autorizadas, incluyendo placas (si ingresa en </a:t>
-            </a:r>
-            <a:r>
-              <a:rPr lang="es-ES" strike="sngStrike" dirty="0" err="1"/>
-              <a:t>vehiculo</a:t>
-            </a:r>
-            <a:r>
-              <a:rPr lang="es-ES" strike="sngStrike" dirty="0"/>
-              <a:t>), nombres, cargos y permisos de acceso.</a:t>
-            </a:r>
-          </a:p>
-          <a:p>
-            <a:pPr marL="285750" indent="-285750">
-              <a:buFontTx/>
-              <a:buChar char="-"/>
-            </a:pPr>
-            <a:r>
-              <a:rPr lang="es-ES" b="1" strike="sngStrike" dirty="0"/>
-              <a:t>Módulo de control de acceso</a:t>
-            </a:r>
-            <a:r>
-              <a:rPr lang="es-ES" strike="sngStrike" dirty="0"/>
-              <a:t>: permitirá controlar el acceso de vehículos a los parqueaderos y a los usuarios y visitantes al centro, registrando la fecha y hora de entrada y salida.</a:t>
-            </a:r>
-          </a:p>
-          <a:p>
-            <a:pPr marL="285750" indent="-285750">
-              <a:buFontTx/>
-              <a:buChar char="-"/>
-            </a:pPr>
-            <a:r>
-              <a:rPr lang="es-ES" b="1" strike="sngStrike" dirty="0"/>
-              <a:t> Módulo de seguridad: </a:t>
-            </a:r>
-            <a:r>
-              <a:rPr lang="es-ES" strike="sngStrike" dirty="0"/>
-              <a:t>permitirá proteger la información y prevenir accesos no autorizados, utilizando mecanismos de autenticación y autorización.</a:t>
-            </a:r>
-          </a:p>
-          <a:p>
-            <a:pPr marL="285750" indent="-285750">
-              <a:buFontTx/>
-              <a:buChar char="-"/>
-            </a:pPr>
-            <a:r>
-              <a:rPr lang="es-ES" b="1" strike="sngStrike" dirty="0"/>
-              <a:t>Módulo de reportes: </a:t>
-            </a:r>
-            <a:r>
-              <a:rPr lang="es-ES" strike="sngStrike" dirty="0"/>
-              <a:t>permitirá generar reportes sobre el uso de los parqueaderos, incluyendo información sobre los vehículos que ingresan y salen, y los funcionarios que acceden a los parqueaderos.</a:t>
-            </a:r>
-          </a:p>
-          <a:p>
-            <a:pPr marL="285750" indent="-285750">
-              <a:buFontTx/>
-              <a:buChar char="-"/>
-            </a:pPr>
-            <a:endParaRPr lang="es-ES" strike="sngStrike" dirty="0"/>
-          </a:p>
-          <a:p>
-            <a:pPr marL="285750" indent="-285750">
-              <a:buFontTx/>
-              <a:buChar char="-"/>
-            </a:pPr>
-            <a:r>
-              <a:rPr lang="es-ES" i="1" strike="sngStrike" dirty="0"/>
-              <a:t>El sistema podría ser desarrollado utilizando tecnologías como:</a:t>
-            </a:r>
-          </a:p>
-          <a:p>
-            <a:pPr marL="285750" indent="-285750">
-              <a:buFontTx/>
-              <a:buChar char="-"/>
-            </a:pPr>
-            <a:endParaRPr lang="es-ES" strike="sngStrike" dirty="0"/>
-          </a:p>
-          <a:p>
-            <a:pPr marL="285750" indent="-285750">
-              <a:buFontTx/>
-              <a:buChar char="-"/>
-            </a:pPr>
-            <a:r>
-              <a:rPr lang="es-ES" b="1" strike="sngStrike" dirty="0"/>
-              <a:t> Base de datos</a:t>
-            </a:r>
-            <a:r>
-              <a:rPr lang="es-ES" strike="sngStrike" dirty="0"/>
-              <a:t>: </a:t>
-            </a:r>
-            <a:r>
-              <a:rPr lang="es-ES" strike="sngStrike" dirty="0" err="1"/>
-              <a:t>MySQL</a:t>
-            </a:r>
-            <a:r>
-              <a:rPr lang="es-ES" strike="sngStrike" dirty="0"/>
-              <a:t> o </a:t>
-            </a:r>
-            <a:r>
-              <a:rPr lang="es-ES" strike="sngStrike" dirty="0" err="1"/>
-              <a:t>PostgreSQL</a:t>
-            </a:r>
-            <a:r>
-              <a:rPr lang="es-ES" strike="sngStrike" dirty="0"/>
-              <a:t> para almacenar la información de los vehículos y funcionarios.</a:t>
-            </a:r>
-          </a:p>
-          <a:p>
-            <a:pPr marL="285750" indent="-285750">
-              <a:buFontTx/>
-              <a:buChar char="-"/>
-            </a:pPr>
-            <a:r>
-              <a:rPr lang="es-ES" strike="sngStrike" dirty="0"/>
-              <a:t> </a:t>
-            </a:r>
-            <a:r>
-              <a:rPr lang="es-ES" b="1" strike="sngStrike" dirty="0"/>
-              <a:t>Lenguaje de programación: </a:t>
-            </a:r>
-            <a:r>
-              <a:rPr lang="es-ES" strike="sngStrike" dirty="0" err="1"/>
-              <a:t>Python</a:t>
-            </a:r>
-            <a:r>
-              <a:rPr lang="es-ES" strike="sngStrike" dirty="0"/>
-              <a:t> o Java para desarrollar el sistema de registro y control de acceso.</a:t>
-            </a:r>
-          </a:p>
-          <a:p>
-            <a:pPr marL="285750" indent="-285750">
-              <a:buFontTx/>
-              <a:buChar char="-"/>
-            </a:pPr>
-            <a:r>
-              <a:rPr lang="es-ES" strike="sngStrike" dirty="0"/>
-              <a:t> </a:t>
-            </a:r>
-            <a:r>
-              <a:rPr lang="es-ES" b="1" strike="sngStrike" dirty="0"/>
-              <a:t>Framework:</a:t>
-            </a:r>
-            <a:r>
-              <a:rPr lang="es-ES" strike="sngStrike" dirty="0"/>
-              <a:t> Django o Spring para desarrollar el sistema de manera rápida y segura.</a:t>
-            </a:r>
-          </a:p>
-          <a:p>
-            <a:pPr marL="285750" indent="-285750">
-              <a:buFontTx/>
-              <a:buChar char="-"/>
-            </a:pPr>
-            <a:r>
-              <a:rPr lang="es-ES" b="1" strike="sngStrike" dirty="0"/>
-              <a:t> Interfaz de usuario: </a:t>
-            </a:r>
-            <a:r>
-              <a:rPr lang="es-ES" strike="sngStrike" dirty="0"/>
-              <a:t>HTML, CSS y JavaScript para crear una interfaz de usuario amigable y fácil de usar.</a:t>
-            </a:r>
-          </a:p>
-          <a:p>
-            <a:pPr marL="285750" indent="-285750">
-              <a:buFontTx/>
-              <a:buChar char="-"/>
-            </a:pPr>
-            <a:endParaRPr lang="es-ES" dirty="0"/>
-          </a:p>
-        </p:txBody>
-      </p:sp>
       <p:pic>
         <p:nvPicPr>
           <p:cNvPr id="3" name="Picture 2">
@@ -22810,6 +22600,37 @@
           <a:xfrm>
             <a:off x="133939" y="110481"/>
             <a:ext cx="2390775" cy="1064444"/>
+          </a:xfrm>
+          <a:prstGeom prst="rect">
+            <a:avLst/>
+          </a:prstGeom>
+        </p:spPr>
+      </p:pic>
+      <p:pic>
+        <p:nvPicPr>
+          <p:cNvPr id="4" name="Imagen 3">
+            <a:extLst>
+              <a:ext uri="{FF2B5EF4-FFF2-40B4-BE49-F238E27FC236}">
+                <a16:creationId xmlns:a16="http://schemas.microsoft.com/office/drawing/2014/main" id="{2F19CB81-AC85-54C6-B9F3-E696DBFBE3D1}"/>
+              </a:ext>
+            </a:extLst>
+          </p:cNvPr>
+          <p:cNvPicPr>
+            <a:picLocks noChangeAspect="1"/>
+          </p:cNvPicPr>
+          <p:nvPr/>
+        </p:nvPicPr>
+        <p:blipFill>
+          <a:blip r:embed="rId4"/>
+          <a:srcRect l="2529" t="4535" r="-63" b="12071"/>
+          <a:stretch>
+            <a:fillRect/>
+          </a:stretch>
+        </p:blipFill>
+        <p:spPr>
+          <a:xfrm>
+            <a:off x="1737360" y="1965960"/>
+            <a:ext cx="7178040" cy="4053840"/>
           </a:xfrm>
           <a:prstGeom prst="rect">
             <a:avLst/>
@@ -23755,15 +23576,6 @@
 </file>
 
 <file path=customXml/item2.xml><?xml version="1.0" encoding="utf-8"?>
-<?mso-contentType ?>
-<FormTemplates xmlns="http://schemas.microsoft.com/sharepoint/v3/contenttype/forms">
-  <Display>DocumentLibraryForm</Display>
-  <Edit>DocumentLibraryForm</Edit>
-  <New>DocumentLibraryForm</New>
-</FormTemplates>
-</file>
-
-<file path=customXml/item3.xml><?xml version="1.0" encoding="utf-8"?>
 <p:properties xmlns:p="http://schemas.microsoft.com/office/2006/metadata/properties" xmlns:xsi="http://www.w3.org/2001/XMLSchema-instance" xmlns:pc="http://schemas.microsoft.com/office/infopath/2007/PartnerControls">
   <documentManagement>
     <TaxCatchAll xmlns="5d6dac1f-6572-46e6-8ac2-54aa885adc11" xsi:nil="true"/>
@@ -23774,6 +23586,15 @@
 </p:properties>
 </file>
 
+<file path=customXml/item3.xml><?xml version="1.0" encoding="utf-8"?>
+<?mso-contentType ?>
+<FormTemplates xmlns="http://schemas.microsoft.com/sharepoint/v3/contenttype/forms">
+  <Display>DocumentLibraryForm</Display>
+  <Edit>DocumentLibraryForm</Edit>
+  <New>DocumentLibraryForm</New>
+</FormTemplates>
+</file>
+
 <file path=customXml/itemProps1.xml><?xml version="1.0" encoding="utf-8"?>
 <ds:datastoreItem xmlns:ds="http://schemas.openxmlformats.org/officeDocument/2006/customXml" ds:itemID="{FB48A022-90FE-46FD-B6B9-A5517959569C}">
   <ds:schemaRefs/>
@@ -23781,13 +23602,13 @@
 </file>
 
 <file path=customXml/itemProps2.xml><?xml version="1.0" encoding="utf-8"?>
-<ds:datastoreItem xmlns:ds="http://schemas.openxmlformats.org/officeDocument/2006/customXml" ds:itemID="{C020FF02-1FE7-4B92-A947-88F847DE8F80}">
+<ds:datastoreItem xmlns:ds="http://schemas.openxmlformats.org/officeDocument/2006/customXml" ds:itemID="{091B3500-55FD-47A2-B150-4704A4114CB7}">
   <ds:schemaRefs/>
 </ds:datastoreItem>
 </file>
 
 <file path=customXml/itemProps3.xml><?xml version="1.0" encoding="utf-8"?>
-<ds:datastoreItem xmlns:ds="http://schemas.openxmlformats.org/officeDocument/2006/customXml" ds:itemID="{091B3500-55FD-47A2-B150-4704A4114CB7}">
+<ds:datastoreItem xmlns:ds="http://schemas.openxmlformats.org/officeDocument/2006/customXml" ds:itemID="{C020FF02-1FE7-4B92-A947-88F847DE8F80}">
   <ds:schemaRefs/>
 </ds:datastoreItem>
 </file>
</xml_diff>

<commit_message>
pptx: cambio de imagen DCU
</commit_message>
<xml_diff>
--- a/Arquitectura de software/L-MACK/SUTENTACION 3B L-MACK.pptx
+++ b/Arquitectura de software/L-MACK/SUTENTACION 3B L-MACK.pptx
@@ -33,11 +33,18 @@
   <p:notesSz cx="6858000" cy="9144000"/>
   <p:embeddedFontLst>
     <p:embeddedFont>
-      <p:font typeface="Work Sans Light" pitchFamily="2" charset="0"/>
+      <p:font typeface="Work Sans Light" panose="020B0604020202020204" charset="0"/>
       <p:regular r:id="rId26"/>
       <p:bold r:id="rId27"/>
       <p:italic r:id="rId28"/>
       <p:boldItalic r:id="rId29"/>
+    </p:embeddedFont>
+    <p:embeddedFont>
+      <p:font typeface="Calibri" panose="020F0502020204030204" pitchFamily="34" charset="0"/>
+      <p:regular r:id="rId30"/>
+      <p:bold r:id="rId31"/>
+      <p:italic r:id="rId32"/>
+      <p:boldItalic r:id="rId33"/>
     </p:embeddedFont>
   </p:embeddedFontLst>
   <p:defaultTextStyle>
@@ -19355,6 +19362,18 @@
               <a:buFont typeface="Arial" panose="020B0604020202020204"/>
               <a:buNone/>
             </a:pPr>
+            <a:r>
+              <a:rPr lang="es-CO" sz="1600" b="1" i="0" u="none" strike="noStrike" cap="none" dirty="0">
+                <a:solidFill>
+                  <a:schemeClr val="dk1"/>
+                </a:solidFill>
+                <a:latin typeface="Calibri" panose="020F0502020204030204"/>
+                <a:ea typeface="Calibri" panose="020F0502020204030204"/>
+                <a:cs typeface="Calibri" panose="020F0502020204030204"/>
+                <a:sym typeface="Calibri" panose="020F0502020204030204"/>
+              </a:rPr>
+              <a:t/>
+            </a:r>
             <a:br>
               <a:rPr lang="es-CO" sz="1600" b="1" i="0" u="none" strike="noStrike" cap="none" dirty="0">
                 <a:solidFill>
@@ -20573,6 +20592,18 @@
               <a:buFont typeface="Arial" panose="020B0604020202020204"/>
               <a:buNone/>
             </a:pPr>
+            <a:r>
+              <a:rPr lang="es-CO" sz="1600" b="1" i="0" u="none" strike="noStrike" cap="none" dirty="0">
+                <a:solidFill>
+                  <a:schemeClr val="dk1"/>
+                </a:solidFill>
+                <a:latin typeface="Calibri" panose="020F0502020204030204"/>
+                <a:ea typeface="Calibri" panose="020F0502020204030204"/>
+                <a:cs typeface="Calibri" panose="020F0502020204030204"/>
+                <a:sym typeface="Calibri" panose="020F0502020204030204"/>
+              </a:rPr>
+              <a:t/>
+            </a:r>
             <a:br>
               <a:rPr lang="es-CO" sz="1600" b="1" i="0" u="none" strike="noStrike" cap="none" dirty="0">
                 <a:solidFill>
@@ -22424,6 +22455,18 @@
               <a:buFont typeface="Arial" panose="020B0604020202020204"/>
               <a:buNone/>
             </a:pPr>
+            <a:r>
+              <a:rPr lang="es-CO" sz="1600" b="1" i="0" u="none" strike="noStrike" cap="none" dirty="0">
+                <a:solidFill>
+                  <a:schemeClr val="dk1"/>
+                </a:solidFill>
+                <a:latin typeface="Calibri" panose="020F0502020204030204"/>
+                <a:ea typeface="Calibri" panose="020F0502020204030204"/>
+                <a:cs typeface="Calibri" panose="020F0502020204030204"/>
+                <a:sym typeface="Calibri" panose="020F0502020204030204"/>
+              </a:rPr>
+              <a:t/>
+            </a:r>
             <a:br>
               <a:rPr lang="es-CO" sz="1600" b="1" i="0" u="none" strike="noStrike" cap="none" dirty="0">
                 <a:solidFill>
@@ -22608,29 +22651,27 @@
       </p:pic>
       <p:pic>
         <p:nvPicPr>
-          <p:cNvPr id="4" name="Imagen 3">
-            <a:extLst>
-              <a:ext uri="{FF2B5EF4-FFF2-40B4-BE49-F238E27FC236}">
-                <a16:creationId xmlns:a16="http://schemas.microsoft.com/office/drawing/2014/main" id="{2F19CB81-AC85-54C6-B9F3-E696DBFBE3D1}"/>
-              </a:ext>
-            </a:extLst>
-          </p:cNvPr>
+          <p:cNvPr id="3" name="Imagen 2"/>
           <p:cNvPicPr>
             <a:picLocks noChangeAspect="1"/>
           </p:cNvPicPr>
           <p:nvPr/>
         </p:nvPicPr>
-        <p:blipFill>
-          <a:blip r:embed="rId4"/>
-          <a:srcRect l="2529" t="4535" r="-63" b="12071"/>
-          <a:stretch>
-            <a:fillRect/>
-          </a:stretch>
+        <p:blipFill rotWithShape="1">
+          <a:blip r:embed="rId4">
+            <a:extLst>
+              <a:ext uri="{28A0092B-C50C-407E-A947-70E740481C1C}">
+                <a14:useLocalDpi xmlns:a14="http://schemas.microsoft.com/office/drawing/2010/main" val="0"/>
+              </a:ext>
+            </a:extLst>
+          </a:blip>
+          <a:srcRect t="2507" b="8686"/>
+          <a:stretch/>
         </p:blipFill>
         <p:spPr>
           <a:xfrm>
-            <a:off x="1737360" y="1965960"/>
-            <a:ext cx="7178040" cy="4053840"/>
+            <a:off x="3645780" y="1740665"/>
+            <a:ext cx="4119783" cy="4505899"/>
           </a:xfrm>
           <a:prstGeom prst="rect">
             <a:avLst/>
@@ -23347,6 +23388,17 @@
 </file>
 
 <file path=customXml/item1.xml><?xml version="1.0" encoding="utf-8"?>
+<p:properties xmlns:p="http://schemas.microsoft.com/office/2006/metadata/properties" xmlns:xsi="http://www.w3.org/2001/XMLSchema-instance" xmlns:pc="http://schemas.microsoft.com/office/infopath/2007/PartnerControls">
+  <documentManagement>
+    <TaxCatchAll xmlns="5d6dac1f-6572-46e6-8ac2-54aa885adc11" xsi:nil="true"/>
+    <lcf76f155ced4ddcb4097134ff3c332f xmlns="7f8eb868-f2a7-49ec-80f2-9ac6732c6161">
+      <Terms xmlns="http://schemas.microsoft.com/office/infopath/2007/PartnerControls"/>
+    </lcf76f155ced4ddcb4097134ff3c332f>
+  </documentManagement>
+</p:properties>
+</file>
+
+<file path=customXml/item2.xml><?xml version="1.0" encoding="utf-8"?>
 <ct:contentTypeSchema xmlns:ct="http://schemas.microsoft.com/office/2006/metadata/contentType" xmlns:ma="http://schemas.microsoft.com/office/2006/metadata/properties/metaAttributes" ct:_="" ma:_="" ma:contentTypeName="Documento" ma:contentTypeID="0x0101009C160BF63992044A99946E4B9FF8A5D5" ma:contentTypeVersion="14" ma:contentTypeDescription="Crear nuevo documento." ma:contentTypeScope="" ma:versionID="de16a2f1483f07f01f664ea99c541bb4">
   <xsd:schema xmlns:xsd="http://www.w3.org/2001/XMLSchema" xmlns:xs="http://www.w3.org/2001/XMLSchema" xmlns:p="http://schemas.microsoft.com/office/2006/metadata/properties" xmlns:ns2="7f8eb868-f2a7-49ec-80f2-9ac6732c6161" xmlns:ns3="5d6dac1f-6572-46e6-8ac2-54aa885adc11" targetNamespace="http://schemas.microsoft.com/office/2006/metadata/properties" ma:root="true" ma:fieldsID="2aeeeaca6a92989f39bea69df05468af" ns2:_="" ns3:_="">
     <xsd:import namespace="7f8eb868-f2a7-49ec-80f2-9ac6732c6161"/>
@@ -23575,17 +23627,6 @@
 </ct:contentTypeSchema>
 </file>
 
-<file path=customXml/item2.xml><?xml version="1.0" encoding="utf-8"?>
-<p:properties xmlns:p="http://schemas.microsoft.com/office/2006/metadata/properties" xmlns:xsi="http://www.w3.org/2001/XMLSchema-instance" xmlns:pc="http://schemas.microsoft.com/office/infopath/2007/PartnerControls">
-  <documentManagement>
-    <TaxCatchAll xmlns="5d6dac1f-6572-46e6-8ac2-54aa885adc11" xsi:nil="true"/>
-    <lcf76f155ced4ddcb4097134ff3c332f xmlns="7f8eb868-f2a7-49ec-80f2-9ac6732c6161">
-      <Terms xmlns="http://schemas.microsoft.com/office/infopath/2007/PartnerControls"/>
-    </lcf76f155ced4ddcb4097134ff3c332f>
-  </documentManagement>
-</p:properties>
-</file>
-
 <file path=customXml/item3.xml><?xml version="1.0" encoding="utf-8"?>
 <?mso-contentType ?>
 <FormTemplates xmlns="http://schemas.microsoft.com/sharepoint/v3/contenttype/forms">
@@ -23596,13 +23637,13 @@
 </file>
 
 <file path=customXml/itemProps1.xml><?xml version="1.0" encoding="utf-8"?>
-<ds:datastoreItem xmlns:ds="http://schemas.openxmlformats.org/officeDocument/2006/customXml" ds:itemID="{FB48A022-90FE-46FD-B6B9-A5517959569C}">
+<ds:datastoreItem xmlns:ds="http://schemas.openxmlformats.org/officeDocument/2006/customXml" ds:itemID="{091B3500-55FD-47A2-B150-4704A4114CB7}">
   <ds:schemaRefs/>
 </ds:datastoreItem>
 </file>
 
 <file path=customXml/itemProps2.xml><?xml version="1.0" encoding="utf-8"?>
-<ds:datastoreItem xmlns:ds="http://schemas.openxmlformats.org/officeDocument/2006/customXml" ds:itemID="{091B3500-55FD-47A2-B150-4704A4114CB7}">
+<ds:datastoreItem xmlns:ds="http://schemas.openxmlformats.org/officeDocument/2006/customXml" ds:itemID="{FB48A022-90FE-46FD-B6B9-A5517959569C}">
   <ds:schemaRefs/>
 </ds:datastoreItem>
 </file>

</xml_diff>

<commit_message>
file: se añadio nueva informacion
</commit_message>
<xml_diff>
--- a/Arquitectura de software/L-MACK/SUTENTACION 3B L-MACK.pptx
+++ b/Arquitectura de software/L-MACK/SUTENTACION 3B L-MACK.pptx
@@ -33,14 +33,14 @@
   <p:notesSz cx="6858000" cy="9144000"/>
   <p:embeddedFontLst>
     <p:embeddedFont>
-      <p:font typeface="Work Sans Light" panose="020B0604020202020204" charset="0"/>
+      <p:font typeface="Calibri" panose="020F0502020204030204" pitchFamily="34" charset="0"/>
       <p:regular r:id="rId26"/>
       <p:bold r:id="rId27"/>
       <p:italic r:id="rId28"/>
       <p:boldItalic r:id="rId29"/>
     </p:embeddedFont>
     <p:embeddedFont>
-      <p:font typeface="Calibri" panose="020F0502020204030204" pitchFamily="34" charset="0"/>
+      <p:font typeface="Work Sans Light" panose="020B0604020202020204" charset="0"/>
       <p:regular r:id="rId30"/>
       <p:bold r:id="rId31"/>
       <p:italic r:id="rId32"/>
@@ -18784,209 +18784,6 @@
           </a:p>
         </p:txBody>
       </p:sp>
-      <p:sp>
-        <p:nvSpPr>
-          <p:cNvPr id="3" name="Google Shape;121;p15"/>
-          <p:cNvSpPr txBox="1"/>
-          <p:nvPr/>
-        </p:nvSpPr>
-        <p:spPr>
-          <a:xfrm>
-            <a:off x="188661" y="1712508"/>
-            <a:ext cx="7342094" cy="2585283"/>
-          </a:xfrm>
-          <a:prstGeom prst="rect">
-            <a:avLst/>
-          </a:prstGeom>
-          <a:noFill/>
-          <a:ln>
-            <a:noFill/>
-          </a:ln>
-        </p:spPr>
-        <p:txBody>
-          <a:bodyPr spcFirstLastPara="1" wrap="square" lIns="91425" tIns="45700" rIns="91425" bIns="45700" anchor="t" anchorCtr="0">
-            <a:spAutoFit/>
-          </a:bodyPr>
-          <a:lstStyle/>
-          <a:p>
-            <a:pPr lvl="0"/>
-            <a:r>
-              <a:rPr lang="es-ES" sz="1800" b="1" dirty="0">
-                <a:solidFill>
-                  <a:schemeClr val="dk1"/>
-                </a:solidFill>
-                <a:latin typeface="Calibri" panose="020F0502020204030204"/>
-                <a:ea typeface="Calibri" panose="020F0502020204030204"/>
-                <a:cs typeface="Calibri" panose="020F0502020204030204"/>
-                <a:sym typeface="Calibri" panose="020F0502020204030204"/>
-              </a:rPr>
-              <a:t>Componente: </a:t>
-            </a:r>
-            <a:r>
-              <a:rPr lang="es-ES" sz="1800" dirty="0">
-                <a:solidFill>
-                  <a:schemeClr val="dk1"/>
-                </a:solidFill>
-                <a:latin typeface="Calibri" panose="020F0502020204030204"/>
-                <a:ea typeface="Calibri" panose="020F0502020204030204"/>
-                <a:cs typeface="Calibri" panose="020F0502020204030204"/>
-                <a:sym typeface="Calibri" panose="020F0502020204030204"/>
-              </a:rPr>
-              <a:t>Interfaz de Usuario</a:t>
-            </a:r>
-          </a:p>
-          <a:p>
-            <a:pPr lvl="0"/>
-            <a:r>
-              <a:rPr lang="es-ES" sz="1800" dirty="0">
-                <a:solidFill>
-                  <a:schemeClr val="dk1"/>
-                </a:solidFill>
-                <a:latin typeface="Calibri" panose="020F0502020204030204"/>
-                <a:ea typeface="Calibri" panose="020F0502020204030204"/>
-                <a:cs typeface="Calibri" panose="020F0502020204030204"/>
-                <a:sym typeface="Calibri" panose="020F0502020204030204"/>
-              </a:rPr>
-              <a:t>-permite a los usuarios interactuar con el sistema</a:t>
-            </a:r>
-          </a:p>
-          <a:p>
-            <a:pPr lvl="0"/>
-            <a:r>
-              <a:rPr lang="es-ES" sz="1800" b="1" dirty="0">
-                <a:solidFill>
-                  <a:schemeClr val="dk1"/>
-                </a:solidFill>
-                <a:latin typeface="Calibri" panose="020F0502020204030204"/>
-                <a:ea typeface="Calibri" panose="020F0502020204030204"/>
-                <a:cs typeface="Calibri" panose="020F0502020204030204"/>
-                <a:sym typeface="Calibri" panose="020F0502020204030204"/>
-              </a:rPr>
-              <a:t>Componente: </a:t>
-            </a:r>
-            <a:r>
-              <a:rPr lang="es-ES" sz="1800" dirty="0">
-                <a:solidFill>
-                  <a:schemeClr val="dk1"/>
-                </a:solidFill>
-                <a:latin typeface="Calibri" panose="020F0502020204030204"/>
-                <a:ea typeface="Calibri" panose="020F0502020204030204"/>
-                <a:cs typeface="Calibri" panose="020F0502020204030204"/>
-                <a:sym typeface="Calibri" panose="020F0502020204030204"/>
-              </a:rPr>
-              <a:t>Lógica de Negocio</a:t>
-            </a:r>
-          </a:p>
-          <a:p>
-            <a:pPr lvl="0"/>
-            <a:r>
-              <a:rPr lang="es-ES" sz="1800" dirty="0">
-                <a:solidFill>
-                  <a:schemeClr val="dk1"/>
-                </a:solidFill>
-                <a:latin typeface="Calibri" panose="020F0502020204030204"/>
-                <a:ea typeface="Calibri" panose="020F0502020204030204"/>
-                <a:cs typeface="Calibri" panose="020F0502020204030204"/>
-                <a:sym typeface="Calibri" panose="020F0502020204030204"/>
-              </a:rPr>
-              <a:t>-contiene la lógica para registrar vehículos, verificar autorizaciones, registrar entradas y salidas, etc.</a:t>
-            </a:r>
-          </a:p>
-          <a:p>
-            <a:pPr lvl="0"/>
-            <a:r>
-              <a:rPr lang="es-ES" sz="1800" b="1" dirty="0">
-                <a:solidFill>
-                  <a:schemeClr val="dk1"/>
-                </a:solidFill>
-                <a:latin typeface="Calibri" panose="020F0502020204030204"/>
-                <a:ea typeface="Calibri" panose="020F0502020204030204"/>
-                <a:cs typeface="Calibri" panose="020F0502020204030204"/>
-                <a:sym typeface="Calibri" panose="020F0502020204030204"/>
-              </a:rPr>
-              <a:t>Componente: </a:t>
-            </a:r>
-            <a:r>
-              <a:rPr lang="es-ES" sz="1800" dirty="0">
-                <a:solidFill>
-                  <a:schemeClr val="dk1"/>
-                </a:solidFill>
-                <a:latin typeface="Calibri" panose="020F0502020204030204"/>
-                <a:ea typeface="Calibri" panose="020F0502020204030204"/>
-                <a:cs typeface="Calibri" panose="020F0502020204030204"/>
-                <a:sym typeface="Calibri" panose="020F0502020204030204"/>
-              </a:rPr>
-              <a:t>Base de Datos</a:t>
-            </a:r>
-          </a:p>
-          <a:p>
-            <a:pPr lvl="0"/>
-            <a:r>
-              <a:rPr lang="es-ES" sz="1800" dirty="0">
-                <a:solidFill>
-                  <a:schemeClr val="dk1"/>
-                </a:solidFill>
-                <a:latin typeface="Calibri" panose="020F0502020204030204"/>
-                <a:ea typeface="Calibri" panose="020F0502020204030204"/>
-                <a:cs typeface="Calibri" panose="020F0502020204030204"/>
-                <a:sym typeface="Calibri" panose="020F0502020204030204"/>
-              </a:rPr>
-              <a:t>-almacena la información de los vehículos, usuarios, parqueaderos, etc.</a:t>
-            </a:r>
-          </a:p>
-          <a:p>
-            <a:pPr lvl="0"/>
-            <a:r>
-              <a:rPr lang="es-ES" sz="1800" b="1" dirty="0">
-                <a:solidFill>
-                  <a:schemeClr val="dk1"/>
-                </a:solidFill>
-                <a:latin typeface="Calibri" panose="020F0502020204030204"/>
-                <a:ea typeface="Calibri" panose="020F0502020204030204"/>
-                <a:cs typeface="Calibri" panose="020F0502020204030204"/>
-                <a:sym typeface="Calibri" panose="020F0502020204030204"/>
-              </a:rPr>
-              <a:t>Componente: </a:t>
-            </a:r>
-            <a:r>
-              <a:rPr lang="es-ES" sz="1800" dirty="0">
-                <a:solidFill>
-                  <a:schemeClr val="dk1"/>
-                </a:solidFill>
-                <a:latin typeface="Calibri" panose="020F0502020204030204"/>
-                <a:ea typeface="Calibri" panose="020F0502020204030204"/>
-                <a:cs typeface="Calibri" panose="020F0502020204030204"/>
-                <a:sym typeface="Calibri" panose="020F0502020204030204"/>
-              </a:rPr>
-              <a:t>Seguridad</a:t>
-            </a:r>
-          </a:p>
-          <a:p>
-            <a:pPr lvl="0"/>
-            <a:r>
-              <a:rPr lang="es-ES" sz="1800" dirty="0">
-                <a:solidFill>
-                  <a:schemeClr val="dk1"/>
-                </a:solidFill>
-                <a:latin typeface="Calibri" panose="020F0502020204030204"/>
-                <a:ea typeface="Calibri" panose="020F0502020204030204"/>
-                <a:cs typeface="Calibri" panose="020F0502020204030204"/>
-                <a:sym typeface="Calibri" panose="020F0502020204030204"/>
-              </a:rPr>
-              <a:t>-se encarga de la autenticación y autorización de los usuarios</a:t>
-            </a:r>
-            <a:endParaRPr sz="1800" dirty="0">
-              <a:solidFill>
-                <a:schemeClr val="dk1"/>
-              </a:solidFill>
-              <a:latin typeface="Calibri" panose="020F0502020204030204"/>
-              <a:ea typeface="Calibri" panose="020F0502020204030204"/>
-              <a:cs typeface="Calibri" panose="020F0502020204030204"/>
-              <a:sym typeface="Calibri" panose="020F0502020204030204"/>
-            </a:endParaRPr>
-          </a:p>
-        </p:txBody>
-      </p:sp>
       <p:pic>
         <p:nvPicPr>
           <p:cNvPr id="2" name="Picture 1">
@@ -19011,6 +18808,34 @@
           <a:xfrm>
             <a:off x="133939" y="110481"/>
             <a:ext cx="2390775" cy="1064444"/>
+          </a:xfrm>
+          <a:prstGeom prst="rect">
+            <a:avLst/>
+          </a:prstGeom>
+        </p:spPr>
+      </p:pic>
+      <p:pic>
+        <p:nvPicPr>
+          <p:cNvPr id="5" name="Imagen 4"/>
+          <p:cNvPicPr/>
+          <p:nvPr/>
+        </p:nvPicPr>
+        <p:blipFill>
+          <a:blip r:embed="rId4">
+            <a:extLst>
+              <a:ext uri="{28A0092B-C50C-407E-A947-70E740481C1C}">
+                <a14:useLocalDpi xmlns:a14="http://schemas.microsoft.com/office/drawing/2010/main" val="0"/>
+              </a:ext>
+            </a:extLst>
+          </a:blip>
+          <a:stretch>
+            <a:fillRect/>
+          </a:stretch>
+        </p:blipFill>
+        <p:spPr>
+          <a:xfrm>
+            <a:off x="2524714" y="1821560"/>
+            <a:ext cx="7859089" cy="4553649"/>
           </a:xfrm>
           <a:prstGeom prst="rect">
             <a:avLst/>
@@ -19193,13 +19018,7 @@
       </p:pic>
       <p:pic>
         <p:nvPicPr>
-          <p:cNvPr id="6" name="Picture 5">
-            <a:extLst>
-              <a:ext uri="{FF2B5EF4-FFF2-40B4-BE49-F238E27FC236}">
-                <a16:creationId xmlns:a16="http://schemas.microsoft.com/office/drawing/2014/main" id="{0E1FCF6B-FCF3-5225-8E5C-B852C09F247A}"/>
-              </a:ext>
-            </a:extLst>
-          </p:cNvPr>
+          <p:cNvPr id="4" name="Imagen 3"/>
           <p:cNvPicPr>
             <a:picLocks noChangeAspect="1"/>
           </p:cNvPicPr>
@@ -19213,8 +19032,8 @@
         </p:blipFill>
         <p:spPr>
           <a:xfrm>
-            <a:off x="1238080" y="1615087"/>
-            <a:ext cx="8780787" cy="5132432"/>
+            <a:off x="1800179" y="1529659"/>
+            <a:ext cx="9271772" cy="4881110"/>
           </a:xfrm>
           <a:prstGeom prst="rect">
             <a:avLst/>
@@ -19488,64 +19307,6 @@
           </a:p>
         </p:txBody>
       </p:sp>
-      <p:sp>
-        <p:nvSpPr>
-          <p:cNvPr id="3" name="Google Shape;121;p15"/>
-          <p:cNvSpPr txBox="1"/>
-          <p:nvPr/>
-        </p:nvSpPr>
-        <p:spPr>
-          <a:xfrm>
-            <a:off x="1075765" y="2435839"/>
-            <a:ext cx="7342094" cy="369332"/>
-          </a:xfrm>
-          <a:prstGeom prst="rect">
-            <a:avLst/>
-          </a:prstGeom>
-          <a:noFill/>
-          <a:ln>
-            <a:noFill/>
-          </a:ln>
-        </p:spPr>
-        <p:txBody>
-          <a:bodyPr spcFirstLastPara="1" wrap="square" lIns="91425" tIns="45700" rIns="91425" bIns="45700" anchor="t" anchorCtr="0">
-            <a:spAutoFit/>
-          </a:bodyPr>
-          <a:lstStyle/>
-          <a:p>
-            <a:pPr marL="0" marR="0" lvl="0" indent="0" algn="l" rtl="0">
-              <a:spcBef>
-                <a:spcPts val="0"/>
-              </a:spcBef>
-              <a:spcAft>
-                <a:spcPts val="0"/>
-              </a:spcAft>
-              <a:buNone/>
-            </a:pPr>
-            <a:r>
-              <a:rPr lang="es-ES" sz="1800" dirty="0">
-                <a:solidFill>
-                  <a:schemeClr val="dk1"/>
-                </a:solidFill>
-                <a:latin typeface="Calibri" panose="020F0502020204030204"/>
-                <a:ea typeface="Calibri" panose="020F0502020204030204"/>
-                <a:cs typeface="Calibri" panose="020F0502020204030204"/>
-                <a:sym typeface="Calibri" panose="020F0502020204030204"/>
-              </a:rPr>
-              <a:t>Insertar imagen diagrama del Modelo Relacional</a:t>
-            </a:r>
-            <a:endParaRPr sz="1800" dirty="0">
-              <a:solidFill>
-                <a:schemeClr val="dk1"/>
-              </a:solidFill>
-              <a:latin typeface="Calibri" panose="020F0502020204030204"/>
-              <a:ea typeface="Calibri" panose="020F0502020204030204"/>
-              <a:cs typeface="Calibri" panose="020F0502020204030204"/>
-              <a:sym typeface="Calibri" panose="020F0502020204030204"/>
-            </a:endParaRPr>
-          </a:p>
-        </p:txBody>
-      </p:sp>
       <p:pic>
         <p:nvPicPr>
           <p:cNvPr id="4" name="Picture 3">
@@ -19570,6 +19331,30 @@
           <a:xfrm>
             <a:off x="133939" y="110481"/>
             <a:ext cx="2390775" cy="1064444"/>
+          </a:xfrm>
+          <a:prstGeom prst="rect">
+            <a:avLst/>
+          </a:prstGeom>
+        </p:spPr>
+      </p:pic>
+      <p:pic>
+        <p:nvPicPr>
+          <p:cNvPr id="2" name="Imagen 1"/>
+          <p:cNvPicPr>
+            <a:picLocks noChangeAspect="1"/>
+          </p:cNvPicPr>
+          <p:nvPr/>
+        </p:nvPicPr>
+        <p:blipFill>
+          <a:blip r:embed="rId4"/>
+          <a:stretch>
+            <a:fillRect/>
+          </a:stretch>
+        </p:blipFill>
+        <p:spPr>
+          <a:xfrm>
+            <a:off x="2793508" y="1712843"/>
+            <a:ext cx="6108121" cy="4696958"/>
           </a:xfrm>
           <a:prstGeom prst="rect">
             <a:avLst/>
@@ -23388,17 +23173,6 @@
 </file>
 
 <file path=customXml/item1.xml><?xml version="1.0" encoding="utf-8"?>
-<p:properties xmlns:p="http://schemas.microsoft.com/office/2006/metadata/properties" xmlns:xsi="http://www.w3.org/2001/XMLSchema-instance" xmlns:pc="http://schemas.microsoft.com/office/infopath/2007/PartnerControls">
-  <documentManagement>
-    <TaxCatchAll xmlns="5d6dac1f-6572-46e6-8ac2-54aa885adc11" xsi:nil="true"/>
-    <lcf76f155ced4ddcb4097134ff3c332f xmlns="7f8eb868-f2a7-49ec-80f2-9ac6732c6161">
-      <Terms xmlns="http://schemas.microsoft.com/office/infopath/2007/PartnerControls"/>
-    </lcf76f155ced4ddcb4097134ff3c332f>
-  </documentManagement>
-</p:properties>
-</file>
-
-<file path=customXml/item2.xml><?xml version="1.0" encoding="utf-8"?>
 <ct:contentTypeSchema xmlns:ct="http://schemas.microsoft.com/office/2006/metadata/contentType" xmlns:ma="http://schemas.microsoft.com/office/2006/metadata/properties/metaAttributes" ct:_="" ma:_="" ma:contentTypeName="Documento" ma:contentTypeID="0x0101009C160BF63992044A99946E4B9FF8A5D5" ma:contentTypeVersion="14" ma:contentTypeDescription="Crear nuevo documento." ma:contentTypeScope="" ma:versionID="de16a2f1483f07f01f664ea99c541bb4">
   <xsd:schema xmlns:xsd="http://www.w3.org/2001/XMLSchema" xmlns:xs="http://www.w3.org/2001/XMLSchema" xmlns:p="http://schemas.microsoft.com/office/2006/metadata/properties" xmlns:ns2="7f8eb868-f2a7-49ec-80f2-9ac6732c6161" xmlns:ns3="5d6dac1f-6572-46e6-8ac2-54aa885adc11" targetNamespace="http://schemas.microsoft.com/office/2006/metadata/properties" ma:root="true" ma:fieldsID="2aeeeaca6a92989f39bea69df05468af" ns2:_="" ns3:_="">
     <xsd:import namespace="7f8eb868-f2a7-49ec-80f2-9ac6732c6161"/>
@@ -23627,6 +23401,17 @@
 </ct:contentTypeSchema>
 </file>
 
+<file path=customXml/item2.xml><?xml version="1.0" encoding="utf-8"?>
+<p:properties xmlns:p="http://schemas.microsoft.com/office/2006/metadata/properties" xmlns:xsi="http://www.w3.org/2001/XMLSchema-instance" xmlns:pc="http://schemas.microsoft.com/office/infopath/2007/PartnerControls">
+  <documentManagement>
+    <TaxCatchAll xmlns="5d6dac1f-6572-46e6-8ac2-54aa885adc11" xsi:nil="true"/>
+    <lcf76f155ced4ddcb4097134ff3c332f xmlns="7f8eb868-f2a7-49ec-80f2-9ac6732c6161">
+      <Terms xmlns="http://schemas.microsoft.com/office/infopath/2007/PartnerControls"/>
+    </lcf76f155ced4ddcb4097134ff3c332f>
+  </documentManagement>
+</p:properties>
+</file>
+
 <file path=customXml/item3.xml><?xml version="1.0" encoding="utf-8"?>
 <?mso-contentType ?>
 <FormTemplates xmlns="http://schemas.microsoft.com/sharepoint/v3/contenttype/forms">
@@ -23637,13 +23422,13 @@
 </file>
 
 <file path=customXml/itemProps1.xml><?xml version="1.0" encoding="utf-8"?>
-<ds:datastoreItem xmlns:ds="http://schemas.openxmlformats.org/officeDocument/2006/customXml" ds:itemID="{091B3500-55FD-47A2-B150-4704A4114CB7}">
+<ds:datastoreItem xmlns:ds="http://schemas.openxmlformats.org/officeDocument/2006/customXml" ds:itemID="{FB48A022-90FE-46FD-B6B9-A5517959569C}">
   <ds:schemaRefs/>
 </ds:datastoreItem>
 </file>
 
 <file path=customXml/itemProps2.xml><?xml version="1.0" encoding="utf-8"?>
-<ds:datastoreItem xmlns:ds="http://schemas.openxmlformats.org/officeDocument/2006/customXml" ds:itemID="{FB48A022-90FE-46FD-B6B9-A5517959569C}">
+<ds:datastoreItem xmlns:ds="http://schemas.openxmlformats.org/officeDocument/2006/customXml" ds:itemID="{091B3500-55FD-47A2-B150-4704A4114CB7}">
   <ds:schemaRefs/>
 </ds:datastoreItem>
 </file>

</xml_diff>

<commit_message>
doc: se realiza modificaciones al archivo
</commit_message>
<xml_diff>
--- a/Arquitectura de software/L-MACK/SUTENTACION 3B L-MACK.pptx
+++ b/Arquitectura de software/L-MACK/SUTENTACION 3B L-MACK.pptx
@@ -33,18 +33,11 @@
   <p:notesSz cx="6858000" cy="9144000"/>
   <p:embeddedFontLst>
     <p:embeddedFont>
-      <p:font typeface="Calibri" panose="020F0502020204030204" pitchFamily="34" charset="0"/>
+      <p:font typeface="Work Sans Light" pitchFamily="2" charset="0"/>
       <p:regular r:id="rId26"/>
       <p:bold r:id="rId27"/>
       <p:italic r:id="rId28"/>
       <p:boldItalic r:id="rId29"/>
-    </p:embeddedFont>
-    <p:embeddedFont>
-      <p:font typeface="Work Sans Light" panose="020B0604020202020204" charset="0"/>
-      <p:regular r:id="rId30"/>
-      <p:bold r:id="rId31"/>
-      <p:italic r:id="rId32"/>
-      <p:boldItalic r:id="rId33"/>
     </p:embeddedFont>
   </p:embeddedFontLst>
   <p:defaultTextStyle>
@@ -19181,18 +19174,6 @@
               <a:buFont typeface="Arial" panose="020B0604020202020204"/>
               <a:buNone/>
             </a:pPr>
-            <a:r>
-              <a:rPr lang="es-CO" sz="1600" b="1" i="0" u="none" strike="noStrike" cap="none" dirty="0">
-                <a:solidFill>
-                  <a:schemeClr val="dk1"/>
-                </a:solidFill>
-                <a:latin typeface="Calibri" panose="020F0502020204030204"/>
-                <a:ea typeface="Calibri" panose="020F0502020204030204"/>
-                <a:cs typeface="Calibri" panose="020F0502020204030204"/>
-                <a:sym typeface="Calibri" panose="020F0502020204030204"/>
-              </a:rPr>
-              <a:t/>
-            </a:r>
             <a:br>
               <a:rPr lang="es-CO" sz="1600" b="1" i="0" u="none" strike="noStrike" cap="none" dirty="0">
                 <a:solidFill>
@@ -19460,64 +19441,6 @@
           </a:p>
         </p:txBody>
       </p:sp>
-      <p:sp>
-        <p:nvSpPr>
-          <p:cNvPr id="4" name="Google Shape;121;p15"/>
-          <p:cNvSpPr txBox="1"/>
-          <p:nvPr/>
-        </p:nvSpPr>
-        <p:spPr>
-          <a:xfrm>
-            <a:off x="1075765" y="2435839"/>
-            <a:ext cx="7342094" cy="369332"/>
-          </a:xfrm>
-          <a:prstGeom prst="rect">
-            <a:avLst/>
-          </a:prstGeom>
-          <a:noFill/>
-          <a:ln>
-            <a:noFill/>
-          </a:ln>
-        </p:spPr>
-        <p:txBody>
-          <a:bodyPr spcFirstLastPara="1" wrap="square" lIns="91425" tIns="45700" rIns="91425" bIns="45700" anchor="t" anchorCtr="0">
-            <a:spAutoFit/>
-          </a:bodyPr>
-          <a:lstStyle/>
-          <a:p>
-            <a:pPr marL="0" marR="0" lvl="0" indent="0" algn="l" rtl="0">
-              <a:spcBef>
-                <a:spcPts val="0"/>
-              </a:spcBef>
-              <a:spcAft>
-                <a:spcPts val="0"/>
-              </a:spcAft>
-              <a:buNone/>
-            </a:pPr>
-            <a:r>
-              <a:rPr lang="es-ES" sz="1800" dirty="0">
-                <a:solidFill>
-                  <a:schemeClr val="dk1"/>
-                </a:solidFill>
-                <a:latin typeface="Calibri" panose="020F0502020204030204"/>
-                <a:ea typeface="Calibri" panose="020F0502020204030204"/>
-                <a:cs typeface="Calibri" panose="020F0502020204030204"/>
-                <a:sym typeface="Calibri" panose="020F0502020204030204"/>
-              </a:rPr>
-              <a:t>Insertar imagen de las principales consultas a una tabla y ejecución</a:t>
-            </a:r>
-            <a:endParaRPr sz="1800" dirty="0">
-              <a:solidFill>
-                <a:schemeClr val="dk1"/>
-              </a:solidFill>
-              <a:latin typeface="Calibri" panose="020F0502020204030204"/>
-              <a:ea typeface="Calibri" panose="020F0502020204030204"/>
-              <a:cs typeface="Calibri" panose="020F0502020204030204"/>
-              <a:sym typeface="Calibri" panose="020F0502020204030204"/>
-            </a:endParaRPr>
-          </a:p>
-        </p:txBody>
-      </p:sp>
       <p:pic>
         <p:nvPicPr>
           <p:cNvPr id="2" name="Picture 1">
@@ -19542,6 +19465,198 @@
           <a:xfrm>
             <a:off x="133939" y="110481"/>
             <a:ext cx="2390775" cy="1064444"/>
+          </a:xfrm>
+          <a:prstGeom prst="rect">
+            <a:avLst/>
+          </a:prstGeom>
+        </p:spPr>
+      </p:pic>
+      <p:cxnSp>
+        <p:nvCxnSpPr>
+          <p:cNvPr id="7" name="Conector recto 6">
+            <a:extLst>
+              <a:ext uri="{FF2B5EF4-FFF2-40B4-BE49-F238E27FC236}">
+                <a16:creationId xmlns:a16="http://schemas.microsoft.com/office/drawing/2014/main" id="{0A382CB9-433D-CFD0-9656-522C80410C3A}"/>
+              </a:ext>
+            </a:extLst>
+          </p:cNvPr>
+          <p:cNvCxnSpPr/>
+          <p:nvPr/>
+        </p:nvCxnSpPr>
+        <p:spPr>
+          <a:xfrm>
+            <a:off x="242888" y="3829050"/>
+            <a:ext cx="11730037" cy="0"/>
+          </a:xfrm>
+          <a:prstGeom prst="line">
+            <a:avLst/>
+          </a:prstGeom>
+        </p:spPr>
+        <p:style>
+          <a:lnRef idx="1">
+            <a:schemeClr val="accent1"/>
+          </a:lnRef>
+          <a:fillRef idx="0">
+            <a:schemeClr val="accent1"/>
+          </a:fillRef>
+          <a:effectRef idx="0">
+            <a:schemeClr val="accent1"/>
+          </a:effectRef>
+          <a:fontRef idx="minor">
+            <a:schemeClr val="tx1"/>
+          </a:fontRef>
+        </p:style>
+      </p:cxnSp>
+      <p:cxnSp>
+        <p:nvCxnSpPr>
+          <p:cNvPr id="11" name="Conector recto 10">
+            <a:extLst>
+              <a:ext uri="{FF2B5EF4-FFF2-40B4-BE49-F238E27FC236}">
+                <a16:creationId xmlns:a16="http://schemas.microsoft.com/office/drawing/2014/main" id="{F015D5E6-366B-7FDE-4A02-E7A93620EE09}"/>
+              </a:ext>
+            </a:extLst>
+          </p:cNvPr>
+          <p:cNvCxnSpPr/>
+          <p:nvPr/>
+        </p:nvCxnSpPr>
+        <p:spPr>
+          <a:xfrm>
+            <a:off x="6300786" y="1714500"/>
+            <a:ext cx="0" cy="4929188"/>
+          </a:xfrm>
+          <a:prstGeom prst="line">
+            <a:avLst/>
+          </a:prstGeom>
+        </p:spPr>
+        <p:style>
+          <a:lnRef idx="1">
+            <a:schemeClr val="accent1"/>
+          </a:lnRef>
+          <a:fillRef idx="0">
+            <a:schemeClr val="accent1"/>
+          </a:fillRef>
+          <a:effectRef idx="0">
+            <a:schemeClr val="accent1"/>
+          </a:effectRef>
+          <a:fontRef idx="minor">
+            <a:schemeClr val="tx1"/>
+          </a:fontRef>
+        </p:style>
+      </p:cxnSp>
+      <p:pic>
+        <p:nvPicPr>
+          <p:cNvPr id="13" name="Imagen 12">
+            <a:extLst>
+              <a:ext uri="{FF2B5EF4-FFF2-40B4-BE49-F238E27FC236}">
+                <a16:creationId xmlns:a16="http://schemas.microsoft.com/office/drawing/2014/main" id="{D3EB645E-AF94-FB4D-C9D7-F365960646B6}"/>
+              </a:ext>
+            </a:extLst>
+          </p:cNvPr>
+          <p:cNvPicPr>
+            <a:picLocks noChangeAspect="1"/>
+          </p:cNvPicPr>
+          <p:nvPr/>
+        </p:nvPicPr>
+        <p:blipFill>
+          <a:blip r:embed="rId4"/>
+          <a:stretch>
+            <a:fillRect/>
+          </a:stretch>
+        </p:blipFill>
+        <p:spPr>
+          <a:xfrm>
+            <a:off x="488069" y="4329236"/>
+            <a:ext cx="5458587" cy="1581371"/>
+          </a:xfrm>
+          <a:prstGeom prst="rect">
+            <a:avLst/>
+          </a:prstGeom>
+        </p:spPr>
+      </p:pic>
+      <p:pic>
+        <p:nvPicPr>
+          <p:cNvPr id="15" name="Imagen 14">
+            <a:extLst>
+              <a:ext uri="{FF2B5EF4-FFF2-40B4-BE49-F238E27FC236}">
+                <a16:creationId xmlns:a16="http://schemas.microsoft.com/office/drawing/2014/main" id="{CD0D1FA8-8F2E-2108-B523-BFF0D41BF07E}"/>
+              </a:ext>
+            </a:extLst>
+          </p:cNvPr>
+          <p:cNvPicPr>
+            <a:picLocks noChangeAspect="1"/>
+          </p:cNvPicPr>
+          <p:nvPr/>
+        </p:nvPicPr>
+        <p:blipFill>
+          <a:blip r:embed="rId5"/>
+          <a:stretch>
+            <a:fillRect/>
+          </a:stretch>
+        </p:blipFill>
+        <p:spPr>
+          <a:xfrm>
+            <a:off x="6869318" y="2146704"/>
+            <a:ext cx="4887007" cy="971686"/>
+          </a:xfrm>
+          <a:prstGeom prst="rect">
+            <a:avLst/>
+          </a:prstGeom>
+        </p:spPr>
+      </p:pic>
+      <p:pic>
+        <p:nvPicPr>
+          <p:cNvPr id="19" name="Imagen 18">
+            <a:extLst>
+              <a:ext uri="{FF2B5EF4-FFF2-40B4-BE49-F238E27FC236}">
+                <a16:creationId xmlns:a16="http://schemas.microsoft.com/office/drawing/2014/main" id="{7524FF55-9C69-892C-B9FB-072CCF224E48}"/>
+              </a:ext>
+            </a:extLst>
+          </p:cNvPr>
+          <p:cNvPicPr>
+            <a:picLocks noChangeAspect="1"/>
+          </p:cNvPicPr>
+          <p:nvPr/>
+        </p:nvPicPr>
+        <p:blipFill>
+          <a:blip r:embed="rId6"/>
+          <a:stretch>
+            <a:fillRect/>
+          </a:stretch>
+        </p:blipFill>
+        <p:spPr>
+          <a:xfrm>
+            <a:off x="533018" y="2020971"/>
+            <a:ext cx="5477639" cy="1286054"/>
+          </a:xfrm>
+          <a:prstGeom prst="rect">
+            <a:avLst/>
+          </a:prstGeom>
+        </p:spPr>
+      </p:pic>
+      <p:pic>
+        <p:nvPicPr>
+          <p:cNvPr id="21" name="Imagen 20">
+            <a:extLst>
+              <a:ext uri="{FF2B5EF4-FFF2-40B4-BE49-F238E27FC236}">
+                <a16:creationId xmlns:a16="http://schemas.microsoft.com/office/drawing/2014/main" id="{EC0DE956-9BBE-5205-A956-DAA1899E0BFE}"/>
+              </a:ext>
+            </a:extLst>
+          </p:cNvPr>
+          <p:cNvPicPr>
+            <a:picLocks noChangeAspect="1"/>
+          </p:cNvPicPr>
+          <p:nvPr/>
+        </p:nvPicPr>
+        <p:blipFill>
+          <a:blip r:embed="rId7"/>
+          <a:stretch>
+            <a:fillRect/>
+          </a:stretch>
+        </p:blipFill>
+        <p:spPr>
+          <a:xfrm>
+            <a:off x="6921714" y="4329236"/>
+            <a:ext cx="4782217" cy="676369"/>
           </a:xfrm>
           <a:prstGeom prst="rect">
             <a:avLst/>
@@ -19675,64 +19790,6 @@
           </a:p>
         </p:txBody>
       </p:sp>
-      <p:sp>
-        <p:nvSpPr>
-          <p:cNvPr id="4" name="Google Shape;121;p15"/>
-          <p:cNvSpPr txBox="1"/>
-          <p:nvPr/>
-        </p:nvSpPr>
-        <p:spPr>
-          <a:xfrm>
-            <a:off x="1075764" y="2435839"/>
-            <a:ext cx="9081247" cy="369291"/>
-          </a:xfrm>
-          <a:prstGeom prst="rect">
-            <a:avLst/>
-          </a:prstGeom>
-          <a:noFill/>
-          <a:ln>
-            <a:noFill/>
-          </a:ln>
-        </p:spPr>
-        <p:txBody>
-          <a:bodyPr spcFirstLastPara="1" wrap="square" lIns="91425" tIns="45700" rIns="91425" bIns="45700" anchor="t" anchorCtr="0">
-            <a:spAutoFit/>
-          </a:bodyPr>
-          <a:lstStyle/>
-          <a:p>
-            <a:pPr marL="0" marR="0" lvl="0" indent="0" algn="l" rtl="0">
-              <a:spcBef>
-                <a:spcPts val="0"/>
-              </a:spcBef>
-              <a:spcAft>
-                <a:spcPts val="0"/>
-              </a:spcAft>
-              <a:buNone/>
-            </a:pPr>
-            <a:r>
-              <a:rPr lang="es-ES" sz="1800" dirty="0">
-                <a:solidFill>
-                  <a:schemeClr val="dk1"/>
-                </a:solidFill>
-                <a:latin typeface="Calibri" panose="020F0502020204030204"/>
-                <a:ea typeface="Calibri" panose="020F0502020204030204"/>
-                <a:cs typeface="Calibri" panose="020F0502020204030204"/>
-                <a:sym typeface="Calibri" panose="020F0502020204030204"/>
-              </a:rPr>
-              <a:t>Insertar imagen de las principales procedimientos almacenados y/o funciones y ejecución</a:t>
-            </a:r>
-            <a:endParaRPr sz="1800" dirty="0">
-              <a:solidFill>
-                <a:schemeClr val="dk1"/>
-              </a:solidFill>
-              <a:latin typeface="Calibri" panose="020F0502020204030204"/>
-              <a:ea typeface="Calibri" panose="020F0502020204030204"/>
-              <a:cs typeface="Calibri" panose="020F0502020204030204"/>
-              <a:sym typeface="Calibri" panose="020F0502020204030204"/>
-            </a:endParaRPr>
-          </a:p>
-        </p:txBody>
-      </p:sp>
       <p:pic>
         <p:nvPicPr>
           <p:cNvPr id="3" name="Picture 2">
@@ -19757,6 +19814,228 @@
           <a:xfrm>
             <a:off x="133939" y="110481"/>
             <a:ext cx="2390775" cy="1064444"/>
+          </a:xfrm>
+          <a:prstGeom prst="rect">
+            <a:avLst/>
+          </a:prstGeom>
+        </p:spPr>
+      </p:pic>
+      <p:cxnSp>
+        <p:nvCxnSpPr>
+          <p:cNvPr id="5" name="Conector recto 4">
+            <a:extLst>
+              <a:ext uri="{FF2B5EF4-FFF2-40B4-BE49-F238E27FC236}">
+                <a16:creationId xmlns:a16="http://schemas.microsoft.com/office/drawing/2014/main" id="{48080314-C3D8-0DC6-F775-D92B7692A6AD}"/>
+              </a:ext>
+            </a:extLst>
+          </p:cNvPr>
+          <p:cNvCxnSpPr/>
+          <p:nvPr/>
+        </p:nvCxnSpPr>
+        <p:spPr>
+          <a:xfrm>
+            <a:off x="242888" y="3829050"/>
+            <a:ext cx="11730037" cy="0"/>
+          </a:xfrm>
+          <a:prstGeom prst="line">
+            <a:avLst/>
+          </a:prstGeom>
+        </p:spPr>
+        <p:style>
+          <a:lnRef idx="1">
+            <a:schemeClr val="accent1"/>
+          </a:lnRef>
+          <a:fillRef idx="0">
+            <a:schemeClr val="accent1"/>
+          </a:fillRef>
+          <a:effectRef idx="0">
+            <a:schemeClr val="accent1"/>
+          </a:effectRef>
+          <a:fontRef idx="minor">
+            <a:schemeClr val="tx1"/>
+          </a:fontRef>
+        </p:style>
+      </p:cxnSp>
+      <p:cxnSp>
+        <p:nvCxnSpPr>
+          <p:cNvPr id="6" name="Conector recto 5">
+            <a:extLst>
+              <a:ext uri="{FF2B5EF4-FFF2-40B4-BE49-F238E27FC236}">
+                <a16:creationId xmlns:a16="http://schemas.microsoft.com/office/drawing/2014/main" id="{9D91463D-6210-03EC-8AE4-CB2CED857FB5}"/>
+              </a:ext>
+            </a:extLst>
+          </p:cNvPr>
+          <p:cNvCxnSpPr/>
+          <p:nvPr/>
+        </p:nvCxnSpPr>
+        <p:spPr>
+          <a:xfrm>
+            <a:off x="6300786" y="1714500"/>
+            <a:ext cx="0" cy="4929188"/>
+          </a:xfrm>
+          <a:prstGeom prst="line">
+            <a:avLst/>
+          </a:prstGeom>
+        </p:spPr>
+        <p:style>
+          <a:lnRef idx="1">
+            <a:schemeClr val="accent1"/>
+          </a:lnRef>
+          <a:fillRef idx="0">
+            <a:schemeClr val="accent1"/>
+          </a:fillRef>
+          <a:effectRef idx="0">
+            <a:schemeClr val="accent1"/>
+          </a:effectRef>
+          <a:fontRef idx="minor">
+            <a:schemeClr val="tx1"/>
+          </a:fontRef>
+        </p:style>
+      </p:cxnSp>
+      <p:pic>
+        <p:nvPicPr>
+          <p:cNvPr id="8" name="Imagen 7">
+            <a:extLst>
+              <a:ext uri="{FF2B5EF4-FFF2-40B4-BE49-F238E27FC236}">
+                <a16:creationId xmlns:a16="http://schemas.microsoft.com/office/drawing/2014/main" id="{05DA7F6A-E2DB-AD7E-9EC1-E9EDCA01ABAF}"/>
+              </a:ext>
+            </a:extLst>
+          </p:cNvPr>
+          <p:cNvPicPr>
+            <a:picLocks noChangeAspect="1"/>
+          </p:cNvPicPr>
+          <p:nvPr/>
+        </p:nvPicPr>
+        <p:blipFill>
+          <a:blip r:embed="rId4"/>
+          <a:stretch>
+            <a:fillRect/>
+          </a:stretch>
+        </p:blipFill>
+        <p:spPr>
+          <a:xfrm>
+            <a:off x="242887" y="1641411"/>
+            <a:ext cx="5651087" cy="1941478"/>
+          </a:xfrm>
+          <a:prstGeom prst="rect">
+            <a:avLst/>
+          </a:prstGeom>
+        </p:spPr>
+      </p:pic>
+      <p:pic>
+        <p:nvPicPr>
+          <p:cNvPr id="10" name="Imagen 9">
+            <a:extLst>
+              <a:ext uri="{FF2B5EF4-FFF2-40B4-BE49-F238E27FC236}">
+                <a16:creationId xmlns:a16="http://schemas.microsoft.com/office/drawing/2014/main" id="{E17B395A-2143-D3A2-597D-46779264084C}"/>
+              </a:ext>
+            </a:extLst>
+          </p:cNvPr>
+          <p:cNvPicPr>
+            <a:picLocks noChangeAspect="1"/>
+          </p:cNvPicPr>
+          <p:nvPr/>
+        </p:nvPicPr>
+        <p:blipFill>
+          <a:blip r:embed="rId5"/>
+          <a:stretch>
+            <a:fillRect/>
+          </a:stretch>
+        </p:blipFill>
+        <p:spPr>
+          <a:xfrm>
+            <a:off x="358286" y="4075212"/>
+            <a:ext cx="5620534" cy="2229161"/>
+          </a:xfrm>
+          <a:prstGeom prst="rect">
+            <a:avLst/>
+          </a:prstGeom>
+        </p:spPr>
+      </p:pic>
+      <p:pic>
+        <p:nvPicPr>
+          <p:cNvPr id="11" name="Imagen 10">
+            <a:extLst>
+              <a:ext uri="{FF2B5EF4-FFF2-40B4-BE49-F238E27FC236}">
+                <a16:creationId xmlns:a16="http://schemas.microsoft.com/office/drawing/2014/main" id="{45ED8CA9-B613-1412-13F9-B35E5E8B170E}"/>
+              </a:ext>
+            </a:extLst>
+          </p:cNvPr>
+          <p:cNvPicPr>
+            <a:picLocks noChangeAspect="1"/>
+          </p:cNvPicPr>
+          <p:nvPr/>
+        </p:nvPicPr>
+        <p:blipFill>
+          <a:blip r:embed="rId6"/>
+          <a:stretch>
+            <a:fillRect/>
+          </a:stretch>
+        </p:blipFill>
+        <p:spPr>
+          <a:xfrm>
+            <a:off x="6388393" y="2193221"/>
+            <a:ext cx="5612130" cy="578554"/>
+          </a:xfrm>
+          <a:prstGeom prst="rect">
+            <a:avLst/>
+          </a:prstGeom>
+        </p:spPr>
+      </p:pic>
+      <p:pic>
+        <p:nvPicPr>
+          <p:cNvPr id="12" name="Imagen 11">
+            <a:extLst>
+              <a:ext uri="{FF2B5EF4-FFF2-40B4-BE49-F238E27FC236}">
+                <a16:creationId xmlns:a16="http://schemas.microsoft.com/office/drawing/2014/main" id="{5EB696E6-E843-7E9B-0D32-7F91023A31DA}"/>
+              </a:ext>
+            </a:extLst>
+          </p:cNvPr>
+          <p:cNvPicPr>
+            <a:picLocks noChangeAspect="1"/>
+          </p:cNvPicPr>
+          <p:nvPr/>
+        </p:nvPicPr>
+        <p:blipFill>
+          <a:blip r:embed="rId7"/>
+          <a:stretch>
+            <a:fillRect/>
+          </a:stretch>
+        </p:blipFill>
+        <p:spPr>
+          <a:xfrm>
+            <a:off x="6448401" y="3930650"/>
+            <a:ext cx="5612130" cy="1478915"/>
+          </a:xfrm>
+          <a:prstGeom prst="rect">
+            <a:avLst/>
+          </a:prstGeom>
+        </p:spPr>
+      </p:pic>
+      <p:pic>
+        <p:nvPicPr>
+          <p:cNvPr id="13" name="Imagen 12">
+            <a:extLst>
+              <a:ext uri="{FF2B5EF4-FFF2-40B4-BE49-F238E27FC236}">
+                <a16:creationId xmlns:a16="http://schemas.microsoft.com/office/drawing/2014/main" id="{E9A81D55-556F-79C1-FEAC-E874C81D416D}"/>
+              </a:ext>
+            </a:extLst>
+          </p:cNvPr>
+          <p:cNvPicPr>
+            <a:picLocks noChangeAspect="1"/>
+          </p:cNvPicPr>
+          <p:nvPr/>
+        </p:nvPicPr>
+        <p:blipFill>
+          <a:blip r:embed="rId8"/>
+          <a:stretch>
+            <a:fillRect/>
+          </a:stretch>
+        </p:blipFill>
+        <p:spPr>
+          <a:xfrm>
+            <a:off x="6462915" y="5685248"/>
+            <a:ext cx="2219325" cy="619125"/>
           </a:xfrm>
           <a:prstGeom prst="rect">
             <a:avLst/>
@@ -19862,221 +20141,6 @@
           </a:p>
         </p:txBody>
       </p:sp>
-      <p:sp>
-        <p:nvSpPr>
-          <p:cNvPr id="4" name="Google Shape;121;p15"/>
-          <p:cNvSpPr txBox="1"/>
-          <p:nvPr/>
-        </p:nvSpPr>
-        <p:spPr>
-          <a:xfrm>
-            <a:off x="1075765" y="2435839"/>
-            <a:ext cx="7342094" cy="2031285"/>
-          </a:xfrm>
-          <a:prstGeom prst="rect">
-            <a:avLst/>
-          </a:prstGeom>
-          <a:noFill/>
-          <a:ln>
-            <a:noFill/>
-          </a:ln>
-        </p:spPr>
-        <p:txBody>
-          <a:bodyPr spcFirstLastPara="1" wrap="square" lIns="91425" tIns="45700" rIns="91425" bIns="45700" anchor="t" anchorCtr="0">
-            <a:spAutoFit/>
-          </a:bodyPr>
-          <a:lstStyle/>
-          <a:p>
-            <a:pPr marL="285750" lvl="0" indent="-285750">
-              <a:buFontTx/>
-              <a:buChar char="-"/>
-            </a:pPr>
-            <a:r>
-              <a:rPr lang="es-ES" sz="1800" dirty="0">
-                <a:solidFill>
-                  <a:schemeClr val="dk1"/>
-                </a:solidFill>
-                <a:latin typeface="Calibri" panose="020F0502020204030204"/>
-                <a:ea typeface="Calibri" panose="020F0502020204030204"/>
-                <a:cs typeface="Calibri" panose="020F0502020204030204"/>
-                <a:sym typeface="Calibri" panose="020F0502020204030204"/>
-              </a:rPr>
-              <a:t>Rol: </a:t>
-            </a:r>
-            <a:r>
-              <a:rPr lang="es-ES" sz="1800" b="1" dirty="0">
-                <a:solidFill>
-                  <a:schemeClr val="dk1"/>
-                </a:solidFill>
-                <a:latin typeface="Calibri" panose="020F0502020204030204"/>
-                <a:ea typeface="Calibri" panose="020F0502020204030204"/>
-                <a:cs typeface="Calibri" panose="020F0502020204030204"/>
-                <a:sym typeface="Calibri" panose="020F0502020204030204"/>
-              </a:rPr>
-              <a:t>Administrador</a:t>
-            </a:r>
-            <a:r>
-              <a:rPr lang="es-ES" sz="1800" dirty="0">
-                <a:solidFill>
-                  <a:schemeClr val="dk1"/>
-                </a:solidFill>
-                <a:latin typeface="Calibri" panose="020F0502020204030204"/>
-                <a:ea typeface="Calibri" panose="020F0502020204030204"/>
-                <a:cs typeface="Calibri" panose="020F0502020204030204"/>
-                <a:sym typeface="Calibri" panose="020F0502020204030204"/>
-              </a:rPr>
-              <a:t>- Permisos: asignar permisos, revocar permisos, generar reportes</a:t>
-            </a:r>
-          </a:p>
-          <a:p>
-            <a:pPr lvl="0"/>
-            <a:r>
-              <a:rPr lang="es-ES" sz="1800" dirty="0">
-                <a:solidFill>
-                  <a:schemeClr val="dk1"/>
-                </a:solidFill>
-                <a:latin typeface="Calibri" panose="020F0502020204030204"/>
-                <a:ea typeface="Calibri" panose="020F0502020204030204"/>
-                <a:cs typeface="Calibri" panose="020F0502020204030204"/>
-                <a:sym typeface="Calibri" panose="020F0502020204030204"/>
-              </a:rPr>
-              <a:t> </a:t>
-            </a:r>
-          </a:p>
-          <a:p>
-            <a:pPr marL="285750" lvl="0" indent="-285750">
-              <a:buFontTx/>
-              <a:buChar char="-"/>
-            </a:pPr>
-            <a:r>
-              <a:rPr lang="es-ES" sz="1800" dirty="0">
-                <a:solidFill>
-                  <a:schemeClr val="dk1"/>
-                </a:solidFill>
-                <a:latin typeface="Calibri" panose="020F0502020204030204"/>
-                <a:ea typeface="Calibri" panose="020F0502020204030204"/>
-                <a:cs typeface="Calibri" panose="020F0502020204030204"/>
-                <a:sym typeface="Calibri" panose="020F0502020204030204"/>
-              </a:rPr>
-              <a:t>Rol: </a:t>
-            </a:r>
-            <a:r>
-              <a:rPr lang="es-ES" sz="1800" b="1" dirty="0">
-                <a:solidFill>
-                  <a:schemeClr val="dk1"/>
-                </a:solidFill>
-                <a:latin typeface="Calibri" panose="020F0502020204030204"/>
-                <a:ea typeface="Calibri" panose="020F0502020204030204"/>
-                <a:cs typeface="Calibri" panose="020F0502020204030204"/>
-                <a:sym typeface="Calibri" panose="020F0502020204030204"/>
-              </a:rPr>
-              <a:t>Guardia de Seguridad- </a:t>
-            </a:r>
-            <a:r>
-              <a:rPr lang="es-ES" sz="1800" dirty="0">
-                <a:solidFill>
-                  <a:schemeClr val="dk1"/>
-                </a:solidFill>
-                <a:latin typeface="Calibri" panose="020F0502020204030204"/>
-                <a:ea typeface="Calibri" panose="020F0502020204030204"/>
-                <a:cs typeface="Calibri" panose="020F0502020204030204"/>
-                <a:sym typeface="Calibri" panose="020F0502020204030204"/>
-              </a:rPr>
-              <a:t>Permisos: registrar entrada, registrar salida, registrar </a:t>
-            </a:r>
-            <a:r>
-              <a:rPr lang="es-ES" sz="1800" dirty="0" err="1">
-                <a:solidFill>
-                  <a:schemeClr val="dk1"/>
-                </a:solidFill>
-                <a:latin typeface="Calibri" panose="020F0502020204030204"/>
-                <a:ea typeface="Calibri" panose="020F0502020204030204"/>
-                <a:cs typeface="Calibri" panose="020F0502020204030204"/>
-                <a:sym typeface="Calibri" panose="020F0502020204030204"/>
-              </a:rPr>
-              <a:t>vehiculo</a:t>
-            </a:r>
-            <a:r>
-              <a:rPr lang="es-ES" sz="1800" dirty="0">
-                <a:solidFill>
-                  <a:schemeClr val="dk1"/>
-                </a:solidFill>
-                <a:latin typeface="Calibri" panose="020F0502020204030204"/>
-                <a:ea typeface="Calibri" panose="020F0502020204030204"/>
-                <a:cs typeface="Calibri" panose="020F0502020204030204"/>
-                <a:sym typeface="Calibri" panose="020F0502020204030204"/>
-              </a:rPr>
-              <a:t>, registrar usuario, enviar reportes.</a:t>
-            </a:r>
-          </a:p>
-          <a:p>
-            <a:pPr marL="285750" lvl="0" indent="-285750">
-              <a:buFontTx/>
-              <a:buChar char="-"/>
-            </a:pPr>
-            <a:endParaRPr lang="es-ES" sz="1800" dirty="0">
-              <a:solidFill>
-                <a:schemeClr val="dk1"/>
-              </a:solidFill>
-              <a:latin typeface="Calibri" panose="020F0502020204030204"/>
-              <a:ea typeface="Calibri" panose="020F0502020204030204"/>
-              <a:cs typeface="Calibri" panose="020F0502020204030204"/>
-              <a:sym typeface="Calibri" panose="020F0502020204030204"/>
-            </a:endParaRPr>
-          </a:p>
-          <a:p>
-            <a:pPr marL="285750" lvl="0" indent="-285750">
-              <a:buFontTx/>
-              <a:buChar char="-"/>
-            </a:pPr>
-            <a:r>
-              <a:rPr lang="es-ES" sz="1800" dirty="0">
-                <a:solidFill>
-                  <a:schemeClr val="dk1"/>
-                </a:solidFill>
-                <a:latin typeface="Calibri" panose="020F0502020204030204"/>
-                <a:ea typeface="Calibri" panose="020F0502020204030204"/>
-                <a:cs typeface="Calibri" panose="020F0502020204030204"/>
-                <a:sym typeface="Calibri" panose="020F0502020204030204"/>
-              </a:rPr>
-              <a:t>Rol: </a:t>
-            </a:r>
-            <a:r>
-              <a:rPr lang="es-ES" sz="1800" b="1" dirty="0">
-                <a:solidFill>
-                  <a:schemeClr val="dk1"/>
-                </a:solidFill>
-                <a:latin typeface="Calibri" panose="020F0502020204030204"/>
-                <a:ea typeface="Calibri" panose="020F0502020204030204"/>
-                <a:cs typeface="Calibri" panose="020F0502020204030204"/>
-                <a:sym typeface="Calibri" panose="020F0502020204030204"/>
-              </a:rPr>
-              <a:t>Usuario</a:t>
-            </a:r>
-            <a:r>
-              <a:rPr lang="es-ES" sz="1800" dirty="0">
-                <a:solidFill>
-                  <a:schemeClr val="dk1"/>
-                </a:solidFill>
-                <a:latin typeface="Calibri" panose="020F0502020204030204"/>
-                <a:ea typeface="Calibri" panose="020F0502020204030204"/>
-                <a:cs typeface="Calibri" panose="020F0502020204030204"/>
-                <a:sym typeface="Calibri" panose="020F0502020204030204"/>
-              </a:rPr>
-              <a:t>- Permisos: registrar vehículo, consultar historial</a:t>
-            </a:r>
-            <a:endParaRPr sz="1800" dirty="0">
-              <a:solidFill>
-                <a:schemeClr val="dk1"/>
-              </a:solidFill>
-              <a:latin typeface="Calibri" panose="020F0502020204030204"/>
-              <a:ea typeface="Calibri" panose="020F0502020204030204"/>
-              <a:cs typeface="Calibri" panose="020F0502020204030204"/>
-              <a:sym typeface="Calibri" panose="020F0502020204030204"/>
-            </a:endParaRPr>
-          </a:p>
-        </p:txBody>
-      </p:sp>
       <p:pic>
         <p:nvPicPr>
           <p:cNvPr id="2" name="Picture 1">
@@ -20101,6 +20165,199 @@
           <a:xfrm>
             <a:off x="133939" y="110481"/>
             <a:ext cx="2390775" cy="1064444"/>
+          </a:xfrm>
+          <a:prstGeom prst="rect">
+            <a:avLst/>
+          </a:prstGeom>
+        </p:spPr>
+      </p:pic>
+      <p:pic>
+        <p:nvPicPr>
+          <p:cNvPr id="9" name="Imagen 8">
+            <a:extLst>
+              <a:ext uri="{FF2B5EF4-FFF2-40B4-BE49-F238E27FC236}">
+                <a16:creationId xmlns:a16="http://schemas.microsoft.com/office/drawing/2014/main" id="{4882F095-6EF3-3B53-7880-74CDA49B9415}"/>
+              </a:ext>
+            </a:extLst>
+          </p:cNvPr>
+          <p:cNvPicPr>
+            <a:picLocks noChangeAspect="1"/>
+          </p:cNvPicPr>
+          <p:nvPr/>
+        </p:nvPicPr>
+        <p:blipFill>
+          <a:blip r:embed="rId4"/>
+          <a:stretch>
+            <a:fillRect/>
+          </a:stretch>
+        </p:blipFill>
+        <p:spPr>
+          <a:xfrm>
+            <a:off x="456236" y="1714500"/>
+            <a:ext cx="4677428" cy="2038635"/>
+          </a:xfrm>
+          <a:prstGeom prst="rect">
+            <a:avLst/>
+          </a:prstGeom>
+        </p:spPr>
+      </p:pic>
+      <p:cxnSp>
+        <p:nvCxnSpPr>
+          <p:cNvPr id="10" name="Conector recto 9">
+            <a:extLst>
+              <a:ext uri="{FF2B5EF4-FFF2-40B4-BE49-F238E27FC236}">
+                <a16:creationId xmlns:a16="http://schemas.microsoft.com/office/drawing/2014/main" id="{60158B5D-95F2-DEAF-597F-A346ABC666BE}"/>
+              </a:ext>
+            </a:extLst>
+          </p:cNvPr>
+          <p:cNvCxnSpPr/>
+          <p:nvPr/>
+        </p:nvCxnSpPr>
+        <p:spPr>
+          <a:xfrm>
+            <a:off x="230981" y="4003221"/>
+            <a:ext cx="11730037" cy="0"/>
+          </a:xfrm>
+          <a:prstGeom prst="line">
+            <a:avLst/>
+          </a:prstGeom>
+        </p:spPr>
+        <p:style>
+          <a:lnRef idx="1">
+            <a:schemeClr val="accent1"/>
+          </a:lnRef>
+          <a:fillRef idx="0">
+            <a:schemeClr val="accent1"/>
+          </a:fillRef>
+          <a:effectRef idx="0">
+            <a:schemeClr val="accent1"/>
+          </a:effectRef>
+          <a:fontRef idx="minor">
+            <a:schemeClr val="tx1"/>
+          </a:fontRef>
+        </p:style>
+      </p:cxnSp>
+      <p:cxnSp>
+        <p:nvCxnSpPr>
+          <p:cNvPr id="11" name="Conector recto 10">
+            <a:extLst>
+              <a:ext uri="{FF2B5EF4-FFF2-40B4-BE49-F238E27FC236}">
+                <a16:creationId xmlns:a16="http://schemas.microsoft.com/office/drawing/2014/main" id="{780AFECB-2496-B70F-D8EF-5E48A3B7F619}"/>
+              </a:ext>
+            </a:extLst>
+          </p:cNvPr>
+          <p:cNvCxnSpPr/>
+          <p:nvPr/>
+        </p:nvCxnSpPr>
+        <p:spPr>
+          <a:xfrm>
+            <a:off x="5802708" y="1661903"/>
+            <a:ext cx="0" cy="4929188"/>
+          </a:xfrm>
+          <a:prstGeom prst="line">
+            <a:avLst/>
+          </a:prstGeom>
+        </p:spPr>
+        <p:style>
+          <a:lnRef idx="1">
+            <a:schemeClr val="accent1"/>
+          </a:lnRef>
+          <a:fillRef idx="0">
+            <a:schemeClr val="accent1"/>
+          </a:fillRef>
+          <a:effectRef idx="0">
+            <a:schemeClr val="accent1"/>
+          </a:effectRef>
+          <a:fontRef idx="minor">
+            <a:schemeClr val="tx1"/>
+          </a:fontRef>
+        </p:style>
+      </p:cxnSp>
+      <p:pic>
+        <p:nvPicPr>
+          <p:cNvPr id="13" name="Imagen 12">
+            <a:extLst>
+              <a:ext uri="{FF2B5EF4-FFF2-40B4-BE49-F238E27FC236}">
+                <a16:creationId xmlns:a16="http://schemas.microsoft.com/office/drawing/2014/main" id="{EC8F6929-4A61-43E2-9028-6184E07734CE}"/>
+              </a:ext>
+            </a:extLst>
+          </p:cNvPr>
+          <p:cNvPicPr>
+            <a:picLocks noChangeAspect="1"/>
+          </p:cNvPicPr>
+          <p:nvPr/>
+        </p:nvPicPr>
+        <p:blipFill>
+          <a:blip r:embed="rId5"/>
+          <a:srcRect r="6916"/>
+          <a:stretch>
+            <a:fillRect/>
+          </a:stretch>
+        </p:blipFill>
+        <p:spPr>
+          <a:xfrm>
+            <a:off x="6143961" y="1611228"/>
+            <a:ext cx="5817057" cy="2276793"/>
+          </a:xfrm>
+          <a:prstGeom prst="rect">
+            <a:avLst/>
+          </a:prstGeom>
+        </p:spPr>
+      </p:pic>
+      <p:pic>
+        <p:nvPicPr>
+          <p:cNvPr id="15" name="Imagen 14">
+            <a:extLst>
+              <a:ext uri="{FF2B5EF4-FFF2-40B4-BE49-F238E27FC236}">
+                <a16:creationId xmlns:a16="http://schemas.microsoft.com/office/drawing/2014/main" id="{C4E34EBD-165D-BC55-9FFB-0B58C92B49F3}"/>
+              </a:ext>
+            </a:extLst>
+          </p:cNvPr>
+          <p:cNvPicPr>
+            <a:picLocks noChangeAspect="1"/>
+          </p:cNvPicPr>
+          <p:nvPr/>
+        </p:nvPicPr>
+        <p:blipFill>
+          <a:blip r:embed="rId6"/>
+          <a:stretch>
+            <a:fillRect/>
+          </a:stretch>
+        </p:blipFill>
+        <p:spPr>
+          <a:xfrm>
+            <a:off x="5983650" y="4169474"/>
+            <a:ext cx="5796427" cy="2477034"/>
+          </a:xfrm>
+          <a:prstGeom prst="rect">
+            <a:avLst/>
+          </a:prstGeom>
+        </p:spPr>
+      </p:pic>
+      <p:pic>
+        <p:nvPicPr>
+          <p:cNvPr id="17" name="Imagen 16">
+            <a:extLst>
+              <a:ext uri="{FF2B5EF4-FFF2-40B4-BE49-F238E27FC236}">
+                <a16:creationId xmlns:a16="http://schemas.microsoft.com/office/drawing/2014/main" id="{2B610256-A0D4-344A-840B-DDAED833F642}"/>
+              </a:ext>
+            </a:extLst>
+          </p:cNvPr>
+          <p:cNvPicPr>
+            <a:picLocks noChangeAspect="1"/>
+          </p:cNvPicPr>
+          <p:nvPr/>
+        </p:nvPicPr>
+        <p:blipFill>
+          <a:blip r:embed="rId7"/>
+          <a:stretch>
+            <a:fillRect/>
+          </a:stretch>
+        </p:blipFill>
+        <p:spPr>
+          <a:xfrm>
+            <a:off x="48864" y="4332082"/>
+            <a:ext cx="5572903" cy="1762371"/>
           </a:xfrm>
           <a:prstGeom prst="rect">
             <a:avLst/>
@@ -20377,18 +20634,6 @@
               <a:buFont typeface="Arial" panose="020B0604020202020204"/>
               <a:buNone/>
             </a:pPr>
-            <a:r>
-              <a:rPr lang="es-CO" sz="1600" b="1" i="0" u="none" strike="noStrike" cap="none" dirty="0">
-                <a:solidFill>
-                  <a:schemeClr val="dk1"/>
-                </a:solidFill>
-                <a:latin typeface="Calibri" panose="020F0502020204030204"/>
-                <a:ea typeface="Calibri" panose="020F0502020204030204"/>
-                <a:cs typeface="Calibri" panose="020F0502020204030204"/>
-                <a:sym typeface="Calibri" panose="020F0502020204030204"/>
-              </a:rPr>
-              <a:t/>
-            </a:r>
             <a:br>
               <a:rPr lang="es-CO" sz="1600" b="1" i="0" u="none" strike="noStrike" cap="none" dirty="0">
                 <a:solidFill>
@@ -22240,18 +22485,6 @@
               <a:buFont typeface="Arial" panose="020B0604020202020204"/>
               <a:buNone/>
             </a:pPr>
-            <a:r>
-              <a:rPr lang="es-CO" sz="1600" b="1" i="0" u="none" strike="noStrike" cap="none" dirty="0">
-                <a:solidFill>
-                  <a:schemeClr val="dk1"/>
-                </a:solidFill>
-                <a:latin typeface="Calibri" panose="020F0502020204030204"/>
-                <a:ea typeface="Calibri" panose="020F0502020204030204"/>
-                <a:cs typeface="Calibri" panose="020F0502020204030204"/>
-                <a:sym typeface="Calibri" panose="020F0502020204030204"/>
-              </a:rPr>
-              <a:t/>
-            </a:r>
             <a:br>
               <a:rPr lang="es-CO" sz="1600" b="1" i="0" u="none" strike="noStrike" cap="none" dirty="0">
                 <a:solidFill>
@@ -23173,6 +23406,26 @@
 </file>
 
 <file path=customXml/item1.xml><?xml version="1.0" encoding="utf-8"?>
+<?mso-contentType ?>
+<FormTemplates xmlns="http://schemas.microsoft.com/sharepoint/v3/contenttype/forms">
+  <Display>DocumentLibraryForm</Display>
+  <Edit>DocumentLibraryForm</Edit>
+  <New>DocumentLibraryForm</New>
+</FormTemplates>
+</file>
+
+<file path=customXml/item2.xml><?xml version="1.0" encoding="utf-8"?>
+<p:properties xmlns:p="http://schemas.microsoft.com/office/2006/metadata/properties" xmlns:xsi="http://www.w3.org/2001/XMLSchema-instance" xmlns:pc="http://schemas.microsoft.com/office/infopath/2007/PartnerControls">
+  <documentManagement>
+    <TaxCatchAll xmlns="5d6dac1f-6572-46e6-8ac2-54aa885adc11" xsi:nil="true"/>
+    <lcf76f155ced4ddcb4097134ff3c332f xmlns="7f8eb868-f2a7-49ec-80f2-9ac6732c6161">
+      <Terms xmlns="http://schemas.microsoft.com/office/infopath/2007/PartnerControls"/>
+    </lcf76f155ced4ddcb4097134ff3c332f>
+  </documentManagement>
+</p:properties>
+</file>
+
+<file path=customXml/item3.xml><?xml version="1.0" encoding="utf-8"?>
 <ct:contentTypeSchema xmlns:ct="http://schemas.microsoft.com/office/2006/metadata/contentType" xmlns:ma="http://schemas.microsoft.com/office/2006/metadata/properties/metaAttributes" ct:_="" ma:_="" ma:contentTypeName="Documento" ma:contentTypeID="0x0101009C160BF63992044A99946E4B9FF8A5D5" ma:contentTypeVersion="14" ma:contentTypeDescription="Crear nuevo documento." ma:contentTypeScope="" ma:versionID="de16a2f1483f07f01f664ea99c541bb4">
   <xsd:schema xmlns:xsd="http://www.w3.org/2001/XMLSchema" xmlns:xs="http://www.w3.org/2001/XMLSchema" xmlns:p="http://schemas.microsoft.com/office/2006/metadata/properties" xmlns:ns2="7f8eb868-f2a7-49ec-80f2-9ac6732c6161" xmlns:ns3="5d6dac1f-6572-46e6-8ac2-54aa885adc11" targetNamespace="http://schemas.microsoft.com/office/2006/metadata/properties" ma:root="true" ma:fieldsID="2aeeeaca6a92989f39bea69df05468af" ns2:_="" ns3:_="">
     <xsd:import namespace="7f8eb868-f2a7-49ec-80f2-9ac6732c6161"/>
@@ -23401,28 +23654,8 @@
 </ct:contentTypeSchema>
 </file>
 
-<file path=customXml/item2.xml><?xml version="1.0" encoding="utf-8"?>
-<p:properties xmlns:p="http://schemas.microsoft.com/office/2006/metadata/properties" xmlns:xsi="http://www.w3.org/2001/XMLSchema-instance" xmlns:pc="http://schemas.microsoft.com/office/infopath/2007/PartnerControls">
-  <documentManagement>
-    <TaxCatchAll xmlns="5d6dac1f-6572-46e6-8ac2-54aa885adc11" xsi:nil="true"/>
-    <lcf76f155ced4ddcb4097134ff3c332f xmlns="7f8eb868-f2a7-49ec-80f2-9ac6732c6161">
-      <Terms xmlns="http://schemas.microsoft.com/office/infopath/2007/PartnerControls"/>
-    </lcf76f155ced4ddcb4097134ff3c332f>
-  </documentManagement>
-</p:properties>
-</file>
-
-<file path=customXml/item3.xml><?xml version="1.0" encoding="utf-8"?>
-<?mso-contentType ?>
-<FormTemplates xmlns="http://schemas.microsoft.com/sharepoint/v3/contenttype/forms">
-  <Display>DocumentLibraryForm</Display>
-  <Edit>DocumentLibraryForm</Edit>
-  <New>DocumentLibraryForm</New>
-</FormTemplates>
-</file>
-
 <file path=customXml/itemProps1.xml><?xml version="1.0" encoding="utf-8"?>
-<ds:datastoreItem xmlns:ds="http://schemas.openxmlformats.org/officeDocument/2006/customXml" ds:itemID="{FB48A022-90FE-46FD-B6B9-A5517959569C}">
+<ds:datastoreItem xmlns:ds="http://schemas.openxmlformats.org/officeDocument/2006/customXml" ds:itemID="{C020FF02-1FE7-4B92-A947-88F847DE8F80}">
   <ds:schemaRefs/>
 </ds:datastoreItem>
 </file>
@@ -23434,7 +23667,7 @@
 </file>
 
 <file path=customXml/itemProps3.xml><?xml version="1.0" encoding="utf-8"?>
-<ds:datastoreItem xmlns:ds="http://schemas.openxmlformats.org/officeDocument/2006/customXml" ds:itemID="{C020FF02-1FE7-4B92-A947-88F847DE8F80}">
+<ds:datastoreItem xmlns:ds="http://schemas.openxmlformats.org/officeDocument/2006/customXml" ds:itemID="{FB48A022-90FE-46FD-B6B9-A5517959569C}">
   <ds:schemaRefs/>
 </ds:datastoreItem>
 </file>
</xml_diff>

<commit_message>
docs: se modifica el archivo
Co-Authored-By: EdwinAbaunza(EA) <185133387+Surusaki023@users.noreply.github.com>
</commit_message>
<xml_diff>
--- a/Arquitectura de software/L-MACK/SUTENTACION 3B L-MACK.pptx
+++ b/Arquitectura de software/L-MACK/SUTENTACION 3B L-MACK.pptx
@@ -33,7 +33,7 @@
   <p:notesSz cx="6858000" cy="9144000"/>
   <p:embeddedFontLst>
     <p:embeddedFont>
-      <p:font typeface="Work Sans Light" pitchFamily="2" charset="0"/>
+      <p:font typeface="Work Sans Light" panose="020F0502020204030204" pitchFamily="2" charset="0"/>
       <p:regular r:id="rId26"/>
       <p:bold r:id="rId27"/>
       <p:italic r:id="rId28"/>
@@ -22538,6 +22538,36 @@
           </a:prstGeom>
         </p:spPr>
       </p:pic>
+      <p:pic>
+        <p:nvPicPr>
+          <p:cNvPr id="4" name="Imagen 3">
+            <a:extLst>
+              <a:ext uri="{FF2B5EF4-FFF2-40B4-BE49-F238E27FC236}">
+                <a16:creationId xmlns:a16="http://schemas.microsoft.com/office/drawing/2014/main" id="{79DB689C-9DFC-9FF6-7FC6-DF358BB20F41}"/>
+              </a:ext>
+            </a:extLst>
+          </p:cNvPr>
+          <p:cNvPicPr>
+            <a:picLocks noChangeAspect="1"/>
+          </p:cNvPicPr>
+          <p:nvPr/>
+        </p:nvPicPr>
+        <p:blipFill>
+          <a:blip r:embed="rId4"/>
+          <a:stretch>
+            <a:fillRect/>
+          </a:stretch>
+        </p:blipFill>
+        <p:spPr>
+          <a:xfrm>
+            <a:off x="1032746" y="1352478"/>
+            <a:ext cx="9880847" cy="4997508"/>
+          </a:xfrm>
+          <a:prstGeom prst="rect">
+            <a:avLst/>
+          </a:prstGeom>
+        </p:spPr>
+      </p:pic>
     </p:spTree>
   </p:cSld>
   <p:clrMapOvr>
@@ -23406,15 +23436,6 @@
 </file>
 
 <file path=customXml/item1.xml><?xml version="1.0" encoding="utf-8"?>
-<?mso-contentType ?>
-<FormTemplates xmlns="http://schemas.microsoft.com/sharepoint/v3/contenttype/forms">
-  <Display>DocumentLibraryForm</Display>
-  <Edit>DocumentLibraryForm</Edit>
-  <New>DocumentLibraryForm</New>
-</FormTemplates>
-</file>
-
-<file path=customXml/item2.xml><?xml version="1.0" encoding="utf-8"?>
 <p:properties xmlns:p="http://schemas.microsoft.com/office/2006/metadata/properties" xmlns:xsi="http://www.w3.org/2001/XMLSchema-instance" xmlns:pc="http://schemas.microsoft.com/office/infopath/2007/PartnerControls">
   <documentManagement>
     <TaxCatchAll xmlns="5d6dac1f-6572-46e6-8ac2-54aa885adc11" xsi:nil="true"/>
@@ -23423,6 +23444,15 @@
     </lcf76f155ced4ddcb4097134ff3c332f>
   </documentManagement>
 </p:properties>
+</file>
+
+<file path=customXml/item2.xml><?xml version="1.0" encoding="utf-8"?>
+<?mso-contentType ?>
+<FormTemplates xmlns="http://schemas.microsoft.com/sharepoint/v3/contenttype/forms">
+  <Display>DocumentLibraryForm</Display>
+  <Edit>DocumentLibraryForm</Edit>
+  <New>DocumentLibraryForm</New>
+</FormTemplates>
 </file>
 
 <file path=customXml/item3.xml><?xml version="1.0" encoding="utf-8"?>
@@ -23655,13 +23685,13 @@
 </file>
 
 <file path=customXml/itemProps1.xml><?xml version="1.0" encoding="utf-8"?>
-<ds:datastoreItem xmlns:ds="http://schemas.openxmlformats.org/officeDocument/2006/customXml" ds:itemID="{C020FF02-1FE7-4B92-A947-88F847DE8F80}">
+<ds:datastoreItem xmlns:ds="http://schemas.openxmlformats.org/officeDocument/2006/customXml" ds:itemID="{091B3500-55FD-47A2-B150-4704A4114CB7}">
   <ds:schemaRefs/>
 </ds:datastoreItem>
 </file>
 
 <file path=customXml/itemProps2.xml><?xml version="1.0" encoding="utf-8"?>
-<ds:datastoreItem xmlns:ds="http://schemas.openxmlformats.org/officeDocument/2006/customXml" ds:itemID="{091B3500-55FD-47A2-B150-4704A4114CB7}">
+<ds:datastoreItem xmlns:ds="http://schemas.openxmlformats.org/officeDocument/2006/customXml" ds:itemID="{C020FF02-1FE7-4B92-A947-88F847DE8F80}">
   <ds:schemaRefs/>
 </ds:datastoreItem>
 </file>

</xml_diff>

<commit_message>
doc: se actualiza error de tipografia
</commit_message>
<xml_diff>
--- a/Arquitectura de software/L-MACK/SUTENTACION 3B L-MACK.pptx
+++ b/Arquitectura de software/L-MACK/SUTENTACION 3B L-MACK.pptx
@@ -21780,7 +21780,7 @@
         <p:spPr>
           <a:xfrm>
             <a:off x="99070" y="2767955"/>
-            <a:ext cx="11634089" cy="1015663"/>
+            <a:ext cx="11634089" cy="1323439"/>
           </a:xfrm>
           <a:prstGeom prst="rect">
             <a:avLst/>
@@ -21798,8 +21798,8 @@
               <a:t>Diseñar e implementar un sistema digital para la gestión de minutas, el control de asistencia y el registro de incidentes en los ambientes del SENA, con el fin de optimizar la organización institucional, mejorar la comunicación entre actores y facilitar el seguimiento eficiente de las actividades </a:t>
             </a:r>
             <a:r>
-              <a:rPr lang="es-MX" sz="2000" u="sng"/>
-              <a:t>formatvas</a:t>
+              <a:rPr lang="es-MX" sz="2000" u="sng" dirty="0"/>
+              <a:t>formativas</a:t>
             </a:r>
             <a:r>
               <a:rPr lang="es-MX" sz="2000" dirty="0"/>

</xml_diff>

<commit_message>
doc: se modifica el archivo
</commit_message>
<xml_diff>
--- a/Arquitectura de software/L-MACK/SUTENTACION 3B L-MACK.pptx
+++ b/Arquitectura de software/L-MACK/SUTENTACION 3B L-MACK.pptx
@@ -21795,15 +21795,7 @@
             <a:pPr algn="ctr"/>
             <a:r>
               <a:rPr lang="es-MX" sz="2000" dirty="0"/>
-              <a:t>Diseñar e implementar un sistema digital para la gestión de minutas, el control de asistencia y el registro de incidentes en los ambientes del SENA, con el fin de optimizar la organización institucional, mejorar la comunicación entre actores y facilitar el seguimiento eficiente de las actividades </a:t>
-            </a:r>
-            <a:r>
-              <a:rPr lang="es-MX" sz="2000" u="sng" dirty="0"/>
-              <a:t>formativas</a:t>
-            </a:r>
-            <a:r>
-              <a:rPr lang="es-MX" sz="2000" dirty="0"/>
-              <a:t>.</a:t>
+              <a:t>Diseñar e implementar un sistema digital para la gestión de minutas, el control de asistencia y el registro de incidentes en los ambientes del SENA, con el fin de optimizar la organización institucional, mejorar la comunicación entre actores y facilitar el seguimiento eficiente de las actividades formativas.</a:t>
             </a:r>
           </a:p>
         </p:txBody>

</xml_diff>

<commit_message>
Doc: se agregan archivo diagrama de clases
</commit_message>
<xml_diff>
--- a/Arquitectura de software/L-MACK/SUTENTACION 3B L-MACK.pptx
+++ b/Arquitectura de software/L-MACK/SUTENTACION 3B L-MACK.pptx
@@ -33,11 +33,18 @@
   <p:notesSz cx="6858000" cy="9144000"/>
   <p:embeddedFontLst>
     <p:embeddedFont>
-      <p:font typeface="Work Sans Light" pitchFamily="2" charset="0"/>
+      <p:font typeface="Calibri" panose="020F0502020204030204" pitchFamily="34" charset="0"/>
       <p:regular r:id="rId26"/>
       <p:bold r:id="rId27"/>
       <p:italic r:id="rId28"/>
       <p:boldItalic r:id="rId29"/>
+    </p:embeddedFont>
+    <p:embeddedFont>
+      <p:font typeface="Work Sans Light" panose="020B0604020202020204" charset="0"/>
+      <p:regular r:id="rId30"/>
+      <p:bold r:id="rId31"/>
+      <p:italic r:id="rId32"/>
+      <p:boldItalic r:id="rId33"/>
     </p:embeddedFont>
   </p:embeddedFontLst>
   <p:defaultTextStyle>
@@ -19174,6 +19181,18 @@
               <a:buFont typeface="Arial" panose="020B0604020202020204"/>
               <a:buNone/>
             </a:pPr>
+            <a:r>
+              <a:rPr lang="es-CO" sz="1600" b="1" i="0" u="none" strike="noStrike" cap="none" dirty="0">
+                <a:solidFill>
+                  <a:schemeClr val="dk1"/>
+                </a:solidFill>
+                <a:latin typeface="Calibri" panose="020F0502020204030204"/>
+                <a:ea typeface="Calibri" panose="020F0502020204030204"/>
+                <a:cs typeface="Calibri" panose="020F0502020204030204"/>
+                <a:sym typeface="Calibri" panose="020F0502020204030204"/>
+              </a:rPr>
+              <a:t/>
+            </a:r>
             <a:br>
               <a:rPr lang="es-CO" sz="1600" b="1" i="0" u="none" strike="noStrike" cap="none" dirty="0">
                 <a:solidFill>
@@ -20634,6 +20653,18 @@
               <a:buFont typeface="Arial" panose="020B0604020202020204"/>
               <a:buNone/>
             </a:pPr>
+            <a:r>
+              <a:rPr lang="es-CO" sz="1600" b="1" i="0" u="none" strike="noStrike" cap="none" dirty="0">
+                <a:solidFill>
+                  <a:schemeClr val="dk1"/>
+                </a:solidFill>
+                <a:latin typeface="Calibri" panose="020F0502020204030204"/>
+                <a:ea typeface="Calibri" panose="020F0502020204030204"/>
+                <a:cs typeface="Calibri" panose="020F0502020204030204"/>
+                <a:sym typeface="Calibri" panose="020F0502020204030204"/>
+              </a:rPr>
+              <a:t/>
+            </a:r>
             <a:br>
               <a:rPr lang="es-CO" sz="1600" b="1" i="0" u="none" strike="noStrike" cap="none" dirty="0">
                 <a:solidFill>
@@ -22351,7 +22382,7 @@
         </p:nvSpPr>
         <p:spPr>
           <a:xfrm>
-            <a:off x="2515901" y="208803"/>
+            <a:off x="2451794" y="3109801"/>
             <a:ext cx="7160197" cy="707846"/>
           </a:xfrm>
           <a:prstGeom prst="rect">
@@ -22425,7 +22456,7 @@
         </p:nvCxnSpPr>
         <p:spPr>
           <a:xfrm>
-            <a:off x="5105069" y="916649"/>
+            <a:off x="5163792" y="4289023"/>
             <a:ext cx="1736203" cy="0"/>
           </a:xfrm>
           <a:prstGeom prst="straightConnector1">
@@ -22485,6 +22516,18 @@
               <a:buFont typeface="Arial" panose="020B0604020202020204"/>
               <a:buNone/>
             </a:pPr>
+            <a:r>
+              <a:rPr lang="es-CO" sz="1600" b="1" i="0" u="none" strike="noStrike" cap="none" dirty="0">
+                <a:solidFill>
+                  <a:schemeClr val="dk1"/>
+                </a:solidFill>
+                <a:latin typeface="Calibri" panose="020F0502020204030204"/>
+                <a:ea typeface="Calibri" panose="020F0502020204030204"/>
+                <a:cs typeface="Calibri" panose="020F0502020204030204"/>
+                <a:sym typeface="Calibri" panose="020F0502020204030204"/>
+              </a:rPr>
+              <a:t/>
+            </a:r>
             <a:br>
               <a:rPr lang="es-CO" sz="1600" b="1" i="0" u="none" strike="noStrike" cap="none" dirty="0">
                 <a:solidFill>
@@ -22532,36 +22575,6 @@
           <a:xfrm>
             <a:off x="133939" y="110481"/>
             <a:ext cx="2390775" cy="1064444"/>
-          </a:xfrm>
-          <a:prstGeom prst="rect">
-            <a:avLst/>
-          </a:prstGeom>
-        </p:spPr>
-      </p:pic>
-      <p:pic>
-        <p:nvPicPr>
-          <p:cNvPr id="4" name="Imagen 3">
-            <a:extLst>
-              <a:ext uri="{FF2B5EF4-FFF2-40B4-BE49-F238E27FC236}">
-                <a16:creationId xmlns:a16="http://schemas.microsoft.com/office/drawing/2014/main" id="{79DB689C-9DFC-9FF6-7FC6-DF358BB20F41}"/>
-              </a:ext>
-            </a:extLst>
-          </p:cNvPr>
-          <p:cNvPicPr>
-            <a:picLocks noChangeAspect="1"/>
-          </p:cNvPicPr>
-          <p:nvPr/>
-        </p:nvPicPr>
-        <p:blipFill>
-          <a:blip r:embed="rId4"/>
-          <a:stretch>
-            <a:fillRect/>
-          </a:stretch>
-        </p:blipFill>
-        <p:spPr>
-          <a:xfrm>
-            <a:off x="1032746" y="1352478"/>
-            <a:ext cx="9880847" cy="4997508"/>
           </a:xfrm>
           <a:prstGeom prst="rect">
             <a:avLst/>
@@ -23436,6 +23449,15 @@
 </file>
 
 <file path=customXml/item1.xml><?xml version="1.0" encoding="utf-8"?>
+<?mso-contentType ?>
+<FormTemplates xmlns="http://schemas.microsoft.com/sharepoint/v3/contenttype/forms">
+  <Display>DocumentLibraryForm</Display>
+  <Edit>DocumentLibraryForm</Edit>
+  <New>DocumentLibraryForm</New>
+</FormTemplates>
+</file>
+
+<file path=customXml/item2.xml><?xml version="1.0" encoding="utf-8"?>
 <p:properties xmlns:p="http://schemas.microsoft.com/office/2006/metadata/properties" xmlns:xsi="http://www.w3.org/2001/XMLSchema-instance" xmlns:pc="http://schemas.microsoft.com/office/infopath/2007/PartnerControls">
   <documentManagement>
     <TaxCatchAll xmlns="5d6dac1f-6572-46e6-8ac2-54aa885adc11" xsi:nil="true"/>
@@ -23444,15 +23466,6 @@
     </lcf76f155ced4ddcb4097134ff3c332f>
   </documentManagement>
 </p:properties>
-</file>
-
-<file path=customXml/item2.xml><?xml version="1.0" encoding="utf-8"?>
-<?mso-contentType ?>
-<FormTemplates xmlns="http://schemas.microsoft.com/sharepoint/v3/contenttype/forms">
-  <Display>DocumentLibraryForm</Display>
-  <Edit>DocumentLibraryForm</Edit>
-  <New>DocumentLibraryForm</New>
-</FormTemplates>
 </file>
 
 <file path=customXml/item3.xml><?xml version="1.0" encoding="utf-8"?>
@@ -23685,13 +23698,13 @@
 </file>
 
 <file path=customXml/itemProps1.xml><?xml version="1.0" encoding="utf-8"?>
-<ds:datastoreItem xmlns:ds="http://schemas.openxmlformats.org/officeDocument/2006/customXml" ds:itemID="{091B3500-55FD-47A2-B150-4704A4114CB7}">
+<ds:datastoreItem xmlns:ds="http://schemas.openxmlformats.org/officeDocument/2006/customXml" ds:itemID="{C020FF02-1FE7-4B92-A947-88F847DE8F80}">
   <ds:schemaRefs/>
 </ds:datastoreItem>
 </file>
 
 <file path=customXml/itemProps2.xml><?xml version="1.0" encoding="utf-8"?>
-<ds:datastoreItem xmlns:ds="http://schemas.openxmlformats.org/officeDocument/2006/customXml" ds:itemID="{C020FF02-1FE7-4B92-A947-88F847DE8F80}">
+<ds:datastoreItem xmlns:ds="http://schemas.openxmlformats.org/officeDocument/2006/customXml" ds:itemID="{091B3500-55FD-47A2-B150-4704A4114CB7}">
   <ds:schemaRefs/>
 </ds:datastoreItem>
 </file>

</xml_diff>

<commit_message>
Docs: se agregan y se guardan los vinculos a imagenes de ejemplo de cada apartado
</commit_message>
<xml_diff>
--- a/Arquitectura de software/L-MACK/SUTENTACION 3B L-MACK.pptx
+++ b/Arquitectura de software/L-MACK/SUTENTACION 3B L-MACK.pptx
@@ -33,18 +33,11 @@
   <p:notesSz cx="6858000" cy="9144000"/>
   <p:embeddedFontLst>
     <p:embeddedFont>
-      <p:font typeface="Calibri" panose="020F0502020204030204" pitchFamily="34" charset="0"/>
+      <p:font typeface="Work Sans Light" pitchFamily="2" charset="0"/>
       <p:regular r:id="rId26"/>
       <p:bold r:id="rId27"/>
       <p:italic r:id="rId28"/>
       <p:boldItalic r:id="rId29"/>
-    </p:embeddedFont>
-    <p:embeddedFont>
-      <p:font typeface="Work Sans Light" panose="020B0604020202020204" charset="0"/>
-      <p:regular r:id="rId30"/>
-      <p:bold r:id="rId31"/>
-      <p:italic r:id="rId32"/>
-      <p:boldItalic r:id="rId33"/>
     </p:embeddedFont>
   </p:embeddedFontLst>
   <p:defaultTextStyle>
@@ -18816,26 +18809,29 @@
       </p:pic>
       <p:pic>
         <p:nvPicPr>
-          <p:cNvPr id="5" name="Imagen 4"/>
-          <p:cNvPicPr/>
+          <p:cNvPr id="4" name="Imagen 3" descr="Diagrama&#10;&#10;El contenido generado por IA puede ser incorrecto.">
+            <a:hlinkClick r:id="rId4" action="ppaction://hlinkfile"/>
+            <a:extLst>
+              <a:ext uri="{FF2B5EF4-FFF2-40B4-BE49-F238E27FC236}">
+                <a16:creationId xmlns:a16="http://schemas.microsoft.com/office/drawing/2014/main" id="{7C8222F6-8FBA-0332-70C9-43E4BBB9FA07}"/>
+              </a:ext>
+            </a:extLst>
+          </p:cNvPr>
+          <p:cNvPicPr>
+            <a:picLocks noChangeAspect="1"/>
+          </p:cNvPicPr>
           <p:nvPr/>
         </p:nvPicPr>
         <p:blipFill>
-          <a:blip r:embed="rId4">
-            <a:extLst>
-              <a:ext uri="{28A0092B-C50C-407E-A947-70E740481C1C}">
-                <a14:useLocalDpi xmlns:a14="http://schemas.microsoft.com/office/drawing/2010/main" val="0"/>
-              </a:ext>
-            </a:extLst>
-          </a:blip>
+          <a:blip r:embed="rId5"/>
           <a:stretch>
             <a:fillRect/>
           </a:stretch>
         </p:blipFill>
         <p:spPr>
           <a:xfrm>
-            <a:off x="2524714" y="1821560"/>
-            <a:ext cx="7859089" cy="4553649"/>
+            <a:off x="1556623" y="1738618"/>
+            <a:ext cx="8563061" cy="5008901"/>
           </a:xfrm>
           <a:prstGeom prst="rect">
             <a:avLst/>
@@ -19018,14 +19014,16 @@
       </p:pic>
       <p:pic>
         <p:nvPicPr>
-          <p:cNvPr id="4" name="Imagen 3"/>
+          <p:cNvPr id="4" name="Imagen 3">
+            <a:hlinkClick r:id="rId4" action="ppaction://hlinkfile"/>
+          </p:cNvPr>
           <p:cNvPicPr>
             <a:picLocks noChangeAspect="1"/>
           </p:cNvPicPr>
           <p:nvPr/>
         </p:nvPicPr>
         <p:blipFill>
-          <a:blip r:embed="rId4"/>
+          <a:blip r:embed="rId5"/>
           <a:stretch>
             <a:fillRect/>
           </a:stretch>
@@ -19181,18 +19179,6 @@
               <a:buFont typeface="Arial" panose="020B0604020202020204"/>
               <a:buNone/>
             </a:pPr>
-            <a:r>
-              <a:rPr lang="es-CO" sz="1600" b="1" i="0" u="none" strike="noStrike" cap="none" dirty="0">
-                <a:solidFill>
-                  <a:schemeClr val="dk1"/>
-                </a:solidFill>
-                <a:latin typeface="Calibri" panose="020F0502020204030204"/>
-                <a:ea typeface="Calibri" panose="020F0502020204030204"/>
-                <a:cs typeface="Calibri" panose="020F0502020204030204"/>
-                <a:sym typeface="Calibri" panose="020F0502020204030204"/>
-              </a:rPr>
-              <a:t/>
-            </a:r>
             <a:br>
               <a:rPr lang="es-CO" sz="1600" b="1" i="0" u="none" strike="noStrike" cap="none" dirty="0">
                 <a:solidFill>
@@ -19339,14 +19325,16 @@
       </p:pic>
       <p:pic>
         <p:nvPicPr>
-          <p:cNvPr id="2" name="Imagen 1"/>
+          <p:cNvPr id="2" name="Imagen 1">
+            <a:hlinkClick r:id="rId4" action="ppaction://hlinkfile"/>
+          </p:cNvPr>
           <p:cNvPicPr>
             <a:picLocks noChangeAspect="1"/>
           </p:cNvPicPr>
           <p:nvPr/>
         </p:nvPicPr>
         <p:blipFill>
-          <a:blip r:embed="rId4"/>
+          <a:blip r:embed="rId5"/>
           <a:stretch>
             <a:fillRect/>
           </a:stretch>
@@ -19565,6 +19553,7 @@
       <p:pic>
         <p:nvPicPr>
           <p:cNvPr id="13" name="Imagen 12">
+            <a:hlinkClick r:id="rId4" action="ppaction://hlinkfile"/>
             <a:extLst>
               <a:ext uri="{FF2B5EF4-FFF2-40B4-BE49-F238E27FC236}">
                 <a16:creationId xmlns:a16="http://schemas.microsoft.com/office/drawing/2014/main" id="{D3EB645E-AF94-FB4D-C9D7-F365960646B6}"/>
@@ -19577,7 +19566,7 @@
           <p:nvPr/>
         </p:nvPicPr>
         <p:blipFill>
-          <a:blip r:embed="rId4"/>
+          <a:blip r:embed="rId5"/>
           <a:stretch>
             <a:fillRect/>
           </a:stretch>
@@ -19595,6 +19584,7 @@
       <p:pic>
         <p:nvPicPr>
           <p:cNvPr id="15" name="Imagen 14">
+            <a:hlinkClick r:id="rId4" action="ppaction://hlinkfile"/>
             <a:extLst>
               <a:ext uri="{FF2B5EF4-FFF2-40B4-BE49-F238E27FC236}">
                 <a16:creationId xmlns:a16="http://schemas.microsoft.com/office/drawing/2014/main" id="{CD0D1FA8-8F2E-2108-B523-BFF0D41BF07E}"/>
@@ -19607,7 +19597,7 @@
           <p:nvPr/>
         </p:nvPicPr>
         <p:blipFill>
-          <a:blip r:embed="rId5"/>
+          <a:blip r:embed="rId6"/>
           <a:stretch>
             <a:fillRect/>
           </a:stretch>
@@ -19625,6 +19615,7 @@
       <p:pic>
         <p:nvPicPr>
           <p:cNvPr id="19" name="Imagen 18">
+            <a:hlinkClick r:id="rId4" action="ppaction://hlinkfile"/>
             <a:extLst>
               <a:ext uri="{FF2B5EF4-FFF2-40B4-BE49-F238E27FC236}">
                 <a16:creationId xmlns:a16="http://schemas.microsoft.com/office/drawing/2014/main" id="{7524FF55-9C69-892C-B9FB-072CCF224E48}"/>
@@ -19637,7 +19628,7 @@
           <p:nvPr/>
         </p:nvPicPr>
         <p:blipFill>
-          <a:blip r:embed="rId6"/>
+          <a:blip r:embed="rId7"/>
           <a:stretch>
             <a:fillRect/>
           </a:stretch>
@@ -19655,6 +19646,7 @@
       <p:pic>
         <p:nvPicPr>
           <p:cNvPr id="21" name="Imagen 20">
+            <a:hlinkClick r:id="rId4" action="ppaction://hlinkfile"/>
             <a:extLst>
               <a:ext uri="{FF2B5EF4-FFF2-40B4-BE49-F238E27FC236}">
                 <a16:creationId xmlns:a16="http://schemas.microsoft.com/office/drawing/2014/main" id="{EC0DE956-9BBE-5205-A956-DAA1899E0BFE}"/>
@@ -19667,7 +19659,7 @@
           <p:nvPr/>
         </p:nvPicPr>
         <p:blipFill>
-          <a:blip r:embed="rId7"/>
+          <a:blip r:embed="rId8"/>
           <a:stretch>
             <a:fillRect/>
           </a:stretch>
@@ -19914,6 +19906,7 @@
       <p:pic>
         <p:nvPicPr>
           <p:cNvPr id="8" name="Imagen 7">
+            <a:hlinkClick r:id="rId4" action="ppaction://hlinkfile"/>
             <a:extLst>
               <a:ext uri="{FF2B5EF4-FFF2-40B4-BE49-F238E27FC236}">
                 <a16:creationId xmlns:a16="http://schemas.microsoft.com/office/drawing/2014/main" id="{05DA7F6A-E2DB-AD7E-9EC1-E9EDCA01ABAF}"/>
@@ -19926,7 +19919,7 @@
           <p:nvPr/>
         </p:nvPicPr>
         <p:blipFill>
-          <a:blip r:embed="rId4"/>
+          <a:blip r:embed="rId5"/>
           <a:stretch>
             <a:fillRect/>
           </a:stretch>
@@ -19944,6 +19937,7 @@
       <p:pic>
         <p:nvPicPr>
           <p:cNvPr id="10" name="Imagen 9">
+            <a:hlinkClick r:id="rId6" action="ppaction://hlinkfile"/>
             <a:extLst>
               <a:ext uri="{FF2B5EF4-FFF2-40B4-BE49-F238E27FC236}">
                 <a16:creationId xmlns:a16="http://schemas.microsoft.com/office/drawing/2014/main" id="{E17B395A-2143-D3A2-597D-46779264084C}"/>
@@ -19956,7 +19950,7 @@
           <p:nvPr/>
         </p:nvPicPr>
         <p:blipFill>
-          <a:blip r:embed="rId5"/>
+          <a:blip r:embed="rId7"/>
           <a:stretch>
             <a:fillRect/>
           </a:stretch>
@@ -19974,6 +19968,7 @@
       <p:pic>
         <p:nvPicPr>
           <p:cNvPr id="11" name="Imagen 10">
+            <a:hlinkClick r:id="rId4" action="ppaction://hlinkfile"/>
             <a:extLst>
               <a:ext uri="{FF2B5EF4-FFF2-40B4-BE49-F238E27FC236}">
                 <a16:creationId xmlns:a16="http://schemas.microsoft.com/office/drawing/2014/main" id="{45ED8CA9-B613-1412-13F9-B35E5E8B170E}"/>
@@ -19986,7 +19981,7 @@
           <p:nvPr/>
         </p:nvPicPr>
         <p:blipFill>
-          <a:blip r:embed="rId6"/>
+          <a:blip r:embed="rId8"/>
           <a:stretch>
             <a:fillRect/>
           </a:stretch>
@@ -20004,6 +19999,7 @@
       <p:pic>
         <p:nvPicPr>
           <p:cNvPr id="12" name="Imagen 11">
+            <a:hlinkClick r:id="rId6" action="ppaction://hlinkfile"/>
             <a:extLst>
               <a:ext uri="{FF2B5EF4-FFF2-40B4-BE49-F238E27FC236}">
                 <a16:creationId xmlns:a16="http://schemas.microsoft.com/office/drawing/2014/main" id="{5EB696E6-E843-7E9B-0D32-7F91023A31DA}"/>
@@ -20016,7 +20012,7 @@
           <p:nvPr/>
         </p:nvPicPr>
         <p:blipFill>
-          <a:blip r:embed="rId7"/>
+          <a:blip r:embed="rId9"/>
           <a:stretch>
             <a:fillRect/>
           </a:stretch>
@@ -20046,7 +20042,7 @@
           <p:nvPr/>
         </p:nvPicPr>
         <p:blipFill>
-          <a:blip r:embed="rId8"/>
+          <a:blip r:embed="rId10"/>
           <a:stretch>
             <a:fillRect/>
           </a:stretch>
@@ -20190,72 +20186,6 @@
           </a:prstGeom>
         </p:spPr>
       </p:pic>
-      <p:pic>
-        <p:nvPicPr>
-          <p:cNvPr id="9" name="Imagen 8">
-            <a:extLst>
-              <a:ext uri="{FF2B5EF4-FFF2-40B4-BE49-F238E27FC236}">
-                <a16:creationId xmlns:a16="http://schemas.microsoft.com/office/drawing/2014/main" id="{4882F095-6EF3-3B53-7880-74CDA49B9415}"/>
-              </a:ext>
-            </a:extLst>
-          </p:cNvPr>
-          <p:cNvPicPr>
-            <a:picLocks noChangeAspect="1"/>
-          </p:cNvPicPr>
-          <p:nvPr/>
-        </p:nvPicPr>
-        <p:blipFill>
-          <a:blip r:embed="rId4"/>
-          <a:stretch>
-            <a:fillRect/>
-          </a:stretch>
-        </p:blipFill>
-        <p:spPr>
-          <a:xfrm>
-            <a:off x="456236" y="1714500"/>
-            <a:ext cx="4677428" cy="2038635"/>
-          </a:xfrm>
-          <a:prstGeom prst="rect">
-            <a:avLst/>
-          </a:prstGeom>
-        </p:spPr>
-      </p:pic>
-      <p:cxnSp>
-        <p:nvCxnSpPr>
-          <p:cNvPr id="10" name="Conector recto 9">
-            <a:extLst>
-              <a:ext uri="{FF2B5EF4-FFF2-40B4-BE49-F238E27FC236}">
-                <a16:creationId xmlns:a16="http://schemas.microsoft.com/office/drawing/2014/main" id="{60158B5D-95F2-DEAF-597F-A346ABC666BE}"/>
-              </a:ext>
-            </a:extLst>
-          </p:cNvPr>
-          <p:cNvCxnSpPr/>
-          <p:nvPr/>
-        </p:nvCxnSpPr>
-        <p:spPr>
-          <a:xfrm>
-            <a:off x="230981" y="4003221"/>
-            <a:ext cx="11730037" cy="0"/>
-          </a:xfrm>
-          <a:prstGeom prst="line">
-            <a:avLst/>
-          </a:prstGeom>
-        </p:spPr>
-        <p:style>
-          <a:lnRef idx="1">
-            <a:schemeClr val="accent1"/>
-          </a:lnRef>
-          <a:fillRef idx="0">
-            <a:schemeClr val="accent1"/>
-          </a:fillRef>
-          <a:effectRef idx="0">
-            <a:schemeClr val="accent1"/>
-          </a:effectRef>
-          <a:fontRef idx="minor">
-            <a:schemeClr val="tx1"/>
-          </a:fontRef>
-        </p:style>
-      </p:cxnSp>
       <p:cxnSp>
         <p:nvCxnSpPr>
           <p:cNvPr id="11" name="Conector recto 10">
@@ -20294,10 +20224,11 @@
       </p:cxnSp>
       <p:pic>
         <p:nvPicPr>
-          <p:cNvPr id="13" name="Imagen 12">
+          <p:cNvPr id="15" name="Imagen 14">
+            <a:hlinkClick r:id="rId4" action="ppaction://hlinkfile"/>
             <a:extLst>
               <a:ext uri="{FF2B5EF4-FFF2-40B4-BE49-F238E27FC236}">
-                <a16:creationId xmlns:a16="http://schemas.microsoft.com/office/drawing/2014/main" id="{EC8F6929-4A61-43E2-9028-6184E07734CE}"/>
+                <a16:creationId xmlns:a16="http://schemas.microsoft.com/office/drawing/2014/main" id="{C4E34EBD-165D-BC55-9FFB-0B58C92B49F3}"/>
               </a:ext>
             </a:extLst>
           </p:cNvPr>
@@ -20308,15 +20239,14 @@
         </p:nvPicPr>
         <p:blipFill>
           <a:blip r:embed="rId5"/>
-          <a:srcRect r="6916"/>
           <a:stretch>
             <a:fillRect/>
           </a:stretch>
         </p:blipFill>
         <p:spPr>
           <a:xfrm>
-            <a:off x="6143961" y="1611228"/>
-            <a:ext cx="5817057" cy="2276793"/>
+            <a:off x="5898575" y="2809117"/>
+            <a:ext cx="5796427" cy="2477034"/>
           </a:xfrm>
           <a:prstGeom prst="rect">
             <a:avLst/>
@@ -20325,10 +20255,11 @@
       </p:pic>
       <p:pic>
         <p:nvPicPr>
-          <p:cNvPr id="15" name="Imagen 14">
+          <p:cNvPr id="17" name="Imagen 16">
+            <a:hlinkClick r:id="rId4" action="ppaction://hlinkfile"/>
             <a:extLst>
               <a:ext uri="{FF2B5EF4-FFF2-40B4-BE49-F238E27FC236}">
-                <a16:creationId xmlns:a16="http://schemas.microsoft.com/office/drawing/2014/main" id="{C4E34EBD-165D-BC55-9FFB-0B58C92B49F3}"/>
+                <a16:creationId xmlns:a16="http://schemas.microsoft.com/office/drawing/2014/main" id="{2B610256-A0D4-344A-840B-DDAED833F642}"/>
               </a:ext>
             </a:extLst>
           </p:cNvPr>
@@ -20345,38 +20276,8 @@
         </p:blipFill>
         <p:spPr>
           <a:xfrm>
-            <a:off x="5983650" y="4169474"/>
-            <a:ext cx="5796427" cy="2477034"/>
-          </a:xfrm>
-          <a:prstGeom prst="rect">
-            <a:avLst/>
-          </a:prstGeom>
-        </p:spPr>
-      </p:pic>
-      <p:pic>
-        <p:nvPicPr>
-          <p:cNvPr id="17" name="Imagen 16">
-            <a:extLst>
-              <a:ext uri="{FF2B5EF4-FFF2-40B4-BE49-F238E27FC236}">
-                <a16:creationId xmlns:a16="http://schemas.microsoft.com/office/drawing/2014/main" id="{2B610256-A0D4-344A-840B-DDAED833F642}"/>
-              </a:ext>
-            </a:extLst>
-          </p:cNvPr>
-          <p:cNvPicPr>
-            <a:picLocks noChangeAspect="1"/>
-          </p:cNvPicPr>
-          <p:nvPr/>
-        </p:nvPicPr>
-        <p:blipFill>
-          <a:blip r:embed="rId7"/>
-          <a:stretch>
-            <a:fillRect/>
-          </a:stretch>
-        </p:blipFill>
-        <p:spPr>
-          <a:xfrm>
-            <a:off x="48864" y="4332082"/>
-            <a:ext cx="5572903" cy="1762371"/>
+            <a:off x="133939" y="3014804"/>
+            <a:ext cx="5572903" cy="2065661"/>
           </a:xfrm>
           <a:prstGeom prst="rect">
             <a:avLst/>
@@ -20653,18 +20554,6 @@
               <a:buFont typeface="Arial" panose="020B0604020202020204"/>
               <a:buNone/>
             </a:pPr>
-            <a:r>
-              <a:rPr lang="es-CO" sz="1600" b="1" i="0" u="none" strike="noStrike" cap="none" dirty="0">
-                <a:solidFill>
-                  <a:schemeClr val="dk1"/>
-                </a:solidFill>
-                <a:latin typeface="Calibri" panose="020F0502020204030204"/>
-                <a:ea typeface="Calibri" panose="020F0502020204030204"/>
-                <a:cs typeface="Calibri" panose="020F0502020204030204"/>
-                <a:sym typeface="Calibri" panose="020F0502020204030204"/>
-              </a:rPr>
-              <a:t/>
-            </a:r>
             <a:br>
               <a:rPr lang="es-CO" sz="1600" b="1" i="0" u="none" strike="noStrike" cap="none" dirty="0">
                 <a:solidFill>
@@ -20837,64 +20726,6 @@
           </a:p>
         </p:txBody>
       </p:sp>
-      <p:sp>
-        <p:nvSpPr>
-          <p:cNvPr id="4" name="Google Shape;121;p15"/>
-          <p:cNvSpPr txBox="1"/>
-          <p:nvPr/>
-        </p:nvSpPr>
-        <p:spPr>
-          <a:xfrm>
-            <a:off x="1075765" y="2435839"/>
-            <a:ext cx="7342094" cy="369332"/>
-          </a:xfrm>
-          <a:prstGeom prst="rect">
-            <a:avLst/>
-          </a:prstGeom>
-          <a:noFill/>
-          <a:ln>
-            <a:noFill/>
-          </a:ln>
-        </p:spPr>
-        <p:txBody>
-          <a:bodyPr spcFirstLastPara="1" wrap="square" lIns="91425" tIns="45700" rIns="91425" bIns="45700" anchor="t" anchorCtr="0">
-            <a:spAutoFit/>
-          </a:bodyPr>
-          <a:lstStyle/>
-          <a:p>
-            <a:pPr marL="0" marR="0" lvl="0" indent="0" algn="l" rtl="0">
-              <a:spcBef>
-                <a:spcPts val="0"/>
-              </a:spcBef>
-              <a:spcAft>
-                <a:spcPts val="0"/>
-              </a:spcAft>
-              <a:buNone/>
-            </a:pPr>
-            <a:r>
-              <a:rPr lang="es-ES" sz="1800" dirty="0">
-                <a:solidFill>
-                  <a:schemeClr val="dk1"/>
-                </a:solidFill>
-                <a:latin typeface="Calibri" panose="020F0502020204030204"/>
-                <a:ea typeface="Calibri" panose="020F0502020204030204"/>
-                <a:cs typeface="Calibri" panose="020F0502020204030204"/>
-                <a:sym typeface="Calibri" panose="020F0502020204030204"/>
-              </a:rPr>
-              <a:t>Insertar imagen de la interfaz de inicio del software</a:t>
-            </a:r>
-            <a:endParaRPr sz="1800" dirty="0">
-              <a:solidFill>
-                <a:schemeClr val="dk1"/>
-              </a:solidFill>
-              <a:latin typeface="Calibri" panose="020F0502020204030204"/>
-              <a:ea typeface="Calibri" panose="020F0502020204030204"/>
-              <a:cs typeface="Calibri" panose="020F0502020204030204"/>
-              <a:sym typeface="Calibri" panose="020F0502020204030204"/>
-            </a:endParaRPr>
-          </a:p>
-        </p:txBody>
-      </p:sp>
       <p:pic>
         <p:nvPicPr>
           <p:cNvPr id="3" name="Picture 2">
@@ -20919,6 +20750,37 @@
           <a:xfrm>
             <a:off x="133939" y="110481"/>
             <a:ext cx="2390775" cy="1064444"/>
+          </a:xfrm>
+          <a:prstGeom prst="rect">
+            <a:avLst/>
+          </a:prstGeom>
+        </p:spPr>
+      </p:pic>
+      <p:pic>
+        <p:nvPicPr>
+          <p:cNvPr id="6" name="Imagen 5">
+            <a:hlinkClick r:id="rId4" action="ppaction://hlinkfile"/>
+            <a:extLst>
+              <a:ext uri="{FF2B5EF4-FFF2-40B4-BE49-F238E27FC236}">
+                <a16:creationId xmlns:a16="http://schemas.microsoft.com/office/drawing/2014/main" id="{66401D4C-B4FD-E5C1-5CA4-98BF86EC99D7}"/>
+              </a:ext>
+            </a:extLst>
+          </p:cNvPr>
+          <p:cNvPicPr>
+            <a:picLocks noChangeAspect="1"/>
+          </p:cNvPicPr>
+          <p:nvPr/>
+        </p:nvPicPr>
+        <p:blipFill>
+          <a:blip r:embed="rId5"/>
+          <a:stretch>
+            <a:fillRect/>
+          </a:stretch>
+        </p:blipFill>
+        <p:spPr>
+          <a:xfrm>
+            <a:off x="724277" y="1682655"/>
+            <a:ext cx="10091596" cy="4822300"/>
           </a:xfrm>
           <a:prstGeom prst="rect">
             <a:avLst/>
@@ -22516,18 +22378,6 @@
               <a:buFont typeface="Arial" panose="020B0604020202020204"/>
               <a:buNone/>
             </a:pPr>
-            <a:r>
-              <a:rPr lang="es-CO" sz="1600" b="1" i="0" u="none" strike="noStrike" cap="none" dirty="0">
-                <a:solidFill>
-                  <a:schemeClr val="dk1"/>
-                </a:solidFill>
-                <a:latin typeface="Calibri" panose="020F0502020204030204"/>
-                <a:ea typeface="Calibri" panose="020F0502020204030204"/>
-                <a:cs typeface="Calibri" panose="020F0502020204030204"/>
-                <a:sym typeface="Calibri" panose="020F0502020204030204"/>
-              </a:rPr>
-              <a:t/>
-            </a:r>
             <a:br>
               <a:rPr lang="es-CO" sz="1600" b="1" i="0" u="none" strike="noStrike" cap="none" dirty="0">
                 <a:solidFill>
@@ -22862,6 +22712,37 @@
           <a:xfrm>
             <a:off x="133939" y="110481"/>
             <a:ext cx="2390775" cy="1064444"/>
+          </a:xfrm>
+          <a:prstGeom prst="rect">
+            <a:avLst/>
+          </a:prstGeom>
+        </p:spPr>
+      </p:pic>
+      <p:pic>
+        <p:nvPicPr>
+          <p:cNvPr id="6" name="Imagen 5" descr="Diagrama, Esquemático&#10;&#10;El contenido generado por IA puede ser incorrecto.">
+            <a:hlinkClick r:id="rId4" action="ppaction://hlinkfile"/>
+            <a:extLst>
+              <a:ext uri="{FF2B5EF4-FFF2-40B4-BE49-F238E27FC236}">
+                <a16:creationId xmlns:a16="http://schemas.microsoft.com/office/drawing/2014/main" id="{61A78BCB-528C-1E70-4538-AC5523479D71}"/>
+              </a:ext>
+            </a:extLst>
+          </p:cNvPr>
+          <p:cNvPicPr>
+            <a:picLocks noChangeAspect="1"/>
+          </p:cNvPicPr>
+          <p:nvPr/>
+        </p:nvPicPr>
+        <p:blipFill>
+          <a:blip r:embed="rId5"/>
+          <a:stretch>
+            <a:fillRect/>
+          </a:stretch>
+        </p:blipFill>
+        <p:spPr>
+          <a:xfrm>
+            <a:off x="0" y="1825532"/>
+            <a:ext cx="12192000" cy="3842204"/>
           </a:xfrm>
           <a:prstGeom prst="rect">
             <a:avLst/>
@@ -23449,15 +23330,6 @@
 </file>
 
 <file path=customXml/item1.xml><?xml version="1.0" encoding="utf-8"?>
-<?mso-contentType ?>
-<FormTemplates xmlns="http://schemas.microsoft.com/sharepoint/v3/contenttype/forms">
-  <Display>DocumentLibraryForm</Display>
-  <Edit>DocumentLibraryForm</Edit>
-  <New>DocumentLibraryForm</New>
-</FormTemplates>
-</file>
-
-<file path=customXml/item2.xml><?xml version="1.0" encoding="utf-8"?>
 <p:properties xmlns:p="http://schemas.microsoft.com/office/2006/metadata/properties" xmlns:xsi="http://www.w3.org/2001/XMLSchema-instance" xmlns:pc="http://schemas.microsoft.com/office/infopath/2007/PartnerControls">
   <documentManagement>
     <TaxCatchAll xmlns="5d6dac1f-6572-46e6-8ac2-54aa885adc11" xsi:nil="true"/>
@@ -23466,6 +23338,15 @@
     </lcf76f155ced4ddcb4097134ff3c332f>
   </documentManagement>
 </p:properties>
+</file>
+
+<file path=customXml/item2.xml><?xml version="1.0" encoding="utf-8"?>
+<?mso-contentType ?>
+<FormTemplates xmlns="http://schemas.microsoft.com/sharepoint/v3/contenttype/forms">
+  <Display>DocumentLibraryForm</Display>
+  <Edit>DocumentLibraryForm</Edit>
+  <New>DocumentLibraryForm</New>
+</FormTemplates>
 </file>
 
 <file path=customXml/item3.xml><?xml version="1.0" encoding="utf-8"?>
@@ -23698,13 +23579,13 @@
 </file>
 
 <file path=customXml/itemProps1.xml><?xml version="1.0" encoding="utf-8"?>
-<ds:datastoreItem xmlns:ds="http://schemas.openxmlformats.org/officeDocument/2006/customXml" ds:itemID="{C020FF02-1FE7-4B92-A947-88F847DE8F80}">
+<ds:datastoreItem xmlns:ds="http://schemas.openxmlformats.org/officeDocument/2006/customXml" ds:itemID="{091B3500-55FD-47A2-B150-4704A4114CB7}">
   <ds:schemaRefs/>
 </ds:datastoreItem>
 </file>
 
 <file path=customXml/itemProps2.xml><?xml version="1.0" encoding="utf-8"?>
-<ds:datastoreItem xmlns:ds="http://schemas.openxmlformats.org/officeDocument/2006/customXml" ds:itemID="{091B3500-55FD-47A2-B150-4704A4114CB7}">
+<ds:datastoreItem xmlns:ds="http://schemas.openxmlformats.org/officeDocument/2006/customXml" ds:itemID="{C020FF02-1FE7-4B92-A947-88F847DE8F80}">
   <ds:schemaRefs/>
 </ds:datastoreItem>
 </file>

</xml_diff>

<commit_message>
Docs: se corrige la imagen del MER
</commit_message>
<xml_diff>
--- a/Arquitectura de software/L-MACK/SUTENTACION 3B L-MACK.pptx
+++ b/Arquitectura de software/L-MACK/SUTENTACION 3B L-MACK.pptx
@@ -19325,8 +19325,13 @@
       </p:pic>
       <p:pic>
         <p:nvPicPr>
-          <p:cNvPr id="2" name="Imagen 1">
+          <p:cNvPr id="5" name="Imagen 4" descr="Diagrama&#10;&#10;El contenido generado por IA puede ser incorrecto.">
             <a:hlinkClick r:id="rId4" action="ppaction://hlinkfile"/>
+            <a:extLst>
+              <a:ext uri="{FF2B5EF4-FFF2-40B4-BE49-F238E27FC236}">
+                <a16:creationId xmlns:a16="http://schemas.microsoft.com/office/drawing/2014/main" id="{A3D56ECC-FFA2-2143-6ABC-AE7BE023D3FE}"/>
+              </a:ext>
+            </a:extLst>
           </p:cNvPr>
           <p:cNvPicPr>
             <a:picLocks noChangeAspect="1"/>
@@ -19341,8 +19346,8 @@
         </p:blipFill>
         <p:spPr>
           <a:xfrm>
-            <a:off x="2793508" y="1712843"/>
-            <a:ext cx="6108121" cy="4696958"/>
+            <a:off x="2513714" y="1558336"/>
+            <a:ext cx="7164571" cy="5299664"/>
           </a:xfrm>
           <a:prstGeom prst="rect">
             <a:avLst/>

</xml_diff>

<commit_message>
Docs: Gracias a abaunza cambie esta mrd por tercera vez
</commit_message>
<xml_diff>
--- a/Arquitectura de software/L-MACK/SUTENTACION 3B L-MACK.pptx
+++ b/Arquitectura de software/L-MACK/SUTENTACION 3B L-MACK.pptx
@@ -18809,11 +18809,11 @@
       </p:pic>
       <p:pic>
         <p:nvPicPr>
-          <p:cNvPr id="4" name="Imagen 3" descr="Diagrama&#10;&#10;El contenido generado por IA puede ser incorrecto.">
+          <p:cNvPr id="7" name="Imagen 6" descr="Diagrama&#10;&#10;El contenido generado por IA puede ser incorrecto.">
             <a:hlinkClick r:id="rId4" action="ppaction://hlinkfile"/>
             <a:extLst>
               <a:ext uri="{FF2B5EF4-FFF2-40B4-BE49-F238E27FC236}">
-                <a16:creationId xmlns:a16="http://schemas.microsoft.com/office/drawing/2014/main" id="{7C8222F6-8FBA-0332-70C9-43E4BBB9FA07}"/>
+                <a16:creationId xmlns:a16="http://schemas.microsoft.com/office/drawing/2014/main" id="{393D4175-8D17-0140-03EC-B9E2B4DAC0F5}"/>
               </a:ext>
             </a:extLst>
           </p:cNvPr>
@@ -18830,8 +18830,8 @@
         </p:blipFill>
         <p:spPr>
           <a:xfrm>
-            <a:off x="1556623" y="1738618"/>
-            <a:ext cx="8563061" cy="5008901"/>
+            <a:off x="1164658" y="1632702"/>
+            <a:ext cx="9740766" cy="5114817"/>
           </a:xfrm>
           <a:prstGeom prst="rect">
             <a:avLst/>

</xml_diff>

<commit_message>
Docs: se corrige codigo de estilos y agregan mascotas y otras cosas
</commit_message>
<xml_diff>
--- a/Arquitectura de software/L-MACK/SUTENTACION 3B L-MACK.pptx
+++ b/Arquitectura de software/L-MACK/SUTENTACION 3B L-MACK.pptx
@@ -18658,10 +18658,10 @@
       </p:grpSpPr>
       <p:pic>
         <p:nvPicPr>
-          <p:cNvPr id="10" name="Picture 9">
+          <p:cNvPr id="5" name="Imagen 4">
             <a:extLst>
               <a:ext uri="{FF2B5EF4-FFF2-40B4-BE49-F238E27FC236}">
-                <a16:creationId xmlns:a16="http://schemas.microsoft.com/office/drawing/2014/main" id="{302B676E-5DD5-4FA9-A072-0A63C7B4C8F5}"/>
+                <a16:creationId xmlns:a16="http://schemas.microsoft.com/office/drawing/2014/main" id="{F3C5A044-302A-775C-F0D3-73731780A34C}"/>
               </a:ext>
             </a:extLst>
           </p:cNvPr>
@@ -18678,8 +18678,8 @@
         </p:blipFill>
         <p:spPr>
           <a:xfrm>
-            <a:off x="2390775" y="1739900"/>
-            <a:ext cx="7410450" cy="3048000"/>
+            <a:off x="3520208" y="1410199"/>
+            <a:ext cx="4763165" cy="3115110"/>
           </a:xfrm>
           <a:prstGeom prst="rect">
             <a:avLst/>
@@ -18779,10 +18779,11 @@
       </p:sp>
       <p:pic>
         <p:nvPicPr>
-          <p:cNvPr id="2" name="Picture 1">
+          <p:cNvPr id="7" name="Imagen 6" descr="Diagrama&#10;&#10;El contenido generado por IA puede ser incorrecto.">
+            <a:hlinkClick r:id="rId3" action="ppaction://hlinkfile"/>
             <a:extLst>
               <a:ext uri="{FF2B5EF4-FFF2-40B4-BE49-F238E27FC236}">
-                <a16:creationId xmlns:a16="http://schemas.microsoft.com/office/drawing/2014/main" id="{C5CD02CD-1E0E-810B-1415-13FF63450108}"/>
+                <a16:creationId xmlns:a16="http://schemas.microsoft.com/office/drawing/2014/main" id="{393D4175-8D17-0140-03EC-B9E2B4DAC0F5}"/>
               </a:ext>
             </a:extLst>
           </p:cNvPr>
@@ -18792,15 +18793,15 @@
           <p:nvPr/>
         </p:nvPicPr>
         <p:blipFill>
-          <a:blip r:embed="rId3"/>
+          <a:blip r:embed="rId4"/>
           <a:stretch>
             <a:fillRect/>
           </a:stretch>
         </p:blipFill>
         <p:spPr>
           <a:xfrm>
-            <a:off x="133939" y="110481"/>
-            <a:ext cx="2390775" cy="1064444"/>
+            <a:off x="1164658" y="1632702"/>
+            <a:ext cx="9740766" cy="5114817"/>
           </a:xfrm>
           <a:prstGeom prst="rect">
             <a:avLst/>
@@ -18809,11 +18810,10 @@
       </p:pic>
       <p:pic>
         <p:nvPicPr>
-          <p:cNvPr id="7" name="Imagen 6" descr="Diagrama&#10;&#10;El contenido generado por IA puede ser incorrecto.">
-            <a:hlinkClick r:id="rId4" action="ppaction://hlinkfile"/>
+          <p:cNvPr id="3" name="Imagen 2">
             <a:extLst>
               <a:ext uri="{FF2B5EF4-FFF2-40B4-BE49-F238E27FC236}">
-                <a16:creationId xmlns:a16="http://schemas.microsoft.com/office/drawing/2014/main" id="{393D4175-8D17-0140-03EC-B9E2B4DAC0F5}"/>
+                <a16:creationId xmlns:a16="http://schemas.microsoft.com/office/drawing/2014/main" id="{9EF12939-2124-679D-AFE8-BD2B39339E66}"/>
               </a:ext>
             </a:extLst>
           </p:cNvPr>
@@ -18830,8 +18830,8 @@
         </p:blipFill>
         <p:spPr>
           <a:xfrm>
-            <a:off x="1164658" y="1632702"/>
-            <a:ext cx="9740766" cy="5114817"/>
+            <a:off x="-124191" y="173677"/>
+            <a:ext cx="2010140" cy="1262367"/>
           </a:xfrm>
           <a:prstGeom prst="rect">
             <a:avLst/>
@@ -18984,12 +18984,8 @@
       </p:sp>
       <p:pic>
         <p:nvPicPr>
-          <p:cNvPr id="3" name="Picture 2">
-            <a:extLst>
-              <a:ext uri="{FF2B5EF4-FFF2-40B4-BE49-F238E27FC236}">
-                <a16:creationId xmlns:a16="http://schemas.microsoft.com/office/drawing/2014/main" id="{5644AD12-B1B1-2D6B-386A-EC23217E09D0}"/>
-              </a:ext>
-            </a:extLst>
+          <p:cNvPr id="4" name="Imagen 3">
+            <a:hlinkClick r:id="rId3" action="ppaction://hlinkfile"/>
           </p:cNvPr>
           <p:cNvPicPr>
             <a:picLocks noChangeAspect="1"/>
@@ -18997,15 +18993,15 @@
           <p:nvPr/>
         </p:nvPicPr>
         <p:blipFill>
-          <a:blip r:embed="rId3"/>
+          <a:blip r:embed="rId4"/>
           <a:stretch>
             <a:fillRect/>
           </a:stretch>
         </p:blipFill>
         <p:spPr>
           <a:xfrm>
-            <a:off x="133939" y="110481"/>
-            <a:ext cx="2390775" cy="1064444"/>
+            <a:off x="1800179" y="1529659"/>
+            <a:ext cx="9271772" cy="4881110"/>
           </a:xfrm>
           <a:prstGeom prst="rect">
             <a:avLst/>
@@ -19014,8 +19010,12 @@
       </p:pic>
       <p:pic>
         <p:nvPicPr>
-          <p:cNvPr id="4" name="Imagen 3">
-            <a:hlinkClick r:id="rId4" action="ppaction://hlinkfile"/>
+          <p:cNvPr id="6" name="Imagen 5">
+            <a:extLst>
+              <a:ext uri="{FF2B5EF4-FFF2-40B4-BE49-F238E27FC236}">
+                <a16:creationId xmlns:a16="http://schemas.microsoft.com/office/drawing/2014/main" id="{89C95C1C-4BCF-B484-F6F2-7702CF0B90F4}"/>
+              </a:ext>
+            </a:extLst>
           </p:cNvPr>
           <p:cNvPicPr>
             <a:picLocks noChangeAspect="1"/>
@@ -19030,8 +19030,8 @@
         </p:blipFill>
         <p:spPr>
           <a:xfrm>
-            <a:off x="1800179" y="1529659"/>
-            <a:ext cx="9271772" cy="4881110"/>
+            <a:off x="-124191" y="173677"/>
+            <a:ext cx="2010140" cy="1262367"/>
           </a:xfrm>
           <a:prstGeom prst="rect">
             <a:avLst/>
@@ -19295,10 +19295,11 @@
       </p:sp>
       <p:pic>
         <p:nvPicPr>
-          <p:cNvPr id="4" name="Picture 3">
+          <p:cNvPr id="5" name="Imagen 4" descr="Diagrama&#10;&#10;El contenido generado por IA puede ser incorrecto.">
+            <a:hlinkClick r:id="rId3" action="ppaction://hlinkfile"/>
             <a:extLst>
               <a:ext uri="{FF2B5EF4-FFF2-40B4-BE49-F238E27FC236}">
-                <a16:creationId xmlns:a16="http://schemas.microsoft.com/office/drawing/2014/main" id="{322293AE-F682-E3C6-D428-6E4BFA92C481}"/>
+                <a16:creationId xmlns:a16="http://schemas.microsoft.com/office/drawing/2014/main" id="{A3D56ECC-FFA2-2143-6ABC-AE7BE023D3FE}"/>
               </a:ext>
             </a:extLst>
           </p:cNvPr>
@@ -19308,15 +19309,15 @@
           <p:nvPr/>
         </p:nvPicPr>
         <p:blipFill>
-          <a:blip r:embed="rId3"/>
+          <a:blip r:embed="rId4"/>
           <a:stretch>
             <a:fillRect/>
           </a:stretch>
         </p:blipFill>
         <p:spPr>
           <a:xfrm>
-            <a:off x="133939" y="110481"/>
-            <a:ext cx="2390775" cy="1064444"/>
+            <a:off x="2513714" y="1558336"/>
+            <a:ext cx="7164571" cy="5299664"/>
           </a:xfrm>
           <a:prstGeom prst="rect">
             <a:avLst/>
@@ -19325,11 +19326,10 @@
       </p:pic>
       <p:pic>
         <p:nvPicPr>
-          <p:cNvPr id="5" name="Imagen 4" descr="Diagrama&#10;&#10;El contenido generado por IA puede ser incorrecto.">
-            <a:hlinkClick r:id="rId4" action="ppaction://hlinkfile"/>
+          <p:cNvPr id="2" name="Imagen 1">
             <a:extLst>
               <a:ext uri="{FF2B5EF4-FFF2-40B4-BE49-F238E27FC236}">
-                <a16:creationId xmlns:a16="http://schemas.microsoft.com/office/drawing/2014/main" id="{A3D56ECC-FFA2-2143-6ABC-AE7BE023D3FE}"/>
+                <a16:creationId xmlns:a16="http://schemas.microsoft.com/office/drawing/2014/main" id="{8FD47C7E-E02B-79B5-F5D8-852A26EC7F9C}"/>
               </a:ext>
             </a:extLst>
           </p:cNvPr>
@@ -19346,8 +19346,8 @@
         </p:blipFill>
         <p:spPr>
           <a:xfrm>
-            <a:off x="2513714" y="1558336"/>
-            <a:ext cx="7164571" cy="5299664"/>
+            <a:off x="-124191" y="173677"/>
+            <a:ext cx="2010140" cy="1262367"/>
           </a:xfrm>
           <a:prstGeom prst="rect">
             <a:avLst/>
@@ -19453,36 +19453,6 @@
           </a:p>
         </p:txBody>
       </p:sp>
-      <p:pic>
-        <p:nvPicPr>
-          <p:cNvPr id="2" name="Picture 1">
-            <a:extLst>
-              <a:ext uri="{FF2B5EF4-FFF2-40B4-BE49-F238E27FC236}">
-                <a16:creationId xmlns:a16="http://schemas.microsoft.com/office/drawing/2014/main" id="{50BE3E11-336E-26B1-4597-2AACA5E30CC4}"/>
-              </a:ext>
-            </a:extLst>
-          </p:cNvPr>
-          <p:cNvPicPr>
-            <a:picLocks noChangeAspect="1"/>
-          </p:cNvPicPr>
-          <p:nvPr/>
-        </p:nvPicPr>
-        <p:blipFill>
-          <a:blip r:embed="rId3"/>
-          <a:stretch>
-            <a:fillRect/>
-          </a:stretch>
-        </p:blipFill>
-        <p:spPr>
-          <a:xfrm>
-            <a:off x="133939" y="110481"/>
-            <a:ext cx="2390775" cy="1064444"/>
-          </a:xfrm>
-          <a:prstGeom prst="rect">
-            <a:avLst/>
-          </a:prstGeom>
-        </p:spPr>
-      </p:pic>
       <p:cxnSp>
         <p:nvCxnSpPr>
           <p:cNvPr id="7" name="Conector recto 6">
@@ -19558,7 +19528,7 @@
       <p:pic>
         <p:nvPicPr>
           <p:cNvPr id="13" name="Imagen 12">
-            <a:hlinkClick r:id="rId4" action="ppaction://hlinkfile"/>
+            <a:hlinkClick r:id="rId3" action="ppaction://hlinkfile"/>
             <a:extLst>
               <a:ext uri="{FF2B5EF4-FFF2-40B4-BE49-F238E27FC236}">
                 <a16:creationId xmlns:a16="http://schemas.microsoft.com/office/drawing/2014/main" id="{D3EB645E-AF94-FB4D-C9D7-F365960646B6}"/>
@@ -19571,7 +19541,7 @@
           <p:nvPr/>
         </p:nvPicPr>
         <p:blipFill>
-          <a:blip r:embed="rId5"/>
+          <a:blip r:embed="rId4"/>
           <a:stretch>
             <a:fillRect/>
           </a:stretch>
@@ -19589,7 +19559,7 @@
       <p:pic>
         <p:nvPicPr>
           <p:cNvPr id="15" name="Imagen 14">
-            <a:hlinkClick r:id="rId4" action="ppaction://hlinkfile"/>
+            <a:hlinkClick r:id="rId3" action="ppaction://hlinkfile"/>
             <a:extLst>
               <a:ext uri="{FF2B5EF4-FFF2-40B4-BE49-F238E27FC236}">
                 <a16:creationId xmlns:a16="http://schemas.microsoft.com/office/drawing/2014/main" id="{CD0D1FA8-8F2E-2108-B523-BFF0D41BF07E}"/>
@@ -19602,7 +19572,7 @@
           <p:nvPr/>
         </p:nvPicPr>
         <p:blipFill>
-          <a:blip r:embed="rId6"/>
+          <a:blip r:embed="rId5"/>
           <a:stretch>
             <a:fillRect/>
           </a:stretch>
@@ -19620,7 +19590,7 @@
       <p:pic>
         <p:nvPicPr>
           <p:cNvPr id="19" name="Imagen 18">
-            <a:hlinkClick r:id="rId4" action="ppaction://hlinkfile"/>
+            <a:hlinkClick r:id="rId3" action="ppaction://hlinkfile"/>
             <a:extLst>
               <a:ext uri="{FF2B5EF4-FFF2-40B4-BE49-F238E27FC236}">
                 <a16:creationId xmlns:a16="http://schemas.microsoft.com/office/drawing/2014/main" id="{7524FF55-9C69-892C-B9FB-072CCF224E48}"/>
@@ -19633,7 +19603,7 @@
           <p:nvPr/>
         </p:nvPicPr>
         <p:blipFill>
-          <a:blip r:embed="rId7"/>
+          <a:blip r:embed="rId6"/>
           <a:stretch>
             <a:fillRect/>
           </a:stretch>
@@ -19651,10 +19621,40 @@
       <p:pic>
         <p:nvPicPr>
           <p:cNvPr id="21" name="Imagen 20">
-            <a:hlinkClick r:id="rId4" action="ppaction://hlinkfile"/>
+            <a:hlinkClick r:id="rId3" action="ppaction://hlinkfile"/>
             <a:extLst>
               <a:ext uri="{FF2B5EF4-FFF2-40B4-BE49-F238E27FC236}">
                 <a16:creationId xmlns:a16="http://schemas.microsoft.com/office/drawing/2014/main" id="{EC0DE956-9BBE-5205-A956-DAA1899E0BFE}"/>
+              </a:ext>
+            </a:extLst>
+          </p:cNvPr>
+          <p:cNvPicPr>
+            <a:picLocks noChangeAspect="1"/>
+          </p:cNvPicPr>
+          <p:nvPr/>
+        </p:nvPicPr>
+        <p:blipFill>
+          <a:blip r:embed="rId7"/>
+          <a:stretch>
+            <a:fillRect/>
+          </a:stretch>
+        </p:blipFill>
+        <p:spPr>
+          <a:xfrm>
+            <a:off x="6921714" y="4329236"/>
+            <a:ext cx="4782217" cy="676369"/>
+          </a:xfrm>
+          <a:prstGeom prst="rect">
+            <a:avLst/>
+          </a:prstGeom>
+        </p:spPr>
+      </p:pic>
+      <p:pic>
+        <p:nvPicPr>
+          <p:cNvPr id="3" name="Imagen 2">
+            <a:extLst>
+              <a:ext uri="{FF2B5EF4-FFF2-40B4-BE49-F238E27FC236}">
+                <a16:creationId xmlns:a16="http://schemas.microsoft.com/office/drawing/2014/main" id="{57462658-F50C-EDC7-FF67-7755DF6ED321}"/>
               </a:ext>
             </a:extLst>
           </p:cNvPr>
@@ -19671,8 +19671,8 @@
         </p:blipFill>
         <p:spPr>
           <a:xfrm>
-            <a:off x="6921714" y="4329236"/>
-            <a:ext cx="4782217" cy="676369"/>
+            <a:off x="-124191" y="173677"/>
+            <a:ext cx="2010140" cy="1262367"/>
           </a:xfrm>
           <a:prstGeom prst="rect">
             <a:avLst/>
@@ -19806,36 +19806,6 @@
           </a:p>
         </p:txBody>
       </p:sp>
-      <p:pic>
-        <p:nvPicPr>
-          <p:cNvPr id="3" name="Picture 2">
-            <a:extLst>
-              <a:ext uri="{FF2B5EF4-FFF2-40B4-BE49-F238E27FC236}">
-                <a16:creationId xmlns:a16="http://schemas.microsoft.com/office/drawing/2014/main" id="{FC31B808-0FE4-9629-B2C6-95861CA27680}"/>
-              </a:ext>
-            </a:extLst>
-          </p:cNvPr>
-          <p:cNvPicPr>
-            <a:picLocks noChangeAspect="1"/>
-          </p:cNvPicPr>
-          <p:nvPr/>
-        </p:nvPicPr>
-        <p:blipFill>
-          <a:blip r:embed="rId3"/>
-          <a:stretch>
-            <a:fillRect/>
-          </a:stretch>
-        </p:blipFill>
-        <p:spPr>
-          <a:xfrm>
-            <a:off x="133939" y="110481"/>
-            <a:ext cx="2390775" cy="1064444"/>
-          </a:xfrm>
-          <a:prstGeom prst="rect">
-            <a:avLst/>
-          </a:prstGeom>
-        </p:spPr>
-      </p:pic>
       <p:cxnSp>
         <p:nvCxnSpPr>
           <p:cNvPr id="5" name="Conector recto 4">
@@ -19911,7 +19881,7 @@
       <p:pic>
         <p:nvPicPr>
           <p:cNvPr id="8" name="Imagen 7">
-            <a:hlinkClick r:id="rId4" action="ppaction://hlinkfile"/>
+            <a:hlinkClick r:id="rId3" action="ppaction://hlinkfile"/>
             <a:extLst>
               <a:ext uri="{FF2B5EF4-FFF2-40B4-BE49-F238E27FC236}">
                 <a16:creationId xmlns:a16="http://schemas.microsoft.com/office/drawing/2014/main" id="{05DA7F6A-E2DB-AD7E-9EC1-E9EDCA01ABAF}"/>
@@ -19924,7 +19894,7 @@
           <p:nvPr/>
         </p:nvPicPr>
         <p:blipFill>
-          <a:blip r:embed="rId5"/>
+          <a:blip r:embed="rId4"/>
           <a:stretch>
             <a:fillRect/>
           </a:stretch>
@@ -19942,7 +19912,7 @@
       <p:pic>
         <p:nvPicPr>
           <p:cNvPr id="10" name="Imagen 9">
-            <a:hlinkClick r:id="rId6" action="ppaction://hlinkfile"/>
+            <a:hlinkClick r:id="rId5" action="ppaction://hlinkfile"/>
             <a:extLst>
               <a:ext uri="{FF2B5EF4-FFF2-40B4-BE49-F238E27FC236}">
                 <a16:creationId xmlns:a16="http://schemas.microsoft.com/office/drawing/2014/main" id="{E17B395A-2143-D3A2-597D-46779264084C}"/>
@@ -19955,7 +19925,7 @@
           <p:nvPr/>
         </p:nvPicPr>
         <p:blipFill>
-          <a:blip r:embed="rId7"/>
+          <a:blip r:embed="rId6"/>
           <a:stretch>
             <a:fillRect/>
           </a:stretch>
@@ -19973,7 +19943,7 @@
       <p:pic>
         <p:nvPicPr>
           <p:cNvPr id="11" name="Imagen 10">
-            <a:hlinkClick r:id="rId4" action="ppaction://hlinkfile"/>
+            <a:hlinkClick r:id="rId3" action="ppaction://hlinkfile"/>
             <a:extLst>
               <a:ext uri="{FF2B5EF4-FFF2-40B4-BE49-F238E27FC236}">
                 <a16:creationId xmlns:a16="http://schemas.microsoft.com/office/drawing/2014/main" id="{45ED8CA9-B613-1412-13F9-B35E5E8B170E}"/>
@@ -19986,7 +19956,7 @@
           <p:nvPr/>
         </p:nvPicPr>
         <p:blipFill>
-          <a:blip r:embed="rId8"/>
+          <a:blip r:embed="rId7"/>
           <a:stretch>
             <a:fillRect/>
           </a:stretch>
@@ -20004,7 +19974,7 @@
       <p:pic>
         <p:nvPicPr>
           <p:cNvPr id="12" name="Imagen 11">
-            <a:hlinkClick r:id="rId6" action="ppaction://hlinkfile"/>
+            <a:hlinkClick r:id="rId5" action="ppaction://hlinkfile"/>
             <a:extLst>
               <a:ext uri="{FF2B5EF4-FFF2-40B4-BE49-F238E27FC236}">
                 <a16:creationId xmlns:a16="http://schemas.microsoft.com/office/drawing/2014/main" id="{5EB696E6-E843-7E9B-0D32-7F91023A31DA}"/>
@@ -20017,7 +19987,7 @@
           <p:nvPr/>
         </p:nvPicPr>
         <p:blipFill>
-          <a:blip r:embed="rId9"/>
+          <a:blip r:embed="rId8"/>
           <a:stretch>
             <a:fillRect/>
           </a:stretch>
@@ -20047,7 +20017,7 @@
           <p:nvPr/>
         </p:nvPicPr>
         <p:blipFill>
-          <a:blip r:embed="rId10"/>
+          <a:blip r:embed="rId9"/>
           <a:stretch>
             <a:fillRect/>
           </a:stretch>
@@ -20056,6 +20026,36 @@
           <a:xfrm>
             <a:off x="6462915" y="5685248"/>
             <a:ext cx="2219325" cy="619125"/>
+          </a:xfrm>
+          <a:prstGeom prst="rect">
+            <a:avLst/>
+          </a:prstGeom>
+        </p:spPr>
+      </p:pic>
+      <p:pic>
+        <p:nvPicPr>
+          <p:cNvPr id="4" name="Imagen 3">
+            <a:extLst>
+              <a:ext uri="{FF2B5EF4-FFF2-40B4-BE49-F238E27FC236}">
+                <a16:creationId xmlns:a16="http://schemas.microsoft.com/office/drawing/2014/main" id="{163A822F-506F-353B-A54B-242395D575C2}"/>
+              </a:ext>
+            </a:extLst>
+          </p:cNvPr>
+          <p:cNvPicPr>
+            <a:picLocks noChangeAspect="1"/>
+          </p:cNvPicPr>
+          <p:nvPr/>
+        </p:nvPicPr>
+        <p:blipFill>
+          <a:blip r:embed="rId10"/>
+          <a:stretch>
+            <a:fillRect/>
+          </a:stretch>
+        </p:blipFill>
+        <p:spPr>
+          <a:xfrm>
+            <a:off x="-124191" y="173677"/>
+            <a:ext cx="2010140" cy="1262367"/>
           </a:xfrm>
           <a:prstGeom prst="rect">
             <a:avLst/>
@@ -20161,36 +20161,6 @@
           </a:p>
         </p:txBody>
       </p:sp>
-      <p:pic>
-        <p:nvPicPr>
-          <p:cNvPr id="2" name="Picture 1">
-            <a:extLst>
-              <a:ext uri="{FF2B5EF4-FFF2-40B4-BE49-F238E27FC236}">
-                <a16:creationId xmlns:a16="http://schemas.microsoft.com/office/drawing/2014/main" id="{1EEF7DCD-9125-C941-5E32-CD6B8DAE0400}"/>
-              </a:ext>
-            </a:extLst>
-          </p:cNvPr>
-          <p:cNvPicPr>
-            <a:picLocks noChangeAspect="1"/>
-          </p:cNvPicPr>
-          <p:nvPr/>
-        </p:nvPicPr>
-        <p:blipFill>
-          <a:blip r:embed="rId3"/>
-          <a:stretch>
-            <a:fillRect/>
-          </a:stretch>
-        </p:blipFill>
-        <p:spPr>
-          <a:xfrm>
-            <a:off x="133939" y="110481"/>
-            <a:ext cx="2390775" cy="1064444"/>
-          </a:xfrm>
-          <a:prstGeom prst="rect">
-            <a:avLst/>
-          </a:prstGeom>
-        </p:spPr>
-      </p:pic>
       <p:cxnSp>
         <p:nvCxnSpPr>
           <p:cNvPr id="11" name="Conector recto 10">
@@ -20230,7 +20200,7 @@
       <p:pic>
         <p:nvPicPr>
           <p:cNvPr id="15" name="Imagen 14">
-            <a:hlinkClick r:id="rId4" action="ppaction://hlinkfile"/>
+            <a:hlinkClick r:id="rId3" action="ppaction://hlinkfile"/>
             <a:extLst>
               <a:ext uri="{FF2B5EF4-FFF2-40B4-BE49-F238E27FC236}">
                 <a16:creationId xmlns:a16="http://schemas.microsoft.com/office/drawing/2014/main" id="{C4E34EBD-165D-BC55-9FFB-0B58C92B49F3}"/>
@@ -20243,7 +20213,7 @@
           <p:nvPr/>
         </p:nvPicPr>
         <p:blipFill>
-          <a:blip r:embed="rId5"/>
+          <a:blip r:embed="rId4"/>
           <a:stretch>
             <a:fillRect/>
           </a:stretch>
@@ -20261,10 +20231,40 @@
       <p:pic>
         <p:nvPicPr>
           <p:cNvPr id="17" name="Imagen 16">
-            <a:hlinkClick r:id="rId4" action="ppaction://hlinkfile"/>
+            <a:hlinkClick r:id="rId3" action="ppaction://hlinkfile"/>
             <a:extLst>
               <a:ext uri="{FF2B5EF4-FFF2-40B4-BE49-F238E27FC236}">
                 <a16:creationId xmlns:a16="http://schemas.microsoft.com/office/drawing/2014/main" id="{2B610256-A0D4-344A-840B-DDAED833F642}"/>
+              </a:ext>
+            </a:extLst>
+          </p:cNvPr>
+          <p:cNvPicPr>
+            <a:picLocks noChangeAspect="1"/>
+          </p:cNvPicPr>
+          <p:nvPr/>
+        </p:nvPicPr>
+        <p:blipFill>
+          <a:blip r:embed="rId5"/>
+          <a:stretch>
+            <a:fillRect/>
+          </a:stretch>
+        </p:blipFill>
+        <p:spPr>
+          <a:xfrm>
+            <a:off x="133939" y="3014804"/>
+            <a:ext cx="5572903" cy="2065661"/>
+          </a:xfrm>
+          <a:prstGeom prst="rect">
+            <a:avLst/>
+          </a:prstGeom>
+        </p:spPr>
+      </p:pic>
+      <p:pic>
+        <p:nvPicPr>
+          <p:cNvPr id="3" name="Imagen 2">
+            <a:extLst>
+              <a:ext uri="{FF2B5EF4-FFF2-40B4-BE49-F238E27FC236}">
+                <a16:creationId xmlns:a16="http://schemas.microsoft.com/office/drawing/2014/main" id="{BEA9DC45-BC56-ADAA-8EF3-6BC3D97FE8A9}"/>
               </a:ext>
             </a:extLst>
           </p:cNvPr>
@@ -20281,8 +20281,8 @@
         </p:blipFill>
         <p:spPr>
           <a:xfrm>
-            <a:off x="133939" y="3014804"/>
-            <a:ext cx="5572903" cy="2065661"/>
+            <a:off x="-124191" y="173677"/>
+            <a:ext cx="2010140" cy="1262367"/>
           </a:xfrm>
           <a:prstGeom prst="rect">
             <a:avLst/>
@@ -20390,10 +20390,10 @@
       </p:sp>
       <p:pic>
         <p:nvPicPr>
-          <p:cNvPr id="2" name="Picture 1">
+          <p:cNvPr id="3" name="Imagen 2">
             <a:extLst>
               <a:ext uri="{FF2B5EF4-FFF2-40B4-BE49-F238E27FC236}">
-                <a16:creationId xmlns:a16="http://schemas.microsoft.com/office/drawing/2014/main" id="{C14FA39A-49F8-AF80-A15D-71D08DB19D4E}"/>
+                <a16:creationId xmlns:a16="http://schemas.microsoft.com/office/drawing/2014/main" id="{DB5587F2-B92A-2F3E-3E5D-007D0D09CF11}"/>
               </a:ext>
             </a:extLst>
           </p:cNvPr>
@@ -20410,8 +20410,8 @@
         </p:blipFill>
         <p:spPr>
           <a:xfrm>
-            <a:off x="133939" y="110481"/>
-            <a:ext cx="2390775" cy="1064444"/>
+            <a:off x="-124191" y="173677"/>
+            <a:ext cx="2010140" cy="1262367"/>
           </a:xfrm>
           <a:prstGeom prst="rect">
             <a:avLst/>
@@ -20584,10 +20584,10 @@
       </p:sp>
       <p:pic>
         <p:nvPicPr>
-          <p:cNvPr id="2" name="Picture 1">
+          <p:cNvPr id="4" name="Imagen 3">
             <a:extLst>
               <a:ext uri="{FF2B5EF4-FFF2-40B4-BE49-F238E27FC236}">
-                <a16:creationId xmlns:a16="http://schemas.microsoft.com/office/drawing/2014/main" id="{400DF7EA-62DA-2B77-14D6-6CD4EA1742C6}"/>
+                <a16:creationId xmlns:a16="http://schemas.microsoft.com/office/drawing/2014/main" id="{68D2B1AF-AD82-7836-E10D-03F16BD862F0}"/>
               </a:ext>
             </a:extLst>
           </p:cNvPr>
@@ -20604,8 +20604,8 @@
         </p:blipFill>
         <p:spPr>
           <a:xfrm>
-            <a:off x="133939" y="110481"/>
-            <a:ext cx="2390775" cy="1064444"/>
+            <a:off x="0" y="-233481"/>
+            <a:ext cx="2506836" cy="1639471"/>
           </a:xfrm>
           <a:prstGeom prst="rect">
             <a:avLst/>
@@ -20733,10 +20733,11 @@
       </p:sp>
       <p:pic>
         <p:nvPicPr>
-          <p:cNvPr id="3" name="Picture 2">
+          <p:cNvPr id="6" name="Imagen 5">
+            <a:hlinkClick r:id="rId3" action="ppaction://hlinkfile"/>
             <a:extLst>
               <a:ext uri="{FF2B5EF4-FFF2-40B4-BE49-F238E27FC236}">
-                <a16:creationId xmlns:a16="http://schemas.microsoft.com/office/drawing/2014/main" id="{14810B92-3112-3508-7B85-AAF0DAF5501D}"/>
+                <a16:creationId xmlns:a16="http://schemas.microsoft.com/office/drawing/2014/main" id="{66401D4C-B4FD-E5C1-5CA4-98BF86EC99D7}"/>
               </a:ext>
             </a:extLst>
           </p:cNvPr>
@@ -20746,15 +20747,15 @@
           <p:nvPr/>
         </p:nvPicPr>
         <p:blipFill>
-          <a:blip r:embed="rId3"/>
+          <a:blip r:embed="rId4"/>
           <a:stretch>
             <a:fillRect/>
           </a:stretch>
         </p:blipFill>
         <p:spPr>
           <a:xfrm>
-            <a:off x="133939" y="110481"/>
-            <a:ext cx="2390775" cy="1064444"/>
+            <a:off x="724277" y="1682655"/>
+            <a:ext cx="10091596" cy="4822300"/>
           </a:xfrm>
           <a:prstGeom prst="rect">
             <a:avLst/>
@@ -20763,11 +20764,10 @@
       </p:pic>
       <p:pic>
         <p:nvPicPr>
-          <p:cNvPr id="6" name="Imagen 5">
-            <a:hlinkClick r:id="rId4" action="ppaction://hlinkfile"/>
+          <p:cNvPr id="4" name="Imagen 3">
             <a:extLst>
               <a:ext uri="{FF2B5EF4-FFF2-40B4-BE49-F238E27FC236}">
-                <a16:creationId xmlns:a16="http://schemas.microsoft.com/office/drawing/2014/main" id="{66401D4C-B4FD-E5C1-5CA4-98BF86EC99D7}"/>
+                <a16:creationId xmlns:a16="http://schemas.microsoft.com/office/drawing/2014/main" id="{D67BCC69-3ACE-F15E-4CB2-54697E438BDA}"/>
               </a:ext>
             </a:extLst>
           </p:cNvPr>
@@ -20784,8 +20784,8 @@
         </p:blipFill>
         <p:spPr>
           <a:xfrm>
-            <a:off x="724277" y="1682655"/>
-            <a:ext cx="10091596" cy="4822300"/>
+            <a:off x="-124191" y="173677"/>
+            <a:ext cx="2010140" cy="1262367"/>
           </a:xfrm>
           <a:prstGeom prst="rect">
             <a:avLst/>
@@ -21133,10 +21133,10 @@
       </p:sp>
       <p:pic>
         <p:nvPicPr>
-          <p:cNvPr id="5" name="Picture 4">
+          <p:cNvPr id="4" name="Imagen 3">
             <a:extLst>
               <a:ext uri="{FF2B5EF4-FFF2-40B4-BE49-F238E27FC236}">
-                <a16:creationId xmlns:a16="http://schemas.microsoft.com/office/drawing/2014/main" id="{370C378A-27AB-FFE5-6C28-BD503B08F5A4}"/>
+                <a16:creationId xmlns:a16="http://schemas.microsoft.com/office/drawing/2014/main" id="{A59F4EDB-E6F8-E881-52FB-898885535A77}"/>
               </a:ext>
             </a:extLst>
           </p:cNvPr>
@@ -21153,8 +21153,8 @@
         </p:blipFill>
         <p:spPr>
           <a:xfrm>
-            <a:off x="223879" y="468044"/>
-            <a:ext cx="1831497" cy="754777"/>
+            <a:off x="89013" y="0"/>
+            <a:ext cx="1715512" cy="992765"/>
           </a:xfrm>
           <a:prstGeom prst="rect">
             <a:avLst/>
@@ -21215,10 +21215,10 @@
       </p:pic>
       <p:pic>
         <p:nvPicPr>
-          <p:cNvPr id="2" name="Picture 1">
+          <p:cNvPr id="3" name="Imagen 2">
             <a:extLst>
               <a:ext uri="{FF2B5EF4-FFF2-40B4-BE49-F238E27FC236}">
-                <a16:creationId xmlns:a16="http://schemas.microsoft.com/office/drawing/2014/main" id="{E6FCDC0F-4BE9-F905-3EBA-462A39D98304}"/>
+                <a16:creationId xmlns:a16="http://schemas.microsoft.com/office/drawing/2014/main" id="{C7458952-20AD-6366-4FD6-9E7B93C992B9}"/>
               </a:ext>
             </a:extLst>
           </p:cNvPr>
@@ -21235,8 +21235,8 @@
         </p:blipFill>
         <p:spPr>
           <a:xfrm>
-            <a:off x="133939" y="110481"/>
-            <a:ext cx="2390775" cy="1064444"/>
+            <a:off x="-124191" y="173677"/>
+            <a:ext cx="2010140" cy="1262367"/>
           </a:xfrm>
           <a:prstGeom prst="rect">
             <a:avLst/>
@@ -21377,10 +21377,10 @@
       </p:sp>
       <p:pic>
         <p:nvPicPr>
-          <p:cNvPr id="8" name="Picture 7">
+          <p:cNvPr id="4" name="Imagen 3">
             <a:extLst>
               <a:ext uri="{FF2B5EF4-FFF2-40B4-BE49-F238E27FC236}">
-                <a16:creationId xmlns:a16="http://schemas.microsoft.com/office/drawing/2014/main" id="{EE4720A5-C666-7800-2AFA-26C16703EEE4}"/>
+                <a16:creationId xmlns:a16="http://schemas.microsoft.com/office/drawing/2014/main" id="{4C078022-B599-6092-8ECE-4074FF9EB448}"/>
               </a:ext>
             </a:extLst>
           </p:cNvPr>
@@ -21397,8 +21397,8 @@
         </p:blipFill>
         <p:spPr>
           <a:xfrm>
-            <a:off x="133939" y="110481"/>
-            <a:ext cx="2390775" cy="1064444"/>
+            <a:off x="-124191" y="173677"/>
+            <a:ext cx="2010140" cy="1262367"/>
           </a:xfrm>
           <a:prstGeom prst="rect">
             <a:avLst/>
@@ -21543,10 +21543,10 @@
       </p:sp>
       <p:pic>
         <p:nvPicPr>
-          <p:cNvPr id="3" name="Picture 2">
+          <p:cNvPr id="4" name="Imagen 3">
             <a:extLst>
               <a:ext uri="{FF2B5EF4-FFF2-40B4-BE49-F238E27FC236}">
-                <a16:creationId xmlns:a16="http://schemas.microsoft.com/office/drawing/2014/main" id="{764AE89A-ACC4-4053-9024-644AD84A16A4}"/>
+                <a16:creationId xmlns:a16="http://schemas.microsoft.com/office/drawing/2014/main" id="{323A4980-73BD-3128-B3A1-C2F7D417B249}"/>
               </a:ext>
             </a:extLst>
           </p:cNvPr>
@@ -21563,8 +21563,8 @@
         </p:blipFill>
         <p:spPr>
           <a:xfrm>
-            <a:off x="133939" y="110481"/>
-            <a:ext cx="2390775" cy="1064444"/>
+            <a:off x="-124191" y="173677"/>
+            <a:ext cx="2010140" cy="1262367"/>
           </a:xfrm>
           <a:prstGeom prst="rect">
             <a:avLst/>
@@ -21700,10 +21700,10 @@
       </p:sp>
       <p:pic>
         <p:nvPicPr>
-          <p:cNvPr id="3" name="Picture 2">
+          <p:cNvPr id="4" name="Imagen 3">
             <a:extLst>
               <a:ext uri="{FF2B5EF4-FFF2-40B4-BE49-F238E27FC236}">
-                <a16:creationId xmlns:a16="http://schemas.microsoft.com/office/drawing/2014/main" id="{333C5875-3D8B-672A-C54C-CBC7C423F0A4}"/>
+                <a16:creationId xmlns:a16="http://schemas.microsoft.com/office/drawing/2014/main" id="{4D3E9685-0FEB-ABCD-BA05-DB166144D6CA}"/>
               </a:ext>
             </a:extLst>
           </p:cNvPr>
@@ -21720,8 +21720,8 @@
         </p:blipFill>
         <p:spPr>
           <a:xfrm>
-            <a:off x="133939" y="110481"/>
-            <a:ext cx="2390775" cy="1064444"/>
+            <a:off x="-124191" y="173677"/>
+            <a:ext cx="2010140" cy="1262367"/>
           </a:xfrm>
           <a:prstGeom prst="rect">
             <a:avLst/>
@@ -21855,36 +21855,6 @@
           </a:p>
         </p:txBody>
       </p:sp>
-      <p:pic>
-        <p:nvPicPr>
-          <p:cNvPr id="2" name="Picture 1">
-            <a:extLst>
-              <a:ext uri="{FF2B5EF4-FFF2-40B4-BE49-F238E27FC236}">
-                <a16:creationId xmlns:a16="http://schemas.microsoft.com/office/drawing/2014/main" id="{E5D8B1CD-F741-76CB-22F9-86CE2FCFFA61}"/>
-              </a:ext>
-            </a:extLst>
-          </p:cNvPr>
-          <p:cNvPicPr>
-            <a:picLocks noChangeAspect="1"/>
-          </p:cNvPicPr>
-          <p:nvPr/>
-        </p:nvPicPr>
-        <p:blipFill>
-          <a:blip r:embed="rId3"/>
-          <a:stretch>
-            <a:fillRect/>
-          </a:stretch>
-        </p:blipFill>
-        <p:spPr>
-          <a:xfrm>
-            <a:off x="133939" y="110481"/>
-            <a:ext cx="2390775" cy="1064444"/>
-          </a:xfrm>
-          <a:prstGeom prst="rect">
-            <a:avLst/>
-          </a:prstGeom>
-        </p:spPr>
-      </p:pic>
       <p:sp>
         <p:nvSpPr>
           <p:cNvPr id="6" name="CuadroTexto 5">
@@ -22216,6 +22186,36 @@
           </a:p>
         </p:txBody>
       </p:sp>
+      <p:pic>
+        <p:nvPicPr>
+          <p:cNvPr id="4" name="Imagen 3">
+            <a:extLst>
+              <a:ext uri="{FF2B5EF4-FFF2-40B4-BE49-F238E27FC236}">
+                <a16:creationId xmlns:a16="http://schemas.microsoft.com/office/drawing/2014/main" id="{A5F62FAC-6FB5-681A-D152-29B0A7E62C11}"/>
+              </a:ext>
+            </a:extLst>
+          </p:cNvPr>
+          <p:cNvPicPr>
+            <a:picLocks noChangeAspect="1"/>
+          </p:cNvPicPr>
+          <p:nvPr/>
+        </p:nvPicPr>
+        <p:blipFill>
+          <a:blip r:embed="rId3"/>
+          <a:stretch>
+            <a:fillRect/>
+          </a:stretch>
+        </p:blipFill>
+        <p:spPr>
+          <a:xfrm>
+            <a:off x="-124191" y="173677"/>
+            <a:ext cx="2010140" cy="1262367"/>
+          </a:xfrm>
+          <a:prstGeom prst="rect">
+            <a:avLst/>
+          </a:prstGeom>
+        </p:spPr>
+      </p:pic>
     </p:spTree>
   </p:cSld>
   <p:clrMapOvr>
@@ -22408,10 +22408,10 @@
       </p:sp>
       <p:pic>
         <p:nvPicPr>
-          <p:cNvPr id="3" name="Picture 2">
+          <p:cNvPr id="4" name="Imagen 3">
             <a:extLst>
               <a:ext uri="{FF2B5EF4-FFF2-40B4-BE49-F238E27FC236}">
-                <a16:creationId xmlns:a16="http://schemas.microsoft.com/office/drawing/2014/main" id="{DC628BE5-A634-3808-F721-7410BECFBBA1}"/>
+                <a16:creationId xmlns:a16="http://schemas.microsoft.com/office/drawing/2014/main" id="{8A2524E7-3989-E867-565E-159B068A6AD4}"/>
               </a:ext>
             </a:extLst>
           </p:cNvPr>
@@ -22428,8 +22428,8 @@
         </p:blipFill>
         <p:spPr>
           <a:xfrm>
-            <a:off x="133939" y="110481"/>
-            <a:ext cx="2390775" cy="1064444"/>
+            <a:off x="0" y="-64737"/>
+            <a:ext cx="2155772" cy="1409875"/>
           </a:xfrm>
           <a:prstGeom prst="rect">
             <a:avLst/>
@@ -22537,36 +22537,6 @@
       </p:sp>
       <p:pic>
         <p:nvPicPr>
-          <p:cNvPr id="2" name="Picture 1">
-            <a:extLst>
-              <a:ext uri="{FF2B5EF4-FFF2-40B4-BE49-F238E27FC236}">
-                <a16:creationId xmlns:a16="http://schemas.microsoft.com/office/drawing/2014/main" id="{58EEAA73-F275-5DED-8E9C-F8E9353FDF31}"/>
-              </a:ext>
-            </a:extLst>
-          </p:cNvPr>
-          <p:cNvPicPr>
-            <a:picLocks noChangeAspect="1"/>
-          </p:cNvPicPr>
-          <p:nvPr/>
-        </p:nvPicPr>
-        <p:blipFill>
-          <a:blip r:embed="rId3"/>
-          <a:stretch>
-            <a:fillRect/>
-          </a:stretch>
-        </p:blipFill>
-        <p:spPr>
-          <a:xfrm>
-            <a:off x="133939" y="110481"/>
-            <a:ext cx="2390775" cy="1064444"/>
-          </a:xfrm>
-          <a:prstGeom prst="rect">
-            <a:avLst/>
-          </a:prstGeom>
-        </p:spPr>
-      </p:pic>
-      <p:pic>
-        <p:nvPicPr>
           <p:cNvPr id="3" name="Imagen 2"/>
           <p:cNvPicPr>
             <a:picLocks noChangeAspect="1"/>
@@ -22574,7 +22544,7 @@
           <p:nvPr/>
         </p:nvPicPr>
         <p:blipFill rotWithShape="1">
-          <a:blip r:embed="rId4">
+          <a:blip r:embed="rId3">
             <a:extLst>
               <a:ext uri="{28A0092B-C50C-407E-A947-70E740481C1C}">
                 <a14:useLocalDpi xmlns:a14="http://schemas.microsoft.com/office/drawing/2010/main" val="0"/>
@@ -22588,6 +22558,36 @@
           <a:xfrm>
             <a:off x="3645780" y="1740665"/>
             <a:ext cx="4119783" cy="4505899"/>
+          </a:xfrm>
+          <a:prstGeom prst="rect">
+            <a:avLst/>
+          </a:prstGeom>
+        </p:spPr>
+      </p:pic>
+      <p:pic>
+        <p:nvPicPr>
+          <p:cNvPr id="4" name="Imagen 3">
+            <a:extLst>
+              <a:ext uri="{FF2B5EF4-FFF2-40B4-BE49-F238E27FC236}">
+                <a16:creationId xmlns:a16="http://schemas.microsoft.com/office/drawing/2014/main" id="{3CA581C2-64AB-6643-CB73-F9DA8D1C9C55}"/>
+              </a:ext>
+            </a:extLst>
+          </p:cNvPr>
+          <p:cNvPicPr>
+            <a:picLocks noChangeAspect="1"/>
+          </p:cNvPicPr>
+          <p:nvPr/>
+        </p:nvPicPr>
+        <p:blipFill>
+          <a:blip r:embed="rId4"/>
+          <a:stretch>
+            <a:fillRect/>
+          </a:stretch>
+        </p:blipFill>
+        <p:spPr>
+          <a:xfrm>
+            <a:off x="-124191" y="173677"/>
+            <a:ext cx="2010140" cy="1262367"/>
           </a:xfrm>
           <a:prstGeom prst="rect">
             <a:avLst/>
@@ -22695,10 +22695,10 @@
       </p:sp>
       <p:pic>
         <p:nvPicPr>
-          <p:cNvPr id="2" name="Picture 1">
+          <p:cNvPr id="3" name="Imagen 2">
             <a:extLst>
               <a:ext uri="{FF2B5EF4-FFF2-40B4-BE49-F238E27FC236}">
-                <a16:creationId xmlns:a16="http://schemas.microsoft.com/office/drawing/2014/main" id="{B0A7607D-FD51-DCCD-8468-A2AEC8721816}"/>
+                <a16:creationId xmlns:a16="http://schemas.microsoft.com/office/drawing/2014/main" id="{CA8C5935-BAD0-6C78-15BA-666FFA99B797}"/>
               </a:ext>
             </a:extLst>
           </p:cNvPr>
@@ -22715,39 +22715,8 @@
         </p:blipFill>
         <p:spPr>
           <a:xfrm>
-            <a:off x="133939" y="110481"/>
-            <a:ext cx="2390775" cy="1064444"/>
-          </a:xfrm>
-          <a:prstGeom prst="rect">
-            <a:avLst/>
-          </a:prstGeom>
-        </p:spPr>
-      </p:pic>
-      <p:pic>
-        <p:nvPicPr>
-          <p:cNvPr id="6" name="Imagen 5" descr="Diagrama, Esquemático&#10;&#10;El contenido generado por IA puede ser incorrecto.">
-            <a:hlinkClick r:id="rId4" action="ppaction://hlinkfile"/>
-            <a:extLst>
-              <a:ext uri="{FF2B5EF4-FFF2-40B4-BE49-F238E27FC236}">
-                <a16:creationId xmlns:a16="http://schemas.microsoft.com/office/drawing/2014/main" id="{61A78BCB-528C-1E70-4538-AC5523479D71}"/>
-              </a:ext>
-            </a:extLst>
-          </p:cNvPr>
-          <p:cNvPicPr>
-            <a:picLocks noChangeAspect="1"/>
-          </p:cNvPicPr>
-          <p:nvPr/>
-        </p:nvPicPr>
-        <p:blipFill>
-          <a:blip r:embed="rId5"/>
-          <a:stretch>
-            <a:fillRect/>
-          </a:stretch>
-        </p:blipFill>
-        <p:spPr>
-          <a:xfrm>
-            <a:off x="0" y="1825532"/>
-            <a:ext cx="12192000" cy="3842204"/>
+            <a:off x="-124191" y="173677"/>
+            <a:ext cx="2010140" cy="1262367"/>
           </a:xfrm>
           <a:prstGeom prst="rect">
             <a:avLst/>
@@ -23346,15 +23315,6 @@
 </file>
 
 <file path=customXml/item2.xml><?xml version="1.0" encoding="utf-8"?>
-<?mso-contentType ?>
-<FormTemplates xmlns="http://schemas.microsoft.com/sharepoint/v3/contenttype/forms">
-  <Display>DocumentLibraryForm</Display>
-  <Edit>DocumentLibraryForm</Edit>
-  <New>DocumentLibraryForm</New>
-</FormTemplates>
-</file>
-
-<file path=customXml/item3.xml><?xml version="1.0" encoding="utf-8"?>
 <ct:contentTypeSchema xmlns:ct="http://schemas.microsoft.com/office/2006/metadata/contentType" xmlns:ma="http://schemas.microsoft.com/office/2006/metadata/properties/metaAttributes" ct:_="" ma:_="" ma:contentTypeName="Documento" ma:contentTypeID="0x0101009C160BF63992044A99946E4B9FF8A5D5" ma:contentTypeVersion="14" ma:contentTypeDescription="Crear nuevo documento." ma:contentTypeScope="" ma:versionID="de16a2f1483f07f01f664ea99c541bb4">
   <xsd:schema xmlns:xsd="http://www.w3.org/2001/XMLSchema" xmlns:xs="http://www.w3.org/2001/XMLSchema" xmlns:p="http://schemas.microsoft.com/office/2006/metadata/properties" xmlns:ns2="7f8eb868-f2a7-49ec-80f2-9ac6732c6161" xmlns:ns3="5d6dac1f-6572-46e6-8ac2-54aa885adc11" targetNamespace="http://schemas.microsoft.com/office/2006/metadata/properties" ma:root="true" ma:fieldsID="2aeeeaca6a92989f39bea69df05468af" ns2:_="" ns3:_="">
     <xsd:import namespace="7f8eb868-f2a7-49ec-80f2-9ac6732c6161"/>
@@ -23583,6 +23543,15 @@
 </ct:contentTypeSchema>
 </file>
 
+<file path=customXml/item3.xml><?xml version="1.0" encoding="utf-8"?>
+<?mso-contentType ?>
+<FormTemplates xmlns="http://schemas.microsoft.com/sharepoint/v3/contenttype/forms">
+  <Display>DocumentLibraryForm</Display>
+  <Edit>DocumentLibraryForm</Edit>
+  <New>DocumentLibraryForm</New>
+</FormTemplates>
+</file>
+
 <file path=customXml/itemProps1.xml><?xml version="1.0" encoding="utf-8"?>
 <ds:datastoreItem xmlns:ds="http://schemas.openxmlformats.org/officeDocument/2006/customXml" ds:itemID="{091B3500-55FD-47A2-B150-4704A4114CB7}">
   <ds:schemaRefs/>
@@ -23590,13 +23559,13 @@
 </file>
 
 <file path=customXml/itemProps2.xml><?xml version="1.0" encoding="utf-8"?>
-<ds:datastoreItem xmlns:ds="http://schemas.openxmlformats.org/officeDocument/2006/customXml" ds:itemID="{C020FF02-1FE7-4B92-A947-88F847DE8F80}">
+<ds:datastoreItem xmlns:ds="http://schemas.openxmlformats.org/officeDocument/2006/customXml" ds:itemID="{FB48A022-90FE-46FD-B6B9-A5517959569C}">
   <ds:schemaRefs/>
 </ds:datastoreItem>
 </file>
 
 <file path=customXml/itemProps3.xml><?xml version="1.0" encoding="utf-8"?>
-<ds:datastoreItem xmlns:ds="http://schemas.openxmlformats.org/officeDocument/2006/customXml" ds:itemID="{FB48A022-90FE-46FD-B6B9-A5517959569C}">
+<ds:datastoreItem xmlns:ds="http://schemas.openxmlformats.org/officeDocument/2006/customXml" ds:itemID="{C020FF02-1FE7-4B92-A947-88F847DE8F80}">
   <ds:schemaRefs/>
 </ds:datastoreItem>
 </file>
</xml_diff>